<commit_message>
re #712 adding glossary to architecture overview
git-svn-id: https://subversion.assembla.com/svn/plus/trunk/doc@2732 c04e96f8-ac36-4ff2-8b34-4a5e34ef045f
</commit_message>
<xml_diff>
--- a/overview/PlusArchitectureOverview.pptx
+++ b/overview/PlusArchitectureOverview.pptx
@@ -5,14 +5,15 @@
     <p:sldMasterId id="2147483648" r:id="rId1"/>
   </p:sldMasterIdLst>
   <p:notesMasterIdLst>
-    <p:notesMasterId r:id="rId7"/>
+    <p:notesMasterId r:id="rId8"/>
   </p:notesMasterIdLst>
   <p:sldIdLst>
     <p:sldId id="256" r:id="rId2"/>
     <p:sldId id="418" r:id="rId3"/>
-    <p:sldId id="419" r:id="rId4"/>
-    <p:sldId id="420" r:id="rId5"/>
-    <p:sldId id="421" r:id="rId6"/>
+    <p:sldId id="422" r:id="rId4"/>
+    <p:sldId id="419" r:id="rId5"/>
+    <p:sldId id="420" r:id="rId6"/>
+    <p:sldId id="421" r:id="rId7"/>
   </p:sldIdLst>
   <p:sldSz cx="9144000" cy="6858000" type="screen4x3"/>
   <p:notesSz cx="6858000" cy="9144000"/>
@@ -197,7 +198,7 @@
             <a:fld id="{A6E16264-6225-448A-8F6B-37C607BF693C}" type="datetimeFigureOut">
               <a:rPr lang="en-CA" smtClean="0"/>
               <a:pPr/>
-              <a:t>01/05/2013</a:t>
+              <a:t>02/05/2013</a:t>
             </a:fld>
             <a:endParaRPr lang="en-CA"/>
           </a:p>
@@ -826,6 +827,96 @@
 </p:notes>
 </file>
 
+<file path=ppt/notesSlides/notesSlide5.xml><?xml version="1.0" encoding="utf-8"?>
+<p:notes xmlns:a="http://schemas.openxmlformats.org/drawingml/2006/main" xmlns:r="http://schemas.openxmlformats.org/officeDocument/2006/relationships" xmlns:p="http://schemas.openxmlformats.org/presentationml/2006/main">
+  <p:cSld>
+    <p:spTree>
+      <p:nvGrpSpPr>
+        <p:cNvPr id="1" name=""/>
+        <p:cNvGrpSpPr/>
+        <p:nvPr/>
+      </p:nvGrpSpPr>
+      <p:grpSpPr>
+        <a:xfrm>
+          <a:off x="0" y="0"/>
+          <a:ext cx="0" cy="0"/>
+          <a:chOff x="0" y="0"/>
+          <a:chExt cx="0" cy="0"/>
+        </a:xfrm>
+      </p:grpSpPr>
+      <p:sp>
+        <p:nvSpPr>
+          <p:cNvPr id="2" name="Slide Image Placeholder 1"/>
+          <p:cNvSpPr>
+            <a:spLocks noGrp="1" noRot="1" noChangeAspect="1"/>
+          </p:cNvSpPr>
+          <p:nvPr>
+            <p:ph type="sldImg"/>
+          </p:nvPr>
+        </p:nvSpPr>
+        <p:spPr/>
+      </p:sp>
+      <p:sp>
+        <p:nvSpPr>
+          <p:cNvPr id="3" name="Notes Placeholder 2"/>
+          <p:cNvSpPr>
+            <a:spLocks noGrp="1"/>
+          </p:cNvSpPr>
+          <p:nvPr>
+            <p:ph type="body" idx="1"/>
+          </p:nvPr>
+        </p:nvSpPr>
+        <p:spPr/>
+        <p:txBody>
+          <a:bodyPr/>
+          <a:lstStyle/>
+          <a:p>
+            <a:endParaRPr lang="en-US" dirty="0"/>
+          </a:p>
+        </p:txBody>
+      </p:sp>
+      <p:sp>
+        <p:nvSpPr>
+          <p:cNvPr id="4" name="Slide Number Placeholder 3"/>
+          <p:cNvSpPr>
+            <a:spLocks noGrp="1"/>
+          </p:cNvSpPr>
+          <p:nvPr>
+            <p:ph type="sldNum" sz="quarter" idx="10"/>
+          </p:nvPr>
+        </p:nvSpPr>
+        <p:spPr/>
+        <p:txBody>
+          <a:bodyPr/>
+          <a:lstStyle/>
+          <a:p>
+            <a:pPr>
+              <a:defRPr/>
+            </a:pPr>
+            <a:fld id="{7D5EC535-FC31-4244-9C64-EE05A8ED5E60}" type="slidenum">
+              <a:rPr lang="en-US" smtClean="0"/>
+              <a:pPr>
+                <a:defRPr/>
+              </a:pPr>
+              <a:t>6</a:t>
+            </a:fld>
+            <a:endParaRPr lang="en-US"/>
+          </a:p>
+        </p:txBody>
+      </p:sp>
+    </p:spTree>
+    <p:extLst>
+      <p:ext uri="{BB962C8B-B14F-4D97-AF65-F5344CB8AC3E}">
+        <p14:creationId xmlns:p14="http://schemas.microsoft.com/office/powerpoint/2010/main" val="3077919326"/>
+      </p:ext>
+    </p:extLst>
+  </p:cSld>
+  <p:clrMapOvr>
+    <a:masterClrMapping/>
+  </p:clrMapOvr>
+</p:notes>
+</file>
+
 <file path=ppt/slideLayouts/slideLayout1.xml><?xml version="1.0" encoding="utf-8"?>
 <p:sldLayout xmlns:a="http://schemas.openxmlformats.org/drawingml/2006/main" xmlns:r="http://schemas.openxmlformats.org/officeDocument/2006/relationships" xmlns:p="http://schemas.openxmlformats.org/presentationml/2006/main" type="title" preserve="1">
   <p:cSld name="Title Slide">
@@ -1008,7 +1099,7 @@
             <a:fld id="{E843F943-FC4A-4610-812B-19459293E20B}" type="datetime1">
               <a:rPr lang="en-CA" smtClean="0"/>
               <a:pPr/>
-              <a:t>01/05/2013</a:t>
+              <a:t>02/05/2013</a:t>
             </a:fld>
             <a:endParaRPr lang="en-CA" dirty="0"/>
           </a:p>
@@ -1307,7 +1398,7 @@
             <a:fld id="{7EC20259-AFA4-42BB-B1F2-1723D3175E09}" type="datetime1">
               <a:rPr lang="en-CA" smtClean="0"/>
               <a:pPr/>
-              <a:t>01/05/2013</a:t>
+              <a:t>02/05/2013</a:t>
             </a:fld>
             <a:endParaRPr lang="en-CA"/>
           </a:p>
@@ -1511,7 +1602,7 @@
             <a:fld id="{7EC20259-AFA4-42BB-B1F2-1723D3175E09}" type="datetime1">
               <a:rPr lang="en-CA" smtClean="0"/>
               <a:pPr/>
-              <a:t>01/05/2013</a:t>
+              <a:t>02/05/2013</a:t>
             </a:fld>
             <a:endParaRPr lang="en-CA"/>
           </a:p>
@@ -1793,7 +1884,7 @@
             <a:fld id="{0B273A97-7724-4AE7-A6F1-5A1F5D1DB72A}" type="datetime1">
               <a:rPr lang="en-CA" smtClean="0"/>
               <a:pPr/>
-              <a:t>01/05/2013</a:t>
+              <a:t>02/05/2013</a:t>
             </a:fld>
             <a:endParaRPr lang="en-CA"/>
           </a:p>
@@ -2550,20 +2641,12 @@
           </a:lstStyle>
           <a:p>
             <a:r>
-              <a:rPr lang="en-CA" b="1" dirty="0">
+              <a:rPr lang="en-CA" b="1" dirty="0" smtClean="0">
                 <a:solidFill>
                   <a:srgbClr val="800000"/>
                 </a:solidFill>
               </a:rPr>
-              <a:t>System </a:t>
-            </a:r>
-            <a:r>
-              <a:rPr lang="en-CA" b="1" dirty="0" smtClean="0">
-                <a:solidFill>
-                  <a:srgbClr val="800000"/>
-                </a:solidFill>
-              </a:rPr>
-              <a:t>Overview</a:t>
+              <a:t>Glossary</a:t>
             </a:r>
             <a:endParaRPr lang="en-CA" b="1" dirty="0">
               <a:solidFill>
@@ -2601,6 +2684,987 @@
                 <a:defRPr/>
               </a:pPr>
               <a:t>2</a:t>
+            </a:fld>
+            <a:r>
+              <a:rPr lang="en-US" smtClean="0"/>
+              <a:t> -</a:t>
+            </a:r>
+            <a:endParaRPr lang="en-US" dirty="0"/>
+          </a:p>
+        </p:txBody>
+      </p:sp>
+      <p:sp>
+        <p:nvSpPr>
+          <p:cNvPr id="5" name="Footer Placeholder 4"/>
+          <p:cNvSpPr>
+            <a:spLocks noGrp="1"/>
+          </p:cNvSpPr>
+          <p:nvPr>
+            <p:ph type="ftr" sz="quarter" idx="11"/>
+          </p:nvPr>
+        </p:nvSpPr>
+        <p:spPr/>
+        <p:txBody>
+          <a:bodyPr/>
+          <a:lstStyle/>
+          <a:p>
+            <a:pPr>
+              <a:defRPr/>
+            </a:pPr>
+            <a:r>
+              <a:rPr lang="en-US" smtClean="0"/>
+              <a:t>Laboratory for Percutaneous Surgery – Copyright © Queen’s University, 2013</a:t>
+            </a:r>
+            <a:endParaRPr lang="en-US" dirty="0"/>
+          </a:p>
+        </p:txBody>
+      </p:sp>
+      <p:sp>
+        <p:nvSpPr>
+          <p:cNvPr id="63" name="Rectangle 62"/>
+          <p:cNvSpPr/>
+          <p:nvPr/>
+        </p:nvSpPr>
+        <p:spPr>
+          <a:xfrm>
+            <a:off x="539552" y="3008827"/>
+            <a:ext cx="1656184" cy="348165"/>
+          </a:xfrm>
+          <a:prstGeom prst="rect">
+            <a:avLst/>
+          </a:prstGeom>
+          <a:solidFill>
+            <a:srgbClr val="33889F"/>
+          </a:solidFill>
+          <a:ln/>
+        </p:spPr>
+        <p:style>
+          <a:lnRef idx="3">
+            <a:schemeClr val="lt1"/>
+          </a:lnRef>
+          <a:fillRef idx="1">
+            <a:schemeClr val="accent5"/>
+          </a:fillRef>
+          <a:effectRef idx="1">
+            <a:schemeClr val="accent5"/>
+          </a:effectRef>
+          <a:fontRef idx="minor">
+            <a:schemeClr val="lt1"/>
+          </a:fontRef>
+        </p:style>
+        <p:txBody>
+          <a:bodyPr rtlCol="0" anchor="ctr"/>
+          <a:lstStyle/>
+          <a:p>
+            <a:pPr algn="ctr"/>
+            <a:r>
+              <a:rPr lang="en-CA" sz="1200" b="1" dirty="0" smtClean="0">
+                <a:solidFill>
+                  <a:schemeClr val="bg1"/>
+                </a:solidFill>
+              </a:rPr>
+              <a:t>Device</a:t>
+            </a:r>
+            <a:endParaRPr lang="en-CA" sz="1200" b="1" dirty="0">
+              <a:solidFill>
+                <a:schemeClr val="bg1"/>
+              </a:solidFill>
+            </a:endParaRPr>
+          </a:p>
+        </p:txBody>
+      </p:sp>
+      <p:sp>
+        <p:nvSpPr>
+          <p:cNvPr id="38" name="Rectangle 37"/>
+          <p:cNvSpPr/>
+          <p:nvPr/>
+        </p:nvSpPr>
+        <p:spPr>
+          <a:xfrm>
+            <a:off x="539552" y="3429000"/>
+            <a:ext cx="1656184" cy="348165"/>
+          </a:xfrm>
+          <a:prstGeom prst="rect">
+            <a:avLst/>
+          </a:prstGeom>
+          <a:solidFill>
+            <a:srgbClr val="33889F"/>
+          </a:solidFill>
+          <a:ln/>
+        </p:spPr>
+        <p:style>
+          <a:lnRef idx="3">
+            <a:schemeClr val="lt1"/>
+          </a:lnRef>
+          <a:fillRef idx="1">
+            <a:schemeClr val="accent5"/>
+          </a:fillRef>
+          <a:effectRef idx="1">
+            <a:schemeClr val="accent5"/>
+          </a:effectRef>
+          <a:fontRef idx="minor">
+            <a:schemeClr val="lt1"/>
+          </a:fontRef>
+        </p:style>
+        <p:txBody>
+          <a:bodyPr rtlCol="0" anchor="ctr"/>
+          <a:lstStyle/>
+          <a:p>
+            <a:pPr algn="ctr"/>
+            <a:r>
+              <a:rPr lang="en-CA" sz="1200" b="1" dirty="0" smtClean="0">
+                <a:solidFill>
+                  <a:schemeClr val="bg1"/>
+                </a:solidFill>
+              </a:rPr>
+              <a:t>Channel</a:t>
+            </a:r>
+            <a:endParaRPr lang="en-CA" sz="1200" b="1" dirty="0">
+              <a:solidFill>
+                <a:schemeClr val="bg1"/>
+              </a:solidFill>
+            </a:endParaRPr>
+          </a:p>
+        </p:txBody>
+      </p:sp>
+      <p:sp>
+        <p:nvSpPr>
+          <p:cNvPr id="39" name="Rectangle 38"/>
+          <p:cNvSpPr/>
+          <p:nvPr/>
+        </p:nvSpPr>
+        <p:spPr>
+          <a:xfrm>
+            <a:off x="539552" y="3861048"/>
+            <a:ext cx="1656184" cy="348165"/>
+          </a:xfrm>
+          <a:prstGeom prst="rect">
+            <a:avLst/>
+          </a:prstGeom>
+          <a:solidFill>
+            <a:srgbClr val="33889F"/>
+          </a:solidFill>
+          <a:ln/>
+        </p:spPr>
+        <p:style>
+          <a:lnRef idx="3">
+            <a:schemeClr val="lt1"/>
+          </a:lnRef>
+          <a:fillRef idx="1">
+            <a:schemeClr val="accent5"/>
+          </a:fillRef>
+          <a:effectRef idx="1">
+            <a:schemeClr val="accent5"/>
+          </a:effectRef>
+          <a:fontRef idx="minor">
+            <a:schemeClr val="lt1"/>
+          </a:fontRef>
+        </p:style>
+        <p:txBody>
+          <a:bodyPr rtlCol="0" anchor="ctr"/>
+          <a:lstStyle/>
+          <a:p>
+            <a:pPr algn="ctr"/>
+            <a:r>
+              <a:rPr lang="en-CA" sz="1200" b="1" dirty="0" smtClean="0">
+                <a:solidFill>
+                  <a:schemeClr val="bg1"/>
+                </a:solidFill>
+              </a:rPr>
+              <a:t>Data Source</a:t>
+            </a:r>
+            <a:endParaRPr lang="en-CA" sz="1200" b="1" dirty="0">
+              <a:solidFill>
+                <a:schemeClr val="bg1"/>
+              </a:solidFill>
+            </a:endParaRPr>
+          </a:p>
+        </p:txBody>
+      </p:sp>
+      <p:sp>
+        <p:nvSpPr>
+          <p:cNvPr id="40" name="Rectangle 39"/>
+          <p:cNvSpPr/>
+          <p:nvPr/>
+        </p:nvSpPr>
+        <p:spPr>
+          <a:xfrm>
+            <a:off x="539552" y="1124744"/>
+            <a:ext cx="1656184" cy="348165"/>
+          </a:xfrm>
+          <a:prstGeom prst="rect">
+            <a:avLst/>
+          </a:prstGeom>
+          <a:solidFill>
+            <a:srgbClr val="33889F"/>
+          </a:solidFill>
+          <a:ln/>
+        </p:spPr>
+        <p:style>
+          <a:lnRef idx="3">
+            <a:schemeClr val="lt1"/>
+          </a:lnRef>
+          <a:fillRef idx="1">
+            <a:schemeClr val="accent5"/>
+          </a:fillRef>
+          <a:effectRef idx="1">
+            <a:schemeClr val="accent5"/>
+          </a:effectRef>
+          <a:fontRef idx="minor">
+            <a:schemeClr val="lt1"/>
+          </a:fontRef>
+        </p:style>
+        <p:txBody>
+          <a:bodyPr rtlCol="0" anchor="ctr"/>
+          <a:lstStyle/>
+          <a:p>
+            <a:pPr algn="ctr"/>
+            <a:r>
+              <a:rPr lang="en-CA" sz="1200" b="1" dirty="0" smtClean="0">
+                <a:solidFill>
+                  <a:schemeClr val="bg1"/>
+                </a:solidFill>
+              </a:rPr>
+              <a:t>Tag</a:t>
+            </a:r>
+            <a:endParaRPr lang="en-CA" sz="1200" b="1" dirty="0">
+              <a:solidFill>
+                <a:schemeClr val="bg1"/>
+              </a:solidFill>
+            </a:endParaRPr>
+          </a:p>
+        </p:txBody>
+      </p:sp>
+      <p:sp>
+        <p:nvSpPr>
+          <p:cNvPr id="41" name="Rectangle 40"/>
+          <p:cNvSpPr/>
+          <p:nvPr/>
+        </p:nvSpPr>
+        <p:spPr>
+          <a:xfrm>
+            <a:off x="539552" y="1568667"/>
+            <a:ext cx="1656184" cy="348165"/>
+          </a:xfrm>
+          <a:prstGeom prst="rect">
+            <a:avLst/>
+          </a:prstGeom>
+          <a:solidFill>
+            <a:srgbClr val="33889F"/>
+          </a:solidFill>
+          <a:ln/>
+        </p:spPr>
+        <p:style>
+          <a:lnRef idx="3">
+            <a:schemeClr val="lt1"/>
+          </a:lnRef>
+          <a:fillRef idx="1">
+            <a:schemeClr val="accent5"/>
+          </a:fillRef>
+          <a:effectRef idx="1">
+            <a:schemeClr val="accent5"/>
+          </a:effectRef>
+          <a:fontRef idx="minor">
+            <a:schemeClr val="lt1"/>
+          </a:fontRef>
+        </p:style>
+        <p:txBody>
+          <a:bodyPr rtlCol="0" anchor="ctr"/>
+          <a:lstStyle/>
+          <a:p>
+            <a:pPr algn="ctr"/>
+            <a:r>
+              <a:rPr lang="en-CA" sz="1200" b="1" dirty="0" smtClean="0">
+                <a:solidFill>
+                  <a:schemeClr val="bg1"/>
+                </a:solidFill>
+              </a:rPr>
+              <a:t>Attribute</a:t>
+            </a:r>
+            <a:endParaRPr lang="en-CA" sz="1200" b="1" dirty="0">
+              <a:solidFill>
+                <a:schemeClr val="bg1"/>
+              </a:solidFill>
+            </a:endParaRPr>
+          </a:p>
+        </p:txBody>
+      </p:sp>
+      <p:sp>
+        <p:nvSpPr>
+          <p:cNvPr id="42" name="Rectangle 41"/>
+          <p:cNvSpPr/>
+          <p:nvPr/>
+        </p:nvSpPr>
+        <p:spPr>
+          <a:xfrm>
+            <a:off x="539552" y="4448987"/>
+            <a:ext cx="1656184" cy="348165"/>
+          </a:xfrm>
+          <a:prstGeom prst="rect">
+            <a:avLst/>
+          </a:prstGeom>
+          <a:solidFill>
+            <a:srgbClr val="33889F"/>
+          </a:solidFill>
+          <a:ln/>
+        </p:spPr>
+        <p:style>
+          <a:lnRef idx="3">
+            <a:schemeClr val="lt1"/>
+          </a:lnRef>
+          <a:fillRef idx="1">
+            <a:schemeClr val="accent5"/>
+          </a:fillRef>
+          <a:effectRef idx="1">
+            <a:schemeClr val="accent5"/>
+          </a:effectRef>
+          <a:fontRef idx="minor">
+            <a:schemeClr val="lt1"/>
+          </a:fontRef>
+        </p:style>
+        <p:txBody>
+          <a:bodyPr rtlCol="0" anchor="ctr"/>
+          <a:lstStyle/>
+          <a:p>
+            <a:pPr algn="ctr"/>
+            <a:r>
+              <a:rPr lang="en-CA" sz="1200" b="1" dirty="0" smtClean="0">
+                <a:solidFill>
+                  <a:schemeClr val="bg1"/>
+                </a:solidFill>
+              </a:rPr>
+              <a:t>Tracked Frame</a:t>
+            </a:r>
+          </a:p>
+        </p:txBody>
+      </p:sp>
+      <p:sp>
+        <p:nvSpPr>
+          <p:cNvPr id="43" name="TextBox 42"/>
+          <p:cNvSpPr txBox="1"/>
+          <p:nvPr/>
+        </p:nvSpPr>
+        <p:spPr>
+          <a:xfrm>
+            <a:off x="2267744" y="1124744"/>
+            <a:ext cx="6552728" cy="1200329"/>
+          </a:xfrm>
+          <a:prstGeom prst="rect">
+            <a:avLst/>
+          </a:prstGeom>
+          <a:noFill/>
+        </p:spPr>
+        <p:txBody>
+          <a:bodyPr wrap="square" rtlCol="0">
+            <a:spAutoFit/>
+          </a:bodyPr>
+          <a:lstStyle/>
+          <a:p>
+            <a:pPr marL="285750" indent="-285750">
+              <a:buFont typeface="Arial" pitchFamily="34" charset="0"/>
+              <a:buChar char="•"/>
+            </a:pPr>
+            <a:r>
+              <a:rPr lang="en-US" sz="2400" dirty="0" smtClean="0"/>
+              <a:t>XML tag is an entry in an XML file: &lt;Unicorn/&gt;</a:t>
+            </a:r>
+            <a:endParaRPr lang="en-US" sz="2400" dirty="0" smtClean="0"/>
+          </a:p>
+          <a:p>
+            <a:pPr marL="285750" indent="-285750">
+              <a:buFont typeface="Arial" pitchFamily="34" charset="0"/>
+              <a:buChar char="•"/>
+            </a:pPr>
+            <a:r>
+              <a:rPr lang="en-US" sz="2400" dirty="0" smtClean="0"/>
+              <a:t>XML attribute is a property of a tag &lt;Unicorn </a:t>
+            </a:r>
+            <a:r>
+              <a:rPr lang="en-US" sz="2400" b="1" dirty="0" smtClean="0"/>
+              <a:t>realness</a:t>
+            </a:r>
+            <a:r>
+              <a:rPr lang="en-US" sz="2400" dirty="0" smtClean="0"/>
+              <a:t>=“</a:t>
+            </a:r>
+            <a:r>
+              <a:rPr lang="en-US" sz="2400" dirty="0" err="1" smtClean="0"/>
+              <a:t>notReal</a:t>
+            </a:r>
+            <a:r>
+              <a:rPr lang="en-US" sz="2400" dirty="0" smtClean="0"/>
+              <a:t>” </a:t>
+            </a:r>
+            <a:r>
+              <a:rPr lang="en-US" sz="2400" b="1" dirty="0" smtClean="0"/>
+              <a:t>size</a:t>
+            </a:r>
+            <a:r>
+              <a:rPr lang="en-US" sz="2400" dirty="0" smtClean="0"/>
+              <a:t>=12 /&gt;</a:t>
+            </a:r>
+            <a:endParaRPr lang="en-US" sz="2400" dirty="0" smtClean="0"/>
+          </a:p>
+        </p:txBody>
+      </p:sp>
+      <p:sp>
+        <p:nvSpPr>
+          <p:cNvPr id="44" name="TextBox 43"/>
+          <p:cNvSpPr txBox="1"/>
+          <p:nvPr/>
+        </p:nvSpPr>
+        <p:spPr>
+          <a:xfrm>
+            <a:off x="2267744" y="2564904"/>
+            <a:ext cx="6552728" cy="369332"/>
+          </a:xfrm>
+          <a:prstGeom prst="rect">
+            <a:avLst/>
+          </a:prstGeom>
+          <a:noFill/>
+        </p:spPr>
+        <p:txBody>
+          <a:bodyPr wrap="square" rtlCol="0">
+            <a:spAutoFit/>
+          </a:bodyPr>
+          <a:lstStyle/>
+          <a:p>
+            <a:pPr marL="285750" indent="-285750">
+              <a:buFont typeface="Arial" pitchFamily="34" charset="0"/>
+              <a:buChar char="•"/>
+            </a:pPr>
+            <a:r>
+              <a:rPr lang="en-US" dirty="0" smtClean="0"/>
+              <a:t>Device (hardware) is any physical or virtual device</a:t>
+            </a:r>
+            <a:endParaRPr lang="en-US" dirty="0" smtClean="0"/>
+          </a:p>
+        </p:txBody>
+      </p:sp>
+      <p:sp>
+        <p:nvSpPr>
+          <p:cNvPr id="45" name="Rectangle 44"/>
+          <p:cNvSpPr/>
+          <p:nvPr/>
+        </p:nvSpPr>
+        <p:spPr>
+          <a:xfrm>
+            <a:off x="539552" y="2564904"/>
+            <a:ext cx="1656184" cy="355623"/>
+          </a:xfrm>
+          <a:prstGeom prst="rect">
+            <a:avLst/>
+          </a:prstGeom>
+          <a:ln/>
+        </p:spPr>
+        <p:style>
+          <a:lnRef idx="3">
+            <a:schemeClr val="lt1"/>
+          </a:lnRef>
+          <a:fillRef idx="1">
+            <a:schemeClr val="accent3"/>
+          </a:fillRef>
+          <a:effectRef idx="1">
+            <a:schemeClr val="accent3"/>
+          </a:effectRef>
+          <a:fontRef idx="minor">
+            <a:schemeClr val="lt1"/>
+          </a:fontRef>
+        </p:style>
+        <p:txBody>
+          <a:bodyPr rtlCol="0" anchor="ctr"/>
+          <a:lstStyle/>
+          <a:p>
+            <a:pPr algn="ctr"/>
+            <a:r>
+              <a:rPr lang="en-CA" sz="1200" b="1" dirty="0" smtClean="0">
+                <a:solidFill>
+                  <a:schemeClr val="bg1"/>
+                </a:solidFill>
+              </a:rPr>
+              <a:t>Hardware</a:t>
+            </a:r>
+            <a:endParaRPr lang="en-CA" sz="1200" b="1" dirty="0">
+              <a:solidFill>
+                <a:schemeClr val="bg1"/>
+              </a:solidFill>
+            </a:endParaRPr>
+          </a:p>
+        </p:txBody>
+      </p:sp>
+      <p:sp>
+        <p:nvSpPr>
+          <p:cNvPr id="46" name="Rectangle 45"/>
+          <p:cNvSpPr/>
+          <p:nvPr/>
+        </p:nvSpPr>
+        <p:spPr>
+          <a:xfrm>
+            <a:off x="539552" y="4953043"/>
+            <a:ext cx="1656184" cy="348165"/>
+          </a:xfrm>
+          <a:prstGeom prst="rect">
+            <a:avLst/>
+          </a:prstGeom>
+          <a:solidFill>
+            <a:srgbClr val="33889F"/>
+          </a:solidFill>
+          <a:ln/>
+        </p:spPr>
+        <p:style>
+          <a:lnRef idx="3">
+            <a:schemeClr val="lt1"/>
+          </a:lnRef>
+          <a:fillRef idx="1">
+            <a:schemeClr val="accent5"/>
+          </a:fillRef>
+          <a:effectRef idx="1">
+            <a:schemeClr val="accent5"/>
+          </a:effectRef>
+          <a:fontRef idx="minor">
+            <a:schemeClr val="lt1"/>
+          </a:fontRef>
+        </p:style>
+        <p:txBody>
+          <a:bodyPr rtlCol="0" anchor="ctr"/>
+          <a:lstStyle/>
+          <a:p>
+            <a:pPr algn="ctr"/>
+            <a:r>
+              <a:rPr lang="en-CA" sz="1200" b="1" dirty="0" smtClean="0">
+                <a:solidFill>
+                  <a:schemeClr val="bg1"/>
+                </a:solidFill>
+              </a:rPr>
+              <a:t>Transform</a:t>
+            </a:r>
+          </a:p>
+        </p:txBody>
+      </p:sp>
+      <p:sp>
+        <p:nvSpPr>
+          <p:cNvPr id="47" name="TextBox 46"/>
+          <p:cNvSpPr txBox="1"/>
+          <p:nvPr/>
+        </p:nvSpPr>
+        <p:spPr>
+          <a:xfrm>
+            <a:off x="2267744" y="2996952"/>
+            <a:ext cx="6552728" cy="369332"/>
+          </a:xfrm>
+          <a:prstGeom prst="rect">
+            <a:avLst/>
+          </a:prstGeom>
+          <a:noFill/>
+        </p:spPr>
+        <p:txBody>
+          <a:bodyPr wrap="square" rtlCol="0">
+            <a:spAutoFit/>
+          </a:bodyPr>
+          <a:lstStyle/>
+          <a:p>
+            <a:pPr marL="285750" indent="-285750">
+              <a:buFont typeface="Arial" pitchFamily="34" charset="0"/>
+              <a:buChar char="•"/>
+            </a:pPr>
+            <a:r>
+              <a:rPr lang="en-US" dirty="0"/>
+              <a:t>Device (software) is our interface to a physical device</a:t>
+            </a:r>
+          </a:p>
+        </p:txBody>
+      </p:sp>
+      <p:sp>
+        <p:nvSpPr>
+          <p:cNvPr id="48" name="TextBox 47"/>
+          <p:cNvSpPr txBox="1"/>
+          <p:nvPr/>
+        </p:nvSpPr>
+        <p:spPr>
+          <a:xfrm>
+            <a:off x="2267744" y="3419708"/>
+            <a:ext cx="6552728" cy="369332"/>
+          </a:xfrm>
+          <a:prstGeom prst="rect">
+            <a:avLst/>
+          </a:prstGeom>
+          <a:noFill/>
+        </p:spPr>
+        <p:txBody>
+          <a:bodyPr wrap="square" rtlCol="0">
+            <a:spAutoFit/>
+          </a:bodyPr>
+          <a:lstStyle/>
+          <a:p>
+            <a:pPr marL="285750" indent="-285750">
+              <a:buFont typeface="Arial" pitchFamily="34" charset="0"/>
+              <a:buChar char="•"/>
+            </a:pPr>
+            <a:r>
+              <a:rPr lang="en-US" dirty="0"/>
+              <a:t>Channel is a logical construct representing a stream of data</a:t>
+            </a:r>
+          </a:p>
+        </p:txBody>
+      </p:sp>
+      <p:sp>
+        <p:nvSpPr>
+          <p:cNvPr id="49" name="TextBox 48"/>
+          <p:cNvSpPr txBox="1"/>
+          <p:nvPr/>
+        </p:nvSpPr>
+        <p:spPr>
+          <a:xfrm>
+            <a:off x="2267744" y="3851756"/>
+            <a:ext cx="6552728" cy="646331"/>
+          </a:xfrm>
+          <a:prstGeom prst="rect">
+            <a:avLst/>
+          </a:prstGeom>
+          <a:noFill/>
+        </p:spPr>
+        <p:txBody>
+          <a:bodyPr wrap="square" rtlCol="0">
+            <a:spAutoFit/>
+          </a:bodyPr>
+          <a:lstStyle/>
+          <a:p>
+            <a:pPr marL="285750" indent="-285750">
+              <a:buFont typeface="Arial" pitchFamily="34" charset="0"/>
+              <a:buChar char="•"/>
+            </a:pPr>
+            <a:r>
+              <a:rPr lang="en-US" dirty="0"/>
+              <a:t>Data source is a logical construct around a buffer containing meta information (what type of source, etc…)</a:t>
+            </a:r>
+          </a:p>
+        </p:txBody>
+      </p:sp>
+      <p:sp>
+        <p:nvSpPr>
+          <p:cNvPr id="50" name="TextBox 49"/>
+          <p:cNvSpPr txBox="1"/>
+          <p:nvPr/>
+        </p:nvSpPr>
+        <p:spPr>
+          <a:xfrm>
+            <a:off x="2267744" y="4437112"/>
+            <a:ext cx="6552728" cy="646331"/>
+          </a:xfrm>
+          <a:prstGeom prst="rect">
+            <a:avLst/>
+          </a:prstGeom>
+          <a:noFill/>
+        </p:spPr>
+        <p:txBody>
+          <a:bodyPr wrap="square" rtlCol="0">
+            <a:spAutoFit/>
+          </a:bodyPr>
+          <a:lstStyle/>
+          <a:p>
+            <a:pPr marL="285750" indent="-285750">
+              <a:buFont typeface="Arial" pitchFamily="34" charset="0"/>
+              <a:buChar char="•"/>
+            </a:pPr>
+            <a:r>
+              <a:rPr lang="en-US" dirty="0" smtClean="0"/>
+              <a:t>Tracked frame is the result of merging multiple data sources into a data structure. Tracked frame = 1 video + N transforms</a:t>
+            </a:r>
+          </a:p>
+        </p:txBody>
+      </p:sp>
+      <p:sp>
+        <p:nvSpPr>
+          <p:cNvPr id="51" name="TextBox 50"/>
+          <p:cNvSpPr txBox="1"/>
+          <p:nvPr/>
+        </p:nvSpPr>
+        <p:spPr>
+          <a:xfrm>
+            <a:off x="2267744" y="4941168"/>
+            <a:ext cx="6552728" cy="646331"/>
+          </a:xfrm>
+          <a:prstGeom prst="rect">
+            <a:avLst/>
+          </a:prstGeom>
+          <a:noFill/>
+        </p:spPr>
+        <p:txBody>
+          <a:bodyPr wrap="square" rtlCol="0">
+            <a:spAutoFit/>
+          </a:bodyPr>
+          <a:lstStyle/>
+          <a:p>
+            <a:pPr marL="285750" indent="-285750">
+              <a:buFont typeface="Arial" pitchFamily="34" charset="0"/>
+              <a:buChar char="•"/>
+            </a:pPr>
+            <a:r>
+              <a:rPr lang="en-US" dirty="0" smtClean="0"/>
+              <a:t>Transform is 4x4 matrix representing a transformation in 3-space (translation, rotation, scaling)</a:t>
+            </a:r>
+            <a:endParaRPr lang="en-US" dirty="0" smtClean="0"/>
+          </a:p>
+        </p:txBody>
+      </p:sp>
+    </p:spTree>
+    <p:extLst>
+      <p:ext uri="{BB962C8B-B14F-4D97-AF65-F5344CB8AC3E}">
+        <p14:creationId xmlns:p14="http://schemas.microsoft.com/office/powerpoint/2010/main" val="874480236"/>
+      </p:ext>
+    </p:extLst>
+  </p:cSld>
+  <p:clrMapOvr>
+    <a:masterClrMapping/>
+  </p:clrMapOvr>
+  <mc:AlternateContent xmlns:mc="http://schemas.openxmlformats.org/markup-compatibility/2006" xmlns:p14="http://schemas.microsoft.com/office/powerpoint/2010/main">
+    <mc:Choice Requires="p14">
+      <p:transition spd="slow" p14:dur="2000" advTm="3263"/>
+    </mc:Choice>
+    <mc:Fallback xmlns="">
+      <p:transition spd="slow" advTm="3263"/>
+    </mc:Fallback>
+  </mc:AlternateContent>
+  <p:timing>
+    <p:tnLst>
+      <p:par>
+        <p:cTn id="1" dur="indefinite" restart="never" nodeType="tmRoot"/>
+      </p:par>
+    </p:tnLst>
+  </p:timing>
+</p:sld>
+</file>
+
+<file path=ppt/slides/slide3.xml><?xml version="1.0" encoding="utf-8"?>
+<p:sld xmlns:a="http://schemas.openxmlformats.org/drawingml/2006/main" xmlns:r="http://schemas.openxmlformats.org/officeDocument/2006/relationships" xmlns:p="http://schemas.openxmlformats.org/presentationml/2006/main">
+  <p:cSld>
+    <p:spTree>
+      <p:nvGrpSpPr>
+        <p:cNvPr id="1" name=""/>
+        <p:cNvGrpSpPr/>
+        <p:nvPr/>
+      </p:nvGrpSpPr>
+      <p:grpSpPr>
+        <a:xfrm>
+          <a:off x="0" y="0"/>
+          <a:ext cx="0" cy="0"/>
+          <a:chOff x="0" y="0"/>
+          <a:chExt cx="0" cy="0"/>
+        </a:xfrm>
+      </p:grpSpPr>
+      <p:sp>
+        <p:nvSpPr>
+          <p:cNvPr id="120" name="Title 1"/>
+          <p:cNvSpPr txBox="1">
+            <a:spLocks/>
+          </p:cNvSpPr>
+          <p:nvPr/>
+        </p:nvSpPr>
+        <p:spPr bwMode="auto">
+          <a:xfrm>
+            <a:off x="0" y="0"/>
+            <a:ext cx="9144000" cy="1035968"/>
+          </a:xfrm>
+          <a:prstGeom prst="rect">
+            <a:avLst/>
+          </a:prstGeom>
+          <a:noFill/>
+          <a:ln w="9525">
+            <a:noFill/>
+            <a:miter lim="800000"/>
+            <a:headEnd/>
+            <a:tailEnd/>
+          </a:ln>
+        </p:spPr>
+        <p:txBody>
+          <a:bodyPr vert="horz" wrap="square" lIns="91440" tIns="45720" rIns="91440" bIns="45720" numCol="1" anchor="ctr" anchorCtr="0" compatLnSpc="1">
+            <a:prstTxWarp prst="textNoShape">
+              <a:avLst/>
+            </a:prstTxWarp>
+          </a:bodyPr>
+          <a:lstStyle>
+            <a:lvl1pPr algn="ctr" rtl="0" eaLnBrk="0" fontAlgn="base" hangingPunct="0">
+              <a:spcBef>
+                <a:spcPct val="0"/>
+              </a:spcBef>
+              <a:spcAft>
+                <a:spcPct val="0"/>
+              </a:spcAft>
+              <a:defRPr sz="4400" kern="1200">
+                <a:solidFill>
+                  <a:schemeClr val="tx1"/>
+                </a:solidFill>
+                <a:latin typeface="+mj-lt"/>
+                <a:ea typeface="+mj-ea"/>
+                <a:cs typeface="+mj-cs"/>
+              </a:defRPr>
+            </a:lvl1pPr>
+            <a:lvl2pPr algn="ctr" rtl="0" eaLnBrk="0" fontAlgn="base" hangingPunct="0">
+              <a:spcBef>
+                <a:spcPct val="0"/>
+              </a:spcBef>
+              <a:spcAft>
+                <a:spcPct val="0"/>
+              </a:spcAft>
+              <a:defRPr sz="4400">
+                <a:solidFill>
+                  <a:schemeClr val="tx1"/>
+                </a:solidFill>
+                <a:latin typeface="Calibri" pitchFamily="34" charset="0"/>
+              </a:defRPr>
+            </a:lvl2pPr>
+            <a:lvl3pPr algn="ctr" rtl="0" eaLnBrk="0" fontAlgn="base" hangingPunct="0">
+              <a:spcBef>
+                <a:spcPct val="0"/>
+              </a:spcBef>
+              <a:spcAft>
+                <a:spcPct val="0"/>
+              </a:spcAft>
+              <a:defRPr sz="4400">
+                <a:solidFill>
+                  <a:schemeClr val="tx1"/>
+                </a:solidFill>
+                <a:latin typeface="Calibri" pitchFamily="34" charset="0"/>
+              </a:defRPr>
+            </a:lvl3pPr>
+            <a:lvl4pPr algn="ctr" rtl="0" eaLnBrk="0" fontAlgn="base" hangingPunct="0">
+              <a:spcBef>
+                <a:spcPct val="0"/>
+              </a:spcBef>
+              <a:spcAft>
+                <a:spcPct val="0"/>
+              </a:spcAft>
+              <a:defRPr sz="4400">
+                <a:solidFill>
+                  <a:schemeClr val="tx1"/>
+                </a:solidFill>
+                <a:latin typeface="Calibri" pitchFamily="34" charset="0"/>
+              </a:defRPr>
+            </a:lvl4pPr>
+            <a:lvl5pPr algn="ctr" rtl="0" eaLnBrk="0" fontAlgn="base" hangingPunct="0">
+              <a:spcBef>
+                <a:spcPct val="0"/>
+              </a:spcBef>
+              <a:spcAft>
+                <a:spcPct val="0"/>
+              </a:spcAft>
+              <a:defRPr sz="4400">
+                <a:solidFill>
+                  <a:schemeClr val="tx1"/>
+                </a:solidFill>
+                <a:latin typeface="Calibri" pitchFamily="34" charset="0"/>
+              </a:defRPr>
+            </a:lvl5pPr>
+            <a:lvl6pPr marL="457200" algn="ctr" rtl="0" fontAlgn="base">
+              <a:spcBef>
+                <a:spcPct val="0"/>
+              </a:spcBef>
+              <a:spcAft>
+                <a:spcPct val="0"/>
+              </a:spcAft>
+              <a:defRPr sz="4400">
+                <a:solidFill>
+                  <a:schemeClr val="tx1"/>
+                </a:solidFill>
+                <a:latin typeface="Calibri" pitchFamily="34" charset="0"/>
+              </a:defRPr>
+            </a:lvl6pPr>
+            <a:lvl7pPr marL="914400" algn="ctr" rtl="0" fontAlgn="base">
+              <a:spcBef>
+                <a:spcPct val="0"/>
+              </a:spcBef>
+              <a:spcAft>
+                <a:spcPct val="0"/>
+              </a:spcAft>
+              <a:defRPr sz="4400">
+                <a:solidFill>
+                  <a:schemeClr val="tx1"/>
+                </a:solidFill>
+                <a:latin typeface="Calibri" pitchFamily="34" charset="0"/>
+              </a:defRPr>
+            </a:lvl7pPr>
+            <a:lvl8pPr marL="1371600" algn="ctr" rtl="0" fontAlgn="base">
+              <a:spcBef>
+                <a:spcPct val="0"/>
+              </a:spcBef>
+              <a:spcAft>
+                <a:spcPct val="0"/>
+              </a:spcAft>
+              <a:defRPr sz="4400">
+                <a:solidFill>
+                  <a:schemeClr val="tx1"/>
+                </a:solidFill>
+                <a:latin typeface="Calibri" pitchFamily="34" charset="0"/>
+              </a:defRPr>
+            </a:lvl8pPr>
+            <a:lvl9pPr marL="1828800" algn="ctr" rtl="0" fontAlgn="base">
+              <a:spcBef>
+                <a:spcPct val="0"/>
+              </a:spcBef>
+              <a:spcAft>
+                <a:spcPct val="0"/>
+              </a:spcAft>
+              <a:defRPr sz="4400">
+                <a:solidFill>
+                  <a:schemeClr val="tx1"/>
+                </a:solidFill>
+                <a:latin typeface="Calibri" pitchFamily="34" charset="0"/>
+              </a:defRPr>
+            </a:lvl9pPr>
+          </a:lstStyle>
+          <a:p>
+            <a:r>
+              <a:rPr lang="en-CA" b="1" dirty="0">
+                <a:solidFill>
+                  <a:srgbClr val="800000"/>
+                </a:solidFill>
+              </a:rPr>
+              <a:t>System </a:t>
+            </a:r>
+            <a:r>
+              <a:rPr lang="en-CA" b="1" dirty="0" smtClean="0">
+                <a:solidFill>
+                  <a:srgbClr val="800000"/>
+                </a:solidFill>
+              </a:rPr>
+              <a:t>Overview</a:t>
+            </a:r>
+            <a:endParaRPr lang="en-CA" b="1" dirty="0">
+              <a:solidFill>
+                <a:srgbClr val="800000"/>
+              </a:solidFill>
+            </a:endParaRPr>
+          </a:p>
+        </p:txBody>
+      </p:sp>
+      <p:sp>
+        <p:nvSpPr>
+          <p:cNvPr id="4" name="Slide Number Placeholder 3"/>
+          <p:cNvSpPr>
+            <a:spLocks noGrp="1"/>
+          </p:cNvSpPr>
+          <p:nvPr>
+            <p:ph type="sldNum" sz="quarter" idx="10"/>
+          </p:nvPr>
+        </p:nvSpPr>
+        <p:spPr/>
+        <p:txBody>
+          <a:bodyPr/>
+          <a:lstStyle/>
+          <a:p>
+            <a:pPr algn="ctr">
+              <a:defRPr/>
+            </a:pPr>
+            <a:r>
+              <a:rPr lang="en-US" smtClean="0"/>
+              <a:t>- </a:t>
+            </a:r>
+            <a:fld id="{CF70E430-998E-4908-836F-E9BC2B613AC2}" type="slidenum">
+              <a:rPr lang="en-US" smtClean="0"/>
+              <a:pPr algn="ctr">
+                <a:defRPr/>
+              </a:pPr>
+              <a:t>3</a:t>
             </a:fld>
             <a:r>
               <a:rPr lang="en-US" smtClean="0"/>
@@ -3990,7 +5054,7 @@
     </p:spTree>
     <p:extLst>
       <p:ext uri="{BB962C8B-B14F-4D97-AF65-F5344CB8AC3E}">
-        <p14:creationId xmlns:p14="http://schemas.microsoft.com/office/powerpoint/2010/main" val="874480236"/>
+        <p14:creationId xmlns:p14="http://schemas.microsoft.com/office/powerpoint/2010/main" val="1185097687"/>
       </p:ext>
     </p:extLst>
   </p:cSld>
@@ -4015,7 +5079,7 @@
 </p:sld>
 </file>
 
-<file path=ppt/slides/slide3.xml><?xml version="1.0" encoding="utf-8"?>
+<file path=ppt/slides/slide4.xml><?xml version="1.0" encoding="utf-8"?>
 <p:sld xmlns:a="http://schemas.openxmlformats.org/drawingml/2006/main" xmlns:r="http://schemas.openxmlformats.org/officeDocument/2006/relationships" xmlns:p="http://schemas.openxmlformats.org/presentationml/2006/main">
   <p:cSld>
     <p:spTree>
@@ -4236,7 +5300,7 @@
               <a:pPr algn="ctr">
                 <a:defRPr/>
               </a:pPr>
-              <a:t>3</a:t>
+              <a:t>4</a:t>
             </a:fld>
             <a:r>
               <a:rPr lang="en-US" smtClean="0"/>
@@ -5236,7 +6300,7 @@
 </p:sld>
 </file>
 
-<file path=ppt/slides/slide4.xml><?xml version="1.0" encoding="utf-8"?>
+<file path=ppt/slides/slide5.xml><?xml version="1.0" encoding="utf-8"?>
 <p:sld xmlns:a="http://schemas.openxmlformats.org/drawingml/2006/main" xmlns:r="http://schemas.openxmlformats.org/officeDocument/2006/relationships" xmlns:p="http://schemas.openxmlformats.org/presentationml/2006/main">
   <p:cSld>
     <p:spTree>
@@ -5457,7 +6521,7 @@
               <a:pPr algn="ctr">
                 <a:defRPr/>
               </a:pPr>
-              <a:t>4</a:t>
+              <a:t>5</a:t>
             </a:fld>
             <a:r>
               <a:rPr lang="en-US" smtClean="0"/>
@@ -5560,6 +6624,19 @@
             <a:prstGeom prst="rect">
               <a:avLst/>
             </a:prstGeom>
+            <a:gradFill>
+              <a:gsLst>
+                <a:gs pos="0">
+                  <a:schemeClr val="accent5">
+                    <a:lumMod val="75000"/>
+                  </a:schemeClr>
+                </a:gs>
+                <a:gs pos="100000">
+                  <a:schemeClr val="accent3"/>
+                </a:gs>
+              </a:gsLst>
+              <a:lin ang="5400000" scaled="0"/>
+            </a:gradFill>
             <a:ln/>
           </p:spPr>
           <p:style>
@@ -5612,6 +6689,19 @@
           <a:prstGeom prst="rect">
             <a:avLst/>
           </a:prstGeom>
+          <a:gradFill>
+            <a:gsLst>
+              <a:gs pos="0">
+                <a:schemeClr val="accent5">
+                  <a:lumMod val="75000"/>
+                </a:schemeClr>
+              </a:gs>
+              <a:gs pos="100000">
+                <a:schemeClr val="accent3"/>
+              </a:gs>
+            </a:gsLst>
+            <a:lin ang="5400000" scaled="0"/>
+          </a:gradFill>
           <a:ln/>
         </p:spPr>
         <p:style>
@@ -6013,6 +7103,19 @@
           <a:prstGeom prst="rect">
             <a:avLst/>
           </a:prstGeom>
+          <a:gradFill>
+            <a:gsLst>
+              <a:gs pos="0">
+                <a:schemeClr val="accent5">
+                  <a:lumMod val="75000"/>
+                </a:schemeClr>
+              </a:gs>
+              <a:gs pos="100000">
+                <a:schemeClr val="accent3"/>
+              </a:gs>
+            </a:gsLst>
+            <a:lin ang="5400000" scaled="0"/>
+          </a:gradFill>
           <a:ln/>
         </p:spPr>
         <p:style>
@@ -6103,6 +7206,19 @@
           <a:prstGeom prst="rect">
             <a:avLst/>
           </a:prstGeom>
+          <a:gradFill>
+            <a:gsLst>
+              <a:gs pos="0">
+                <a:schemeClr val="accent5">
+                  <a:lumMod val="75000"/>
+                </a:schemeClr>
+              </a:gs>
+              <a:gs pos="100000">
+                <a:schemeClr val="accent3"/>
+              </a:gs>
+            </a:gsLst>
+            <a:lin ang="5400000" scaled="0"/>
+          </a:gradFill>
           <a:ln/>
         </p:spPr>
         <p:style>
@@ -6201,6 +7317,19 @@
           <a:prstGeom prst="rect">
             <a:avLst/>
           </a:prstGeom>
+          <a:gradFill>
+            <a:gsLst>
+              <a:gs pos="0">
+                <a:schemeClr val="accent5">
+                  <a:lumMod val="75000"/>
+                </a:schemeClr>
+              </a:gs>
+              <a:gs pos="100000">
+                <a:schemeClr val="accent3"/>
+              </a:gs>
+            </a:gsLst>
+            <a:lin ang="5400000" scaled="0"/>
+          </a:gradFill>
           <a:ln/>
         </p:spPr>
         <p:style>
@@ -6260,6 +7389,19 @@
           <a:prstGeom prst="rect">
             <a:avLst/>
           </a:prstGeom>
+          <a:gradFill>
+            <a:gsLst>
+              <a:gs pos="0">
+                <a:schemeClr val="accent5">
+                  <a:lumMod val="75000"/>
+                </a:schemeClr>
+              </a:gs>
+              <a:gs pos="100000">
+                <a:schemeClr val="accent3"/>
+              </a:gs>
+            </a:gsLst>
+            <a:lin ang="5400000" scaled="0"/>
+          </a:gradFill>
           <a:ln/>
         </p:spPr>
         <p:style>
@@ -6466,7 +7608,9 @@
             <a:avLst/>
           </a:prstGeom>
           <a:solidFill>
-            <a:srgbClr val="33889F"/>
+            <a:schemeClr val="accent5">
+              <a:lumMod val="75000"/>
+            </a:schemeClr>
           </a:solidFill>
           <a:ln/>
         </p:spPr>
@@ -6650,7 +7794,7 @@
 </p:sld>
 </file>
 
-<file path=ppt/slides/slide5.xml><?xml version="1.0" encoding="utf-8"?>
+<file path=ppt/slides/slide6.xml><?xml version="1.0" encoding="utf-8"?>
 <p:sld xmlns:a="http://schemas.openxmlformats.org/drawingml/2006/main" xmlns:r="http://schemas.openxmlformats.org/officeDocument/2006/relationships" xmlns:p="http://schemas.openxmlformats.org/presentationml/2006/main">
   <p:cSld>
     <p:spTree>
@@ -6871,7 +8015,7 @@
               <a:pPr algn="ctr">
                 <a:defRPr/>
               </a:pPr>
-              <a:t>5</a:t>
+              <a:t>6</a:t>
             </a:fld>
             <a:r>
               <a:rPr lang="en-US" smtClean="0"/>
@@ -6937,7 +8081,6 @@
               <a:rPr lang="en-US" sz="2400" dirty="0" smtClean="0"/>
               <a:t>Linking input &amp; output via channels</a:t>
             </a:r>
-            <a:endParaRPr lang="en-US" sz="2400" dirty="0" smtClean="0"/>
           </a:p>
           <a:p>
             <a:pPr marL="742950" lvl="1" indent="-285750">

</xml_diff>

<commit_message>
re #712 modifying overview to include key architecture slides
git-svn-id: https://subversion.assembla.com/svn/plus/trunk/doc@2733 c04e96f8-ac36-4ff2-8b34-4a5e34ef045f
</commit_message>
<xml_diff>
--- a/overview/PlusArchitectureOverview.pptx
+++ b/overview/PlusArchitectureOverview.pptx
@@ -10,7 +10,7 @@
   <p:sldIdLst>
     <p:sldId id="256" r:id="rId2"/>
     <p:sldId id="418" r:id="rId3"/>
-    <p:sldId id="422" r:id="rId4"/>
+    <p:sldId id="423" r:id="rId4"/>
     <p:sldId id="419" r:id="rId5"/>
     <p:sldId id="420" r:id="rId6"/>
     <p:sldId id="421" r:id="rId7"/>
@@ -3068,7 +3068,6 @@
               <a:rPr lang="en-US" sz="2400" dirty="0" smtClean="0"/>
               <a:t>XML tag is an entry in an XML file: &lt;Unicorn/&gt;</a:t>
             </a:r>
-            <a:endParaRPr lang="en-US" sz="2400" dirty="0" smtClean="0"/>
           </a:p>
           <a:p>
             <a:pPr marL="285750" indent="-285750">
@@ -3103,7 +3102,6 @@
               <a:rPr lang="en-US" sz="2400" dirty="0" smtClean="0"/>
               <a:t>=12 /&gt;</a:t>
             </a:r>
-            <a:endParaRPr lang="en-US" sz="2400" dirty="0" smtClean="0"/>
           </a:p>
         </p:txBody>
       </p:sp>
@@ -3137,7 +3135,6 @@
               <a:rPr lang="en-US" dirty="0" smtClean="0"/>
               <a:t>Device (hardware) is any physical or virtual device</a:t>
             </a:r>
-            <a:endParaRPr lang="en-US" dirty="0" smtClean="0"/>
           </a:p>
         </p:txBody>
       </p:sp>
@@ -3403,7 +3400,6 @@
               <a:rPr lang="en-US" dirty="0" smtClean="0"/>
               <a:t>Transform is 4x4 matrix representing a transformation in 3-space (translation, rotation, scaling)</a:t>
             </a:r>
-            <a:endParaRPr lang="en-US" dirty="0" smtClean="0"/>
           </a:p>
         </p:txBody>
       </p:sp>
@@ -3463,7 +3459,7 @@
         <p:spPr bwMode="auto">
           <a:xfrm>
             <a:off x="0" y="0"/>
-            <a:ext cx="9144000" cy="1035968"/>
+            <a:ext cx="7812359" cy="1035968"/>
           </a:xfrm>
           <a:prstGeom prst="rect">
             <a:avLst/>
@@ -3614,12 +3610,12 @@
           </a:lstStyle>
           <a:p>
             <a:r>
-              <a:rPr lang="en-CA" b="1" dirty="0">
+              <a:rPr lang="en-CA" b="1" dirty="0" smtClean="0">
                 <a:solidFill>
                   <a:srgbClr val="800000"/>
                 </a:solidFill>
               </a:rPr>
-              <a:t>System </a:t>
+              <a:t>PLUS </a:t>
             </a:r>
             <a:r>
               <a:rPr lang="en-CA" b="1" dirty="0" smtClean="0">
@@ -3627,7 +3623,7 @@
                   <a:srgbClr val="800000"/>
                 </a:solidFill>
               </a:rPr>
-              <a:t>Overview</a:t>
+              <a:t>Architecture Overview</a:t>
             </a:r>
             <a:endParaRPr lang="en-CA" b="1" dirty="0">
               <a:solidFill>
@@ -3708,141 +3704,12 @@
         </p:nvGrpSpPr>
         <p:grpSpPr>
           <a:xfrm>
-            <a:off x="413610" y="1068660"/>
-            <a:ext cx="8334854" cy="5240660"/>
-            <a:chOff x="449201" y="751855"/>
-            <a:chExt cx="8334854" cy="5872452"/>
+            <a:off x="413610" y="1088491"/>
+            <a:ext cx="8308503" cy="4618425"/>
+            <a:chOff x="449201" y="774077"/>
+            <a:chExt cx="8308503" cy="5175203"/>
           </a:xfrm>
         </p:grpSpPr>
-        <p:sp>
-          <p:nvSpPr>
-            <p:cNvPr id="115" name="Rectangle 114"/>
-            <p:cNvSpPr/>
-            <p:nvPr/>
-          </p:nvSpPr>
-          <p:spPr>
-            <a:xfrm>
-              <a:off x="3680727" y="6309320"/>
-              <a:ext cx="1574936" cy="314987"/>
-            </a:xfrm>
-            <a:prstGeom prst="rect">
-              <a:avLst/>
-            </a:prstGeom>
-            <a:ln/>
-          </p:spPr>
-          <p:style>
-            <a:lnRef idx="3">
-              <a:schemeClr val="lt1"/>
-            </a:lnRef>
-            <a:fillRef idx="1">
-              <a:schemeClr val="accent5"/>
-            </a:fillRef>
-            <a:effectRef idx="1">
-              <a:schemeClr val="accent5"/>
-            </a:effectRef>
-            <a:fontRef idx="minor">
-              <a:schemeClr val="lt1"/>
-            </a:fontRef>
-          </p:style>
-          <p:txBody>
-            <a:bodyPr rtlCol="0" anchor="ctr"/>
-            <a:lstStyle/>
-            <a:p>
-              <a:pPr algn="ctr"/>
-              <a:r>
-                <a:rPr lang="en-CA" sz="1200" b="1" dirty="0" smtClean="0">
-                  <a:solidFill>
-                    <a:schemeClr val="bg1"/>
-                  </a:solidFill>
-                </a:rPr>
-                <a:t>Custom phantoms</a:t>
-              </a:r>
-              <a:endParaRPr lang="en-CA" sz="1200" b="1" dirty="0">
-                <a:solidFill>
-                  <a:schemeClr val="bg1"/>
-                </a:solidFill>
-              </a:endParaRPr>
-            </a:p>
-          </p:txBody>
-        </p:sp>
-        <p:cxnSp>
-          <p:nvCxnSpPr>
-            <p:cNvPr id="116" name="Straight Connector 115"/>
-            <p:cNvCxnSpPr>
-              <a:stCxn id="115" idx="0"/>
-              <a:endCxn id="74" idx="2"/>
-            </p:cNvCxnSpPr>
-            <p:nvPr/>
-          </p:nvCxnSpPr>
-          <p:spPr>
-            <a:xfrm flipH="1" flipV="1">
-              <a:off x="3415087" y="5949281"/>
-              <a:ext cx="1053108" cy="360039"/>
-            </a:xfrm>
-            <a:prstGeom prst="line">
-              <a:avLst/>
-            </a:prstGeom>
-            <a:ln w="31750">
-              <a:solidFill>
-                <a:schemeClr val="tx1"/>
-              </a:solidFill>
-              <a:prstDash val="solid"/>
-            </a:ln>
-          </p:spPr>
-          <p:style>
-            <a:lnRef idx="1">
-              <a:schemeClr val="accent1"/>
-            </a:lnRef>
-            <a:fillRef idx="0">
-              <a:schemeClr val="accent1"/>
-            </a:fillRef>
-            <a:effectRef idx="0">
-              <a:schemeClr val="accent1"/>
-            </a:effectRef>
-            <a:fontRef idx="minor">
-              <a:schemeClr val="tx1"/>
-            </a:fontRef>
-          </p:style>
-        </p:cxnSp>
-        <p:cxnSp>
-          <p:nvCxnSpPr>
-            <p:cNvPr id="118" name="Straight Connector 117"/>
-            <p:cNvCxnSpPr>
-              <a:stCxn id="115" idx="0"/>
-              <a:endCxn id="76" idx="2"/>
-            </p:cNvCxnSpPr>
-            <p:nvPr/>
-          </p:nvCxnSpPr>
-          <p:spPr>
-            <a:xfrm flipV="1">
-              <a:off x="4468195" y="5949280"/>
-              <a:ext cx="1017449" cy="360040"/>
-            </a:xfrm>
-            <a:prstGeom prst="line">
-              <a:avLst/>
-            </a:prstGeom>
-            <a:ln w="31750">
-              <a:solidFill>
-                <a:schemeClr val="tx1"/>
-              </a:solidFill>
-              <a:prstDash val="solid"/>
-            </a:ln>
-          </p:spPr>
-          <p:style>
-            <a:lnRef idx="1">
-              <a:schemeClr val="accent1"/>
-            </a:lnRef>
-            <a:fillRef idx="0">
-              <a:schemeClr val="accent1"/>
-            </a:fillRef>
-            <a:effectRef idx="0">
-              <a:schemeClr val="accent1"/>
-            </a:effectRef>
-            <a:fontRef idx="minor">
-              <a:schemeClr val="tx1"/>
-            </a:fontRef>
-          </p:style>
-        </p:cxnSp>
         <p:sp>
           <p:nvSpPr>
             <p:cNvPr id="70" name="Rectangle 69"/>
@@ -4033,8 +3900,8 @@
           </p:nvCxnSpPr>
           <p:spPr>
             <a:xfrm flipH="1">
-              <a:off x="3415087" y="5024915"/>
-              <a:ext cx="1040336" cy="606559"/>
+              <a:off x="3415087" y="4948319"/>
+              <a:ext cx="1040336" cy="683155"/>
             </a:xfrm>
             <a:prstGeom prst="line">
               <a:avLst/>
@@ -4072,8 +3939,8 @@
           </p:nvCxnSpPr>
           <p:spPr>
             <a:xfrm>
-              <a:off x="4455423" y="5024915"/>
-              <a:ext cx="1030221" cy="609377"/>
+              <a:off x="4455423" y="4948319"/>
+              <a:ext cx="1030221" cy="685974"/>
             </a:xfrm>
             <a:prstGeom prst="line">
               <a:avLst/>
@@ -4162,8 +4029,8 @@
           </p:nvSpPr>
           <p:spPr>
             <a:xfrm>
-              <a:off x="586150" y="4683679"/>
-              <a:ext cx="1757276" cy="310393"/>
+              <a:off x="1151207" y="4122949"/>
+              <a:ext cx="610295" cy="310393"/>
             </a:xfrm>
             <a:prstGeom prst="rect">
               <a:avLst/>
@@ -4179,7 +4046,7 @@
               <a:pPr algn="r"/>
               <a:r>
                 <a:rPr lang="en-CA" sz="1200" b="1" dirty="0" smtClean="0"/>
-                <a:t>Device Abstraction Layer</a:t>
+                <a:t>Device</a:t>
               </a:r>
               <a:endParaRPr lang="en-CA" sz="1200" b="1" dirty="0"/>
             </a:p>
@@ -4250,173 +4117,13 @@
         </p:sp>
         <p:sp>
           <p:nvSpPr>
-            <p:cNvPr id="111" name="Rectangle 110"/>
-            <p:cNvSpPr/>
-            <p:nvPr/>
-          </p:nvSpPr>
-          <p:spPr>
-            <a:xfrm>
-              <a:off x="7537154" y="774077"/>
-              <a:ext cx="1240058" cy="569114"/>
-            </a:xfrm>
-            <a:prstGeom prst="rect">
-              <a:avLst/>
-            </a:prstGeom>
-            <a:ln/>
-          </p:spPr>
-          <p:style>
-            <a:lnRef idx="3">
-              <a:schemeClr val="lt1"/>
-            </a:lnRef>
-            <a:fillRef idx="1">
-              <a:schemeClr val="accent5"/>
-            </a:fillRef>
-            <a:effectRef idx="1">
-              <a:schemeClr val="accent5"/>
-            </a:effectRef>
-            <a:fontRef idx="minor">
-              <a:schemeClr val="lt1"/>
-            </a:fontRef>
-          </p:style>
-          <p:txBody>
-            <a:bodyPr rtlCol="0" anchor="ctr"/>
-            <a:lstStyle/>
-            <a:p>
-              <a:pPr algn="ctr"/>
-              <a:endParaRPr lang="en-CA" sz="1200" i="1" dirty="0"/>
-            </a:p>
-          </p:txBody>
-        </p:sp>
-        <p:sp>
-          <p:nvSpPr>
-            <p:cNvPr id="112" name="TextBox 111"/>
-            <p:cNvSpPr txBox="1"/>
-            <p:nvPr/>
-          </p:nvSpPr>
-          <p:spPr>
-            <a:xfrm>
-              <a:off x="7524328" y="751855"/>
-              <a:ext cx="1246902" cy="517321"/>
-            </a:xfrm>
-            <a:prstGeom prst="rect">
-              <a:avLst/>
-            </a:prstGeom>
-            <a:noFill/>
-          </p:spPr>
-          <p:txBody>
-            <a:bodyPr wrap="square" rtlCol="0">
-              <a:spAutoFit/>
-            </a:bodyPr>
-            <a:lstStyle/>
-            <a:p>
-              <a:pPr algn="ctr"/>
-              <a:r>
-                <a:rPr lang="en-CA" sz="1200" b="1" i="1" dirty="0" smtClean="0">
-                  <a:solidFill>
-                    <a:schemeClr val="bg1"/>
-                  </a:solidFill>
-                </a:rPr>
-                <a:t>Developed in the Perk Lab</a:t>
-              </a:r>
-              <a:endParaRPr lang="en-CA" sz="1200" b="1" i="1" dirty="0">
-                <a:solidFill>
-                  <a:schemeClr val="bg1"/>
-                </a:solidFill>
-              </a:endParaRPr>
-            </a:p>
-          </p:txBody>
-        </p:sp>
-        <p:sp>
-          <p:nvSpPr>
-            <p:cNvPr id="113" name="Rectangle 112"/>
-            <p:cNvSpPr/>
-            <p:nvPr/>
-          </p:nvSpPr>
-          <p:spPr>
-            <a:xfrm>
-              <a:off x="7537153" y="1285528"/>
-              <a:ext cx="1246902" cy="497922"/>
-            </a:xfrm>
-            <a:prstGeom prst="rect">
-              <a:avLst/>
-            </a:prstGeom>
-            <a:ln/>
-          </p:spPr>
-          <p:style>
-            <a:lnRef idx="3">
-              <a:schemeClr val="lt1"/>
-            </a:lnRef>
-            <a:fillRef idx="1">
-              <a:schemeClr val="accent3"/>
-            </a:fillRef>
-            <a:effectRef idx="1">
-              <a:schemeClr val="accent3"/>
-            </a:effectRef>
-            <a:fontRef idx="minor">
-              <a:schemeClr val="lt1"/>
-            </a:fontRef>
-          </p:style>
-          <p:txBody>
-            <a:bodyPr rtlCol="0" anchor="ctr"/>
-            <a:lstStyle/>
-            <a:p>
-              <a:pPr algn="ctr"/>
-              <a:endParaRPr lang="en-CA" sz="1200" dirty="0">
-                <a:solidFill>
-                  <a:schemeClr val="bg1"/>
-                </a:solidFill>
-              </a:endParaRPr>
-            </a:p>
-          </p:txBody>
-        </p:sp>
-        <p:sp>
-          <p:nvSpPr>
-            <p:cNvPr id="114" name="TextBox 113"/>
-            <p:cNvSpPr txBox="1"/>
-            <p:nvPr/>
-          </p:nvSpPr>
-          <p:spPr>
-            <a:xfrm>
-              <a:off x="7545192" y="1285528"/>
-              <a:ext cx="1238863" cy="461665"/>
-            </a:xfrm>
-            <a:prstGeom prst="rect">
-              <a:avLst/>
-            </a:prstGeom>
-            <a:noFill/>
-          </p:spPr>
-          <p:txBody>
-            <a:bodyPr wrap="square" rtlCol="0">
-              <a:spAutoFit/>
-            </a:bodyPr>
-            <a:lstStyle/>
-            <a:p>
-              <a:pPr algn="ctr"/>
-              <a:r>
-                <a:rPr lang="en-CA" sz="1200" b="1" i="1" dirty="0" smtClean="0">
-                  <a:solidFill>
-                    <a:schemeClr val="bg1"/>
-                  </a:solidFill>
-                </a:rPr>
-                <a:t>Developed by collaborators</a:t>
-              </a:r>
-              <a:endParaRPr lang="en-CA" sz="1200" b="1" i="1" dirty="0">
-                <a:solidFill>
-                  <a:schemeClr val="bg1"/>
-                </a:solidFill>
-              </a:endParaRPr>
-            </a:p>
-          </p:txBody>
-        </p:sp>
-        <p:sp>
-          <p:nvSpPr>
             <p:cNvPr id="72" name="Rectangle 71"/>
             <p:cNvSpPr/>
             <p:nvPr/>
           </p:nvSpPr>
           <p:spPr>
             <a:xfrm>
-              <a:off x="3799199" y="4683679"/>
+              <a:off x="3799199" y="4607083"/>
               <a:ext cx="1312448" cy="341236"/>
             </a:xfrm>
             <a:prstGeom prst="rect">
@@ -4452,7 +4159,7 @@
                     <a:schemeClr val="bg1"/>
                   </a:solidFill>
                 </a:rPr>
-                <a:t>Device interface</a:t>
+                <a:t>Interface</a:t>
               </a:r>
               <a:endParaRPr lang="en-CA" sz="1200" b="1" dirty="0">
                 <a:solidFill>
@@ -4859,70 +4566,6 @@
           </a:fontRef>
         </p:style>
       </p:cxnSp>
-      <p:cxnSp>
-        <p:nvCxnSpPr>
-          <p:cNvPr id="127" name="Straight Connector 126"/>
-          <p:cNvCxnSpPr/>
-          <p:nvPr/>
-        </p:nvCxnSpPr>
-        <p:spPr>
-          <a:xfrm>
-            <a:off x="539552" y="4437112"/>
-            <a:ext cx="8212075" cy="0"/>
-          </a:xfrm>
-          <a:prstGeom prst="line">
-            <a:avLst/>
-          </a:prstGeom>
-          <a:ln w="28575">
-            <a:prstDash val="lgDash"/>
-          </a:ln>
-        </p:spPr>
-        <p:style>
-          <a:lnRef idx="1">
-            <a:schemeClr val="accent1"/>
-          </a:lnRef>
-          <a:fillRef idx="0">
-            <a:schemeClr val="accent1"/>
-          </a:fillRef>
-          <a:effectRef idx="0">
-            <a:schemeClr val="accent1"/>
-          </a:effectRef>
-          <a:fontRef idx="minor">
-            <a:schemeClr val="tx1"/>
-          </a:fontRef>
-        </p:style>
-      </p:cxnSp>
-      <p:sp>
-        <p:nvSpPr>
-          <p:cNvPr id="128" name="TextBox 127"/>
-          <p:cNvSpPr txBox="1"/>
-          <p:nvPr/>
-        </p:nvSpPr>
-        <p:spPr>
-          <a:xfrm>
-            <a:off x="816657" y="3645024"/>
-            <a:ext cx="1225079" cy="276999"/>
-          </a:xfrm>
-          <a:prstGeom prst="rect">
-            <a:avLst/>
-          </a:prstGeom>
-          <a:noFill/>
-        </p:spPr>
-        <p:txBody>
-          <a:bodyPr wrap="none" rtlCol="0">
-            <a:spAutoFit/>
-          </a:bodyPr>
-          <a:lstStyle/>
-          <a:p>
-            <a:pPr algn="r"/>
-            <a:r>
-              <a:rPr lang="en-CA" sz="1200" b="1" dirty="0" smtClean="0"/>
-              <a:t>Data Production</a:t>
-            </a:r>
-            <a:endParaRPr lang="en-CA" sz="1200" b="1" dirty="0"/>
-          </a:p>
-        </p:txBody>
-      </p:sp>
       <p:sp>
         <p:nvSpPr>
           <p:cNvPr id="129" name="Rectangle 128"/>
@@ -4931,8 +4574,8 @@
         </p:nvSpPr>
         <p:spPr>
           <a:xfrm>
-            <a:off x="3876693" y="3501008"/>
-            <a:ext cx="1055347" cy="265791"/>
+            <a:off x="3786692" y="3501008"/>
+            <a:ext cx="1289363" cy="337799"/>
           </a:xfrm>
           <a:prstGeom prst="rect">
             <a:avLst/>
@@ -4980,8 +4623,8 @@
         </p:nvSpPr>
         <p:spPr>
           <a:xfrm>
-            <a:off x="3876693" y="4005064"/>
-            <a:ext cx="1055347" cy="265791"/>
+            <a:off x="3786692" y="4027305"/>
+            <a:ext cx="1289363" cy="308027"/>
           </a:xfrm>
           <a:prstGeom prst="rect">
             <a:avLst/>
@@ -5051,10 +4694,170 @@
           </a:p>
         </p:txBody>
       </p:sp>
+      <p:sp>
+        <p:nvSpPr>
+          <p:cNvPr id="48" name="Rectangle 47"/>
+          <p:cNvSpPr/>
+          <p:nvPr/>
+        </p:nvSpPr>
+        <p:spPr>
+          <a:xfrm>
+            <a:off x="7501563" y="1088491"/>
+            <a:ext cx="1240058" cy="507885"/>
+          </a:xfrm>
+          <a:prstGeom prst="rect">
+            <a:avLst/>
+          </a:prstGeom>
+          <a:ln/>
+        </p:spPr>
+        <p:style>
+          <a:lnRef idx="3">
+            <a:schemeClr val="lt1"/>
+          </a:lnRef>
+          <a:fillRef idx="1">
+            <a:schemeClr val="accent5"/>
+          </a:fillRef>
+          <a:effectRef idx="1">
+            <a:schemeClr val="accent5"/>
+          </a:effectRef>
+          <a:fontRef idx="minor">
+            <a:schemeClr val="lt1"/>
+          </a:fontRef>
+        </p:style>
+        <p:txBody>
+          <a:bodyPr rtlCol="0" anchor="ctr"/>
+          <a:lstStyle/>
+          <a:p>
+            <a:pPr algn="ctr"/>
+            <a:endParaRPr lang="en-CA" sz="1200" i="1" dirty="0"/>
+          </a:p>
+        </p:txBody>
+      </p:sp>
+      <p:sp>
+        <p:nvSpPr>
+          <p:cNvPr id="49" name="TextBox 48"/>
+          <p:cNvSpPr txBox="1"/>
+          <p:nvPr/>
+        </p:nvSpPr>
+        <p:spPr>
+          <a:xfrm>
+            <a:off x="7488737" y="1068660"/>
+            <a:ext cx="1246902" cy="461665"/>
+          </a:xfrm>
+          <a:prstGeom prst="rect">
+            <a:avLst/>
+          </a:prstGeom>
+          <a:noFill/>
+        </p:spPr>
+        <p:txBody>
+          <a:bodyPr wrap="square" rtlCol="0">
+            <a:spAutoFit/>
+          </a:bodyPr>
+          <a:lstStyle/>
+          <a:p>
+            <a:pPr algn="ctr"/>
+            <a:r>
+              <a:rPr lang="en-CA" sz="1200" b="1" i="1" dirty="0" smtClean="0">
+                <a:solidFill>
+                  <a:schemeClr val="bg1"/>
+                </a:solidFill>
+              </a:rPr>
+              <a:t>Developed in the Perk Lab</a:t>
+            </a:r>
+            <a:endParaRPr lang="en-CA" sz="1200" b="1" i="1" dirty="0">
+              <a:solidFill>
+                <a:schemeClr val="bg1"/>
+              </a:solidFill>
+            </a:endParaRPr>
+          </a:p>
+        </p:txBody>
+      </p:sp>
+      <p:sp>
+        <p:nvSpPr>
+          <p:cNvPr id="36" name="Rectangle 35"/>
+          <p:cNvSpPr/>
+          <p:nvPr/>
+        </p:nvSpPr>
+        <p:spPr>
+          <a:xfrm>
+            <a:off x="7501562" y="1544917"/>
+            <a:ext cx="1246902" cy="444353"/>
+          </a:xfrm>
+          <a:prstGeom prst="rect">
+            <a:avLst/>
+          </a:prstGeom>
+          <a:ln/>
+        </p:spPr>
+        <p:style>
+          <a:lnRef idx="3">
+            <a:schemeClr val="lt1"/>
+          </a:lnRef>
+          <a:fillRef idx="1">
+            <a:schemeClr val="accent3"/>
+          </a:fillRef>
+          <a:effectRef idx="1">
+            <a:schemeClr val="accent3"/>
+          </a:effectRef>
+          <a:fontRef idx="minor">
+            <a:schemeClr val="lt1"/>
+          </a:fontRef>
+        </p:style>
+        <p:txBody>
+          <a:bodyPr rtlCol="0" anchor="ctr"/>
+          <a:lstStyle/>
+          <a:p>
+            <a:pPr algn="ctr"/>
+            <a:endParaRPr lang="en-CA" sz="1200" dirty="0">
+              <a:solidFill>
+                <a:schemeClr val="bg1"/>
+              </a:solidFill>
+            </a:endParaRPr>
+          </a:p>
+        </p:txBody>
+      </p:sp>
+      <p:sp>
+        <p:nvSpPr>
+          <p:cNvPr id="37" name="TextBox 36"/>
+          <p:cNvSpPr txBox="1"/>
+          <p:nvPr/>
+        </p:nvSpPr>
+        <p:spPr>
+          <a:xfrm>
+            <a:off x="7524328" y="1544917"/>
+            <a:ext cx="1238863" cy="411996"/>
+          </a:xfrm>
+          <a:prstGeom prst="rect">
+            <a:avLst/>
+          </a:prstGeom>
+          <a:noFill/>
+        </p:spPr>
+        <p:txBody>
+          <a:bodyPr wrap="square" rtlCol="0">
+            <a:spAutoFit/>
+          </a:bodyPr>
+          <a:lstStyle/>
+          <a:p>
+            <a:pPr algn="ctr"/>
+            <a:r>
+              <a:rPr lang="en-CA" sz="1200" b="1" i="1" dirty="0" smtClean="0">
+                <a:solidFill>
+                  <a:schemeClr val="bg1"/>
+                </a:solidFill>
+              </a:rPr>
+              <a:t>Developed by collaborators</a:t>
+            </a:r>
+            <a:endParaRPr lang="en-CA" sz="1200" b="1" i="1" dirty="0">
+              <a:solidFill>
+                <a:schemeClr val="bg1"/>
+              </a:solidFill>
+            </a:endParaRPr>
+          </a:p>
+        </p:txBody>
+      </p:sp>
     </p:spTree>
     <p:extLst>
       <p:ext uri="{BB962C8B-B14F-4D97-AF65-F5344CB8AC3E}">
-        <p14:creationId xmlns:p14="http://schemas.microsoft.com/office/powerpoint/2010/main" val="1185097687"/>
+        <p14:creationId xmlns:p14="http://schemas.microsoft.com/office/powerpoint/2010/main" val="458573308"/>
       </p:ext>
     </p:extLst>
   </p:cSld>

</xml_diff>

<commit_message>
re #712 refinements to architecture overview
git-svn-id: https://subversion.assembla.com/svn/plus/trunk/doc@2738 c04e96f8-ac36-4ff2-8b34-4a5e34ef045f
</commit_message>
<xml_diff>
--- a/overview/PlusArchitectureOverview.pptx
+++ b/overview/PlusArchitectureOverview.pptx
@@ -604,7 +604,20 @@
           <a:bodyPr/>
           <a:lstStyle/>
           <a:p>
-            <a:endParaRPr lang="en-US" dirty="0"/>
+            <a:r>
+              <a:rPr lang="en-US" dirty="0" smtClean="0"/>
+              <a:t>This shows a layered approach</a:t>
+            </a:r>
+            <a:r>
+              <a:rPr lang="en-US" baseline="0" dirty="0" smtClean="0"/>
+              <a:t> to what depends on what</a:t>
+            </a:r>
+          </a:p>
+          <a:p>
+            <a:r>
+              <a:rPr lang="en-US" baseline="0" dirty="0" smtClean="0"/>
+              <a:t>SDK – software development kit, functions to interact with a specific piece of hardware</a:t>
+            </a:r>
           </a:p>
         </p:txBody>
       </p:sp>
@@ -784,6 +797,20 @@
           <a:bodyPr/>
           <a:lstStyle/>
           <a:p>
+            <a:r>
+              <a:rPr lang="en-US" dirty="0" smtClean="0"/>
+              <a:t>Explain what a mixer device is</a:t>
+            </a:r>
+          </a:p>
+          <a:p>
+            <a:r>
+              <a:rPr lang="en-US" dirty="0" smtClean="0"/>
+              <a:t>Explain</a:t>
+            </a:r>
+            <a:r>
+              <a:rPr lang="en-US" baseline="0" dirty="0" smtClean="0"/>
+              <a:t> what a capture device is</a:t>
+            </a:r>
             <a:endParaRPr lang="en-US" dirty="0"/>
           </a:p>
         </p:txBody>
@@ -874,6 +901,22 @@
           <a:bodyPr/>
           <a:lstStyle/>
           <a:p>
+            <a:r>
+              <a:rPr lang="en-US" dirty="0" smtClean="0"/>
+              <a:t>Emphasize</a:t>
+            </a:r>
+            <a:r>
+              <a:rPr lang="en-US" baseline="0" dirty="0" smtClean="0"/>
+              <a:t> the linkage by ID, give them a basis to understand other </a:t>
+            </a:r>
+            <a:r>
+              <a:rPr lang="en-US" baseline="0" dirty="0" err="1" smtClean="0"/>
+              <a:t>config</a:t>
+            </a:r>
+            <a:r>
+              <a:rPr lang="en-US" baseline="0" dirty="0" smtClean="0"/>
+              <a:t> files</a:t>
+            </a:r>
             <a:endParaRPr lang="en-US" dirty="0"/>
           </a:p>
         </p:txBody>
@@ -3744,7 +3787,7 @@
         <p:spPr bwMode="auto">
           <a:xfrm>
             <a:off x="0" y="0"/>
-            <a:ext cx="7812359" cy="1035968"/>
+            <a:ext cx="9144000" cy="1035968"/>
           </a:xfrm>
           <a:prstGeom prst="rect">
             <a:avLst/>
@@ -3981,10 +4024,10 @@
         </p:nvGrpSpPr>
         <p:grpSpPr>
           <a:xfrm>
-            <a:off x="413610" y="1088491"/>
-            <a:ext cx="8308503" cy="4618425"/>
-            <a:chOff x="449201" y="774077"/>
-            <a:chExt cx="8308503" cy="5175203"/>
+            <a:off x="1115616" y="1035969"/>
+            <a:ext cx="5437017" cy="4913311"/>
+            <a:chOff x="1151207" y="443641"/>
+            <a:chExt cx="5437017" cy="5505639"/>
           </a:xfrm>
         </p:grpSpPr>
         <p:sp>
@@ -3995,8 +4038,8 @@
           </p:nvSpPr>
           <p:spPr>
             <a:xfrm>
-              <a:off x="2375343" y="774077"/>
-              <a:ext cx="4212881" cy="4437413"/>
+              <a:off x="2375343" y="443641"/>
+              <a:ext cx="4212881" cy="4767851"/>
             </a:xfrm>
             <a:prstGeom prst="rect">
               <a:avLst/>
@@ -4028,103 +4071,14 @@
         </p:sp>
         <p:sp>
           <p:nvSpPr>
-            <p:cNvPr id="71" name="TextBox 70"/>
-            <p:cNvSpPr txBox="1"/>
-            <p:nvPr/>
-          </p:nvSpPr>
-          <p:spPr>
-            <a:xfrm>
-              <a:off x="449201" y="5445547"/>
-              <a:ext cx="867545" cy="276999"/>
-            </a:xfrm>
-            <a:prstGeom prst="rect">
-              <a:avLst/>
-            </a:prstGeom>
-            <a:noFill/>
-          </p:spPr>
-          <p:txBody>
-            <a:bodyPr wrap="none" rtlCol="0">
-              <a:spAutoFit/>
-            </a:bodyPr>
-            <a:lstStyle/>
-            <a:p>
-              <a:r>
-                <a:rPr lang="en-CA" sz="1200" b="1" dirty="0" smtClean="0"/>
-                <a:t>hardware</a:t>
-              </a:r>
-              <a:endParaRPr lang="en-CA" sz="1200" b="1" dirty="0"/>
-            </a:p>
-          </p:txBody>
-        </p:sp>
-        <p:sp>
-          <p:nvSpPr>
             <p:cNvPr id="74" name="Rectangle 73"/>
             <p:cNvSpPr/>
             <p:nvPr/>
           </p:nvSpPr>
           <p:spPr>
             <a:xfrm>
-              <a:off x="2582622" y="5631474"/>
-              <a:ext cx="1664929" cy="317806"/>
-            </a:xfrm>
-            <a:prstGeom prst="rect">
-              <a:avLst/>
-            </a:prstGeom>
-            <a:ln/>
-          </p:spPr>
-          <p:style>
-            <a:lnRef idx="3">
-              <a:schemeClr val="lt1"/>
-            </a:lnRef>
-            <a:fillRef idx="1">
-              <a:schemeClr val="accent3"/>
-            </a:fillRef>
-            <a:effectRef idx="1">
-              <a:schemeClr val="accent3"/>
-            </a:effectRef>
-            <a:fontRef idx="minor">
-              <a:schemeClr val="lt1"/>
-            </a:fontRef>
-          </p:style>
-          <p:txBody>
-            <a:bodyPr rtlCol="0" anchor="ctr"/>
-            <a:lstStyle/>
-            <a:p>
-              <a:pPr algn="ctr"/>
-              <a:r>
-                <a:rPr lang="en-CA" sz="1200" b="1" dirty="0">
-                  <a:solidFill>
-                    <a:schemeClr val="bg1"/>
-                  </a:solidFill>
-                </a:rPr>
-                <a:t>Ultrasound </a:t>
-              </a:r>
-              <a:r>
-                <a:rPr lang="en-CA" sz="1200" b="1" dirty="0" smtClean="0">
-                  <a:solidFill>
-                    <a:schemeClr val="bg1"/>
-                  </a:solidFill>
-                </a:rPr>
-                <a:t>scanner</a:t>
-              </a:r>
-              <a:endParaRPr lang="en-CA" sz="1200" b="1" dirty="0">
-                <a:solidFill>
-                  <a:schemeClr val="bg1"/>
-                </a:solidFill>
-              </a:endParaRPr>
-            </a:p>
-          </p:txBody>
-        </p:sp>
-        <p:sp>
-          <p:nvSpPr>
-            <p:cNvPr id="76" name="Rectangle 75"/>
-            <p:cNvSpPr/>
-            <p:nvPr/>
-          </p:nvSpPr>
-          <p:spPr>
-            <a:xfrm>
-              <a:off x="4635504" y="5634293"/>
-              <a:ext cx="1700279" cy="314987"/>
+              <a:off x="3848117" y="5631474"/>
+              <a:ext cx="1224136" cy="317806"/>
             </a:xfrm>
             <a:prstGeom prst="rect">
               <a:avLst/>
@@ -4156,94 +4110,11 @@
                     <a:schemeClr val="bg1"/>
                   </a:solidFill>
                 </a:rPr>
-                <a:t>Navigation system</a:t>
+                <a:t>Hardware</a:t>
               </a:r>
-              <a:endParaRPr lang="en-CA" sz="1200" b="1" dirty="0">
-                <a:solidFill>
-                  <a:schemeClr val="bg1"/>
-                </a:solidFill>
-              </a:endParaRPr>
             </a:p>
           </p:txBody>
         </p:sp>
-        <p:cxnSp>
-          <p:nvCxnSpPr>
-            <p:cNvPr id="77" name="Straight Connector 76"/>
-            <p:cNvCxnSpPr>
-              <a:stCxn id="72" idx="2"/>
-              <a:endCxn id="74" idx="0"/>
-            </p:cNvCxnSpPr>
-            <p:nvPr/>
-          </p:nvCxnSpPr>
-          <p:spPr>
-            <a:xfrm flipH="1">
-              <a:off x="3415087" y="4948319"/>
-              <a:ext cx="1040336" cy="683155"/>
-            </a:xfrm>
-            <a:prstGeom prst="line">
-              <a:avLst/>
-            </a:prstGeom>
-            <a:ln w="31750">
-              <a:solidFill>
-                <a:schemeClr val="tx1"/>
-              </a:solidFill>
-              <a:prstDash val="solid"/>
-            </a:ln>
-          </p:spPr>
-          <p:style>
-            <a:lnRef idx="1">
-              <a:schemeClr val="accent1"/>
-            </a:lnRef>
-            <a:fillRef idx="0">
-              <a:schemeClr val="accent1"/>
-            </a:fillRef>
-            <a:effectRef idx="0">
-              <a:schemeClr val="accent1"/>
-            </a:effectRef>
-            <a:fontRef idx="minor">
-              <a:schemeClr val="tx1"/>
-            </a:fontRef>
-          </p:style>
-        </p:cxnSp>
-        <p:cxnSp>
-          <p:nvCxnSpPr>
-            <p:cNvPr id="78" name="Straight Connector 77"/>
-            <p:cNvCxnSpPr>
-              <a:stCxn id="72" idx="2"/>
-              <a:endCxn id="76" idx="0"/>
-            </p:cNvCxnSpPr>
-            <p:nvPr/>
-          </p:nvCxnSpPr>
-          <p:spPr>
-            <a:xfrm>
-              <a:off x="4455423" y="4948319"/>
-              <a:ext cx="1030221" cy="685974"/>
-            </a:xfrm>
-            <a:prstGeom prst="line">
-              <a:avLst/>
-            </a:prstGeom>
-            <a:ln w="31750">
-              <a:solidFill>
-                <a:schemeClr val="tx1"/>
-              </a:solidFill>
-              <a:prstDash val="solid"/>
-            </a:ln>
-          </p:spPr>
-          <p:style>
-            <a:lnRef idx="1">
-              <a:schemeClr val="accent1"/>
-            </a:lnRef>
-            <a:fillRef idx="0">
-              <a:schemeClr val="accent1"/>
-            </a:fillRef>
-            <a:effectRef idx="0">
-              <a:schemeClr val="accent1"/>
-            </a:effectRef>
-            <a:fontRef idx="minor">
-              <a:schemeClr val="tx1"/>
-            </a:fontRef>
-          </p:style>
-        </p:cxnSp>
         <p:sp>
           <p:nvSpPr>
             <p:cNvPr id="87" name="Rectangle 86"/>
@@ -4252,8 +4123,8 @@
           </p:nvSpPr>
           <p:spPr>
             <a:xfrm>
-              <a:off x="2735382" y="895388"/>
-              <a:ext cx="1584177" cy="390138"/>
+              <a:off x="2735382" y="1414491"/>
+              <a:ext cx="1584177" cy="258274"/>
             </a:xfrm>
             <a:prstGeom prst="rect">
               <a:avLst/>
@@ -4331,20 +4202,26 @@
         </p:sp>
         <p:cxnSp>
           <p:nvCxnSpPr>
-            <p:cNvPr id="94" name="Straight Connector 93"/>
-            <p:cNvCxnSpPr/>
+            <p:cNvPr id="77" name="Straight Connector 76"/>
+            <p:cNvCxnSpPr>
+              <a:stCxn id="40" idx="2"/>
+              <a:endCxn id="74" idx="0"/>
+            </p:cNvCxnSpPr>
             <p:nvPr/>
           </p:nvCxnSpPr>
           <p:spPr>
             <a:xfrm>
-              <a:off x="545629" y="5494661"/>
-              <a:ext cx="8212075" cy="0"/>
+              <a:off x="4460185" y="4981012"/>
+              <a:ext cx="0" cy="650461"/>
             </a:xfrm>
             <a:prstGeom prst="line">
               <a:avLst/>
             </a:prstGeom>
-            <a:ln w="28575">
-              <a:prstDash val="lgDash"/>
+            <a:ln w="31750">
+              <a:solidFill>
+                <a:schemeClr val="tx1"/>
+              </a:solidFill>
+              <a:prstDash val="solid"/>
             </a:ln>
           </p:spPr>
           <p:style>
@@ -4362,90 +4239,6 @@
             </a:fontRef>
           </p:style>
         </p:cxnSp>
-        <p:sp>
-          <p:nvSpPr>
-            <p:cNvPr id="95" name="TextBox 94"/>
-            <p:cNvSpPr txBox="1"/>
-            <p:nvPr/>
-          </p:nvSpPr>
-          <p:spPr>
-            <a:xfrm>
-              <a:off x="476784" y="5211491"/>
-              <a:ext cx="816249" cy="276999"/>
-            </a:xfrm>
-            <a:prstGeom prst="rect">
-              <a:avLst/>
-            </a:prstGeom>
-            <a:noFill/>
-          </p:spPr>
-          <p:txBody>
-            <a:bodyPr wrap="none" rtlCol="0">
-              <a:spAutoFit/>
-            </a:bodyPr>
-            <a:lstStyle/>
-            <a:p>
-              <a:r>
-                <a:rPr lang="en-CA" sz="1200" b="1" dirty="0" smtClean="0"/>
-                <a:t>software</a:t>
-              </a:r>
-              <a:endParaRPr lang="en-CA" sz="1200" b="1" dirty="0"/>
-            </a:p>
-          </p:txBody>
-        </p:sp>
-        <p:sp>
-          <p:nvSpPr>
-            <p:cNvPr id="72" name="Rectangle 71"/>
-            <p:cNvSpPr/>
-            <p:nvPr/>
-          </p:nvSpPr>
-          <p:spPr>
-            <a:xfrm>
-              <a:off x="3799199" y="4607083"/>
-              <a:ext cx="1312448" cy="341236"/>
-            </a:xfrm>
-            <a:prstGeom prst="rect">
-              <a:avLst/>
-            </a:prstGeom>
-            <a:solidFill>
-              <a:srgbClr val="33889F"/>
-            </a:solidFill>
-            <a:ln/>
-          </p:spPr>
-          <p:style>
-            <a:lnRef idx="3">
-              <a:schemeClr val="lt1"/>
-            </a:lnRef>
-            <a:fillRef idx="1">
-              <a:schemeClr val="accent5"/>
-            </a:fillRef>
-            <a:effectRef idx="1">
-              <a:schemeClr val="accent5"/>
-            </a:effectRef>
-            <a:fontRef idx="minor">
-              <a:schemeClr val="lt1"/>
-            </a:fontRef>
-          </p:style>
-          <p:txBody>
-            <a:bodyPr rtlCol="0" anchor="ctr"/>
-            <a:lstStyle/>
-            <a:p>
-              <a:pPr algn="ctr"/>
-              <a:r>
-                <a:rPr lang="en-CA" sz="1200" b="1" dirty="0" smtClean="0">
-                  <a:solidFill>
-                    <a:schemeClr val="bg1"/>
-                  </a:solidFill>
-                </a:rPr>
-                <a:t>Interface</a:t>
-              </a:r>
-              <a:endParaRPr lang="en-CA" sz="1200" b="1" dirty="0">
-                <a:solidFill>
-                  <a:schemeClr val="bg1"/>
-                </a:solidFill>
-              </a:endParaRPr>
-            </a:p>
-          </p:txBody>
-        </p:sp>
       </p:grpSp>
       <p:sp>
         <p:nvSpPr>
@@ -4455,7 +4248,7 @@
         </p:nvSpPr>
         <p:spPr>
           <a:xfrm>
-            <a:off x="971600" y="1783849"/>
+            <a:off x="971600" y="2287905"/>
             <a:ext cx="886909" cy="276999"/>
           </a:xfrm>
           <a:prstGeom prst="rect">
@@ -4485,8 +4278,8 @@
         </p:nvSpPr>
         <p:spPr>
           <a:xfrm>
-            <a:off x="4427984" y="1196751"/>
-            <a:ext cx="1656184" cy="348165"/>
+            <a:off x="4427984" y="1916832"/>
+            <a:ext cx="1656184" cy="226389"/>
           </a:xfrm>
           <a:prstGeom prst="rect">
             <a:avLst/>
@@ -4539,8 +4332,8 @@
         </p:nvSpPr>
         <p:spPr>
           <a:xfrm>
-            <a:off x="4427984" y="1683886"/>
-            <a:ext cx="1656184" cy="376962"/>
+            <a:off x="4427984" y="2215896"/>
+            <a:ext cx="1656184" cy="277000"/>
           </a:xfrm>
           <a:prstGeom prst="rect">
             <a:avLst/>
@@ -4593,8 +4386,8 @@
         </p:nvSpPr>
         <p:spPr>
           <a:xfrm>
-            <a:off x="2699792" y="1700378"/>
-            <a:ext cx="1584177" cy="360470"/>
+            <a:off x="2699792" y="2215897"/>
+            <a:ext cx="1584177" cy="276999"/>
           </a:xfrm>
           <a:prstGeom prst="rect">
             <a:avLst/>
@@ -4647,8 +4440,8 @@
         </p:nvSpPr>
         <p:spPr>
           <a:xfrm>
-            <a:off x="2699791" y="2188372"/>
-            <a:ext cx="1584177" cy="376532"/>
+            <a:off x="2699791" y="2564903"/>
+            <a:ext cx="1584177" cy="238265"/>
           </a:xfrm>
           <a:prstGeom prst="rect">
             <a:avLst/>
@@ -4701,7 +4494,7 @@
         </p:nvCxnSpPr>
         <p:spPr>
           <a:xfrm>
-            <a:off x="536389" y="2708920"/>
+            <a:off x="536389" y="2947185"/>
             <a:ext cx="8212075" cy="0"/>
           </a:xfrm>
           <a:prstGeom prst="line">
@@ -4734,7 +4527,7 @@
         </p:nvSpPr>
         <p:spPr>
           <a:xfrm>
-            <a:off x="1187624" y="2852936"/>
+            <a:off x="1187624" y="3091201"/>
             <a:ext cx="483146" cy="276999"/>
           </a:xfrm>
           <a:prstGeom prst="rect">
@@ -4764,7 +4557,7 @@
         </p:nvSpPr>
         <p:spPr>
           <a:xfrm>
-            <a:off x="3635894" y="2780928"/>
+            <a:off x="3635894" y="3019193"/>
             <a:ext cx="1584177" cy="376532"/>
           </a:xfrm>
           <a:prstGeom prst="rect">
@@ -4818,7 +4611,7 @@
         </p:nvCxnSpPr>
         <p:spPr>
           <a:xfrm>
-            <a:off x="539552" y="3284984"/>
+            <a:off x="539552" y="3523249"/>
             <a:ext cx="8212075" cy="0"/>
           </a:xfrm>
           <a:prstGeom prst="line">
@@ -4851,7 +4644,7 @@
         </p:nvSpPr>
         <p:spPr>
           <a:xfrm>
-            <a:off x="3786692" y="3501008"/>
+            <a:off x="3786692" y="3739273"/>
             <a:ext cx="1289363" cy="337799"/>
           </a:xfrm>
           <a:prstGeom prst="rect">
@@ -4900,7 +4693,7 @@
         </p:nvSpPr>
         <p:spPr>
           <a:xfrm>
-            <a:off x="3786692" y="4027305"/>
+            <a:off x="3786692" y="4243329"/>
             <a:ext cx="1289363" cy="308027"/>
           </a:xfrm>
           <a:prstGeom prst="rect">
@@ -4949,7 +4742,7 @@
         </p:nvSpPr>
         <p:spPr>
           <a:xfrm>
-            <a:off x="5142426" y="2238138"/>
+            <a:off x="5142426" y="2564904"/>
             <a:ext cx="293670" cy="276999"/>
           </a:xfrm>
           <a:prstGeom prst="rect">
@@ -4973,18 +4766,21 @@
       </p:sp>
       <p:sp>
         <p:nvSpPr>
-          <p:cNvPr id="48" name="Rectangle 47"/>
+          <p:cNvPr id="40" name="Rectangle 39"/>
           <p:cNvSpPr/>
           <p:nvPr/>
         </p:nvSpPr>
         <p:spPr>
           <a:xfrm>
-            <a:off x="7501563" y="1088491"/>
-            <a:ext cx="1240058" cy="507885"/>
+            <a:off x="3707904" y="4747385"/>
+            <a:ext cx="1433380" cy="337799"/>
           </a:xfrm>
           <a:prstGeom prst="rect">
             <a:avLst/>
           </a:prstGeom>
+          <a:solidFill>
+            <a:srgbClr val="33889F"/>
+          </a:solidFill>
           <a:ln/>
         </p:spPr>
         <p:style>
@@ -5006,42 +4802,15 @@
           <a:lstStyle/>
           <a:p>
             <a:pPr algn="ctr"/>
-            <a:endParaRPr lang="en-CA" sz="1200" i="1" dirty="0"/>
-          </a:p>
-        </p:txBody>
-      </p:sp>
-      <p:sp>
-        <p:nvSpPr>
-          <p:cNvPr id="49" name="TextBox 48"/>
-          <p:cNvSpPr txBox="1"/>
-          <p:nvPr/>
-        </p:nvSpPr>
-        <p:spPr>
-          <a:xfrm>
-            <a:off x="7488737" y="1068660"/>
-            <a:ext cx="1246902" cy="461665"/>
-          </a:xfrm>
-          <a:prstGeom prst="rect">
-            <a:avLst/>
-          </a:prstGeom>
-          <a:noFill/>
-        </p:spPr>
-        <p:txBody>
-          <a:bodyPr wrap="square" rtlCol="0">
-            <a:spAutoFit/>
-          </a:bodyPr>
-          <a:lstStyle/>
-          <a:p>
-            <a:pPr algn="ctr"/>
-            <a:r>
-              <a:rPr lang="en-CA" sz="1200" b="1" i="1" dirty="0" smtClean="0">
+            <a:r>
+              <a:rPr lang="en-CA" sz="1200" b="1" dirty="0" smtClean="0">
                 <a:solidFill>
                   <a:schemeClr val="bg1"/>
                 </a:solidFill>
               </a:rPr>
-              <a:t>Developed in the Perk Lab</a:t>
-            </a:r>
-            <a:endParaRPr lang="en-CA" sz="1200" b="1" i="1" dirty="0">
+              <a:t>Device Specific SDK</a:t>
+            </a:r>
+            <a:endParaRPr lang="en-CA" sz="1200" b="1" dirty="0" smtClean="0">
               <a:solidFill>
                 <a:schemeClr val="bg1"/>
               </a:solidFill>
@@ -5049,20 +4818,87 @@
           </a:p>
         </p:txBody>
       </p:sp>
-      <p:sp>
-        <p:nvSpPr>
-          <p:cNvPr id="36" name="Rectangle 35"/>
+      <p:cxnSp>
+        <p:nvCxnSpPr>
+          <p:cNvPr id="47" name="Straight Connector 46"/>
+          <p:cNvCxnSpPr/>
+          <p:nvPr/>
+        </p:nvCxnSpPr>
+        <p:spPr>
+          <a:xfrm>
+            <a:off x="539552" y="1772816"/>
+            <a:ext cx="8212075" cy="0"/>
+          </a:xfrm>
+          <a:prstGeom prst="line">
+            <a:avLst/>
+          </a:prstGeom>
+          <a:ln w="28575">
+            <a:prstDash val="lgDash"/>
+          </a:ln>
+        </p:spPr>
+        <p:style>
+          <a:lnRef idx="1">
+            <a:schemeClr val="accent1"/>
+          </a:lnRef>
+          <a:fillRef idx="0">
+            <a:schemeClr val="accent1"/>
+          </a:fillRef>
+          <a:effectRef idx="0">
+            <a:schemeClr val="accent1"/>
+          </a:effectRef>
+          <a:fontRef idx="minor">
+            <a:schemeClr val="tx1"/>
+          </a:fontRef>
+        </p:style>
+      </p:cxnSp>
+      <p:sp>
+        <p:nvSpPr>
+          <p:cNvPr id="50" name="TextBox 49"/>
+          <p:cNvSpPr txBox="1"/>
+          <p:nvPr/>
+        </p:nvSpPr>
+        <p:spPr>
+          <a:xfrm>
+            <a:off x="940473" y="1268760"/>
+            <a:ext cx="977447" cy="276999"/>
+          </a:xfrm>
+          <a:prstGeom prst="rect">
+            <a:avLst/>
+          </a:prstGeom>
+          <a:noFill/>
+        </p:spPr>
+        <p:txBody>
+          <a:bodyPr wrap="none" rtlCol="0">
+            <a:spAutoFit/>
+          </a:bodyPr>
+          <a:lstStyle/>
+          <a:p>
+            <a:pPr algn="r"/>
+            <a:r>
+              <a:rPr lang="en-CA" sz="1200" b="1" dirty="0" smtClean="0"/>
+              <a:t>Applications</a:t>
+            </a:r>
+            <a:endParaRPr lang="en-CA" sz="1200" b="1" dirty="0" smtClean="0"/>
+          </a:p>
+        </p:txBody>
+      </p:sp>
+      <p:sp>
+        <p:nvSpPr>
+          <p:cNvPr id="51" name="Rectangle 50"/>
           <p:cNvSpPr/>
           <p:nvPr/>
         </p:nvSpPr>
         <p:spPr>
           <a:xfrm>
-            <a:off x="7501562" y="1544917"/>
-            <a:ext cx="1246902" cy="444353"/>
+            <a:off x="2699793" y="1254297"/>
+            <a:ext cx="720080" cy="230487"/>
           </a:xfrm>
           <a:prstGeom prst="rect">
             <a:avLst/>
           </a:prstGeom>
+          <a:solidFill>
+            <a:srgbClr val="33889F"/>
+          </a:solidFill>
           <a:ln/>
         </p:spPr>
         <p:style>
@@ -5070,10 +4906,10 @@
             <a:schemeClr val="lt1"/>
           </a:lnRef>
           <a:fillRef idx="1">
-            <a:schemeClr val="accent3"/>
+            <a:schemeClr val="accent5"/>
           </a:fillRef>
           <a:effectRef idx="1">
-            <a:schemeClr val="accent3"/>
+            <a:schemeClr val="accent5"/>
           </a:effectRef>
           <a:fontRef idx="minor">
             <a:schemeClr val="lt1"/>
@@ -5084,7 +4920,15 @@
           <a:lstStyle/>
           <a:p>
             <a:pPr algn="ctr"/>
-            <a:endParaRPr lang="en-CA" sz="1200" dirty="0">
+            <a:r>
+              <a:rPr lang="en-CA" sz="1200" b="1" dirty="0" err="1" smtClean="0">
+                <a:solidFill>
+                  <a:schemeClr val="bg1"/>
+                </a:solidFill>
+              </a:rPr>
+              <a:t>fCal</a:t>
+            </a:r>
+            <a:endParaRPr lang="en-CA" sz="1200" b="1" dirty="0">
               <a:solidFill>
                 <a:schemeClr val="bg1"/>
               </a:solidFill>
@@ -5094,40 +4938,139 @@
       </p:sp>
       <p:sp>
         <p:nvSpPr>
-          <p:cNvPr id="37" name="TextBox 36"/>
-          <p:cNvSpPr txBox="1"/>
-          <p:nvPr/>
-        </p:nvSpPr>
-        <p:spPr>
-          <a:xfrm>
-            <a:off x="7524328" y="1544917"/>
-            <a:ext cx="1238863" cy="411996"/>
+          <p:cNvPr id="52" name="Rectangle 51"/>
+          <p:cNvSpPr/>
+          <p:nvPr/>
+        </p:nvSpPr>
+        <p:spPr>
+          <a:xfrm>
+            <a:off x="3563887" y="1254298"/>
+            <a:ext cx="867485" cy="230486"/>
           </a:xfrm>
           <a:prstGeom prst="rect">
             <a:avLst/>
           </a:prstGeom>
-          <a:noFill/>
-        </p:spPr>
-        <p:txBody>
-          <a:bodyPr wrap="square" rtlCol="0">
-            <a:spAutoFit/>
-          </a:bodyPr>
+          <a:solidFill>
+            <a:srgbClr val="33889F"/>
+          </a:solidFill>
+          <a:ln/>
+        </p:spPr>
+        <p:style>
+          <a:lnRef idx="3">
+            <a:schemeClr val="lt1"/>
+          </a:lnRef>
+          <a:fillRef idx="1">
+            <a:schemeClr val="accent5"/>
+          </a:fillRef>
+          <a:effectRef idx="1">
+            <a:schemeClr val="accent5"/>
+          </a:effectRef>
+          <a:fontRef idx="minor">
+            <a:schemeClr val="lt1"/>
+          </a:fontRef>
+        </p:style>
+        <p:txBody>
+          <a:bodyPr rtlCol="0" anchor="ctr"/>
           <a:lstStyle/>
           <a:p>
             <a:pPr algn="ctr"/>
             <a:r>
-              <a:rPr lang="en-CA" sz="1200" b="1" i="1" dirty="0" smtClean="0">
+              <a:rPr lang="en-CA" sz="1200" b="1" dirty="0" err="1" smtClean="0">
                 <a:solidFill>
                   <a:schemeClr val="bg1"/>
                 </a:solidFill>
               </a:rPr>
-              <a:t>Developed by collaborators</a:t>
-            </a:r>
-            <a:endParaRPr lang="en-CA" sz="1200" b="1" i="1" dirty="0">
+              <a:t>PlusServer</a:t>
+            </a:r>
+            <a:endParaRPr lang="en-CA" sz="1200" b="1" dirty="0">
               <a:solidFill>
                 <a:schemeClr val="bg1"/>
               </a:solidFill>
             </a:endParaRPr>
+          </a:p>
+        </p:txBody>
+      </p:sp>
+      <p:sp>
+        <p:nvSpPr>
+          <p:cNvPr id="53" name="Rectangle 52"/>
+          <p:cNvSpPr/>
+          <p:nvPr/>
+        </p:nvSpPr>
+        <p:spPr>
+          <a:xfrm>
+            <a:off x="4568611" y="1254297"/>
+            <a:ext cx="573815" cy="230487"/>
+          </a:xfrm>
+          <a:prstGeom prst="rect">
+            <a:avLst/>
+          </a:prstGeom>
+          <a:solidFill>
+            <a:srgbClr val="33889F"/>
+          </a:solidFill>
+          <a:ln/>
+        </p:spPr>
+        <p:style>
+          <a:lnRef idx="3">
+            <a:schemeClr val="lt1"/>
+          </a:lnRef>
+          <a:fillRef idx="1">
+            <a:schemeClr val="accent5"/>
+          </a:fillRef>
+          <a:effectRef idx="1">
+            <a:schemeClr val="accent5"/>
+          </a:effectRef>
+          <a:fontRef idx="minor">
+            <a:schemeClr val="lt1"/>
+          </a:fontRef>
+        </p:style>
+        <p:txBody>
+          <a:bodyPr rtlCol="0" anchor="ctr"/>
+          <a:lstStyle/>
+          <a:p>
+            <a:pPr algn="ctr"/>
+            <a:r>
+              <a:rPr lang="en-CA" sz="1200" b="1" dirty="0" smtClean="0">
+                <a:solidFill>
+                  <a:schemeClr val="bg1"/>
+                </a:solidFill>
+              </a:rPr>
+              <a:t>iCal</a:t>
+            </a:r>
+            <a:endParaRPr lang="en-CA" sz="1200" b="1" dirty="0">
+              <a:solidFill>
+                <a:schemeClr val="bg1"/>
+              </a:solidFill>
+            </a:endParaRPr>
+          </a:p>
+        </p:txBody>
+      </p:sp>
+      <p:sp>
+        <p:nvSpPr>
+          <p:cNvPr id="54" name="TextBox 53"/>
+          <p:cNvSpPr txBox="1"/>
+          <p:nvPr/>
+        </p:nvSpPr>
+        <p:spPr>
+          <a:xfrm>
+            <a:off x="5574474" y="1279793"/>
+            <a:ext cx="293670" cy="276999"/>
+          </a:xfrm>
+          <a:prstGeom prst="rect">
+            <a:avLst/>
+          </a:prstGeom>
+          <a:noFill/>
+        </p:spPr>
+        <p:txBody>
+          <a:bodyPr wrap="none" rtlCol="0">
+            <a:spAutoFit/>
+          </a:bodyPr>
+          <a:lstStyle/>
+          <a:p>
+            <a:pPr algn="r"/>
+            <a:r>
+              <a:rPr lang="en-CA" sz="1200" b="1" dirty="0" smtClean="0"/>
+              <a:t>…</a:t>
+            </a:r>
           </a:p>
         </p:txBody>
       </p:sp>
@@ -5343,7 +5286,15 @@
                   <a:srgbClr val="800000"/>
                 </a:solidFill>
               </a:rPr>
-              <a:t>A Device</a:t>
+              <a:t>Inside A </a:t>
+            </a:r>
+            <a:r>
+              <a:rPr lang="en-CA" b="1" dirty="0" smtClean="0">
+                <a:solidFill>
+                  <a:srgbClr val="800000"/>
+                </a:solidFill>
+              </a:rPr>
+              <a:t>Device</a:t>
             </a:r>
             <a:endParaRPr lang="en-CA" b="1" dirty="0">
               <a:solidFill>
@@ -5424,10 +5375,10 @@
         </p:nvGrpSpPr>
         <p:grpSpPr>
           <a:xfrm>
-            <a:off x="1115616" y="1068660"/>
-            <a:ext cx="7632848" cy="4638256"/>
-            <a:chOff x="1151207" y="751855"/>
-            <a:chExt cx="7632848" cy="5197425"/>
+            <a:off x="997955" y="1124744"/>
+            <a:ext cx="5554678" cy="4582173"/>
+            <a:chOff x="1033546" y="814700"/>
+            <a:chExt cx="5554678" cy="5134580"/>
           </a:xfrm>
         </p:grpSpPr>
         <p:sp>
@@ -5438,8 +5389,8 @@
           </p:nvSpPr>
           <p:spPr>
             <a:xfrm>
-              <a:off x="2375343" y="774077"/>
-              <a:ext cx="4212881" cy="4437413"/>
+              <a:off x="2375343" y="814700"/>
+              <a:ext cx="4212881" cy="4396792"/>
             </a:xfrm>
             <a:prstGeom prst="rect">
               <a:avLst/>
@@ -5530,9 +5481,9 @@
             <p:nvPr/>
           </p:nvCxnSpPr>
           <p:spPr>
-            <a:xfrm>
-              <a:off x="4491427" y="4948319"/>
-              <a:ext cx="3780" cy="683155"/>
+            <a:xfrm flipH="1">
+              <a:off x="4495207" y="4948319"/>
+              <a:ext cx="6330" cy="683155"/>
             </a:xfrm>
             <a:prstGeom prst="line">
               <a:avLst/>
@@ -5567,8 +5518,8 @@
           </p:nvSpPr>
           <p:spPr>
             <a:xfrm>
-              <a:off x="1151207" y="3086355"/>
-              <a:ext cx="631198" cy="310393"/>
+              <a:off x="1033546" y="3086354"/>
+              <a:ext cx="748859" cy="310393"/>
             </a:xfrm>
             <a:prstGeom prst="rect">
               <a:avLst/>
@@ -5584,168 +5535,9 @@
               <a:pPr algn="r"/>
               <a:r>
                 <a:rPr lang="en-CA" sz="1200" b="1" dirty="0" smtClean="0"/>
-                <a:t>Private</a:t>
+                <a:t>Internals</a:t>
               </a:r>
-            </a:p>
-          </p:txBody>
-        </p:sp>
-        <p:sp>
-          <p:nvSpPr>
-            <p:cNvPr id="111" name="Rectangle 110"/>
-            <p:cNvSpPr/>
-            <p:nvPr/>
-          </p:nvSpPr>
-          <p:spPr>
-            <a:xfrm>
-              <a:off x="7537154" y="774077"/>
-              <a:ext cx="1240058" cy="569114"/>
-            </a:xfrm>
-            <a:prstGeom prst="rect">
-              <a:avLst/>
-            </a:prstGeom>
-            <a:ln/>
-          </p:spPr>
-          <p:style>
-            <a:lnRef idx="3">
-              <a:schemeClr val="lt1"/>
-            </a:lnRef>
-            <a:fillRef idx="1">
-              <a:schemeClr val="accent5"/>
-            </a:fillRef>
-            <a:effectRef idx="1">
-              <a:schemeClr val="accent5"/>
-            </a:effectRef>
-            <a:fontRef idx="minor">
-              <a:schemeClr val="lt1"/>
-            </a:fontRef>
-          </p:style>
-          <p:txBody>
-            <a:bodyPr rtlCol="0" anchor="ctr"/>
-            <a:lstStyle/>
-            <a:p>
-              <a:pPr algn="ctr"/>
-              <a:endParaRPr lang="en-CA" sz="1200" i="1" dirty="0"/>
-            </a:p>
-          </p:txBody>
-        </p:sp>
-        <p:sp>
-          <p:nvSpPr>
-            <p:cNvPr id="112" name="TextBox 111"/>
-            <p:cNvSpPr txBox="1"/>
-            <p:nvPr/>
-          </p:nvSpPr>
-          <p:spPr>
-            <a:xfrm>
-              <a:off x="7524328" y="751855"/>
-              <a:ext cx="1246902" cy="517321"/>
-            </a:xfrm>
-            <a:prstGeom prst="rect">
-              <a:avLst/>
-            </a:prstGeom>
-            <a:noFill/>
-          </p:spPr>
-          <p:txBody>
-            <a:bodyPr wrap="square" rtlCol="0">
-              <a:spAutoFit/>
-            </a:bodyPr>
-            <a:lstStyle/>
-            <a:p>
-              <a:pPr algn="ctr"/>
-              <a:r>
-                <a:rPr lang="en-CA" sz="1200" b="1" i="1" dirty="0" smtClean="0">
-                  <a:solidFill>
-                    <a:schemeClr val="bg1"/>
-                  </a:solidFill>
-                </a:rPr>
-                <a:t>Developed in the Perk Lab</a:t>
-              </a:r>
-              <a:endParaRPr lang="en-CA" sz="1200" b="1" i="1" dirty="0">
-                <a:solidFill>
-                  <a:schemeClr val="bg1"/>
-                </a:solidFill>
-              </a:endParaRPr>
-            </a:p>
-          </p:txBody>
-        </p:sp>
-        <p:sp>
-          <p:nvSpPr>
-            <p:cNvPr id="113" name="Rectangle 112"/>
-            <p:cNvSpPr/>
-            <p:nvPr/>
-          </p:nvSpPr>
-          <p:spPr>
-            <a:xfrm>
-              <a:off x="7537153" y="1285528"/>
-              <a:ext cx="1246902" cy="497922"/>
-            </a:xfrm>
-            <a:prstGeom prst="rect">
-              <a:avLst/>
-            </a:prstGeom>
-            <a:ln/>
-          </p:spPr>
-          <p:style>
-            <a:lnRef idx="3">
-              <a:schemeClr val="lt1"/>
-            </a:lnRef>
-            <a:fillRef idx="1">
-              <a:schemeClr val="accent3"/>
-            </a:fillRef>
-            <a:effectRef idx="1">
-              <a:schemeClr val="accent3"/>
-            </a:effectRef>
-            <a:fontRef idx="minor">
-              <a:schemeClr val="lt1"/>
-            </a:fontRef>
-          </p:style>
-          <p:txBody>
-            <a:bodyPr rtlCol="0" anchor="ctr"/>
-            <a:lstStyle/>
-            <a:p>
-              <a:pPr algn="ctr"/>
-              <a:endParaRPr lang="en-CA" sz="1200" dirty="0">
-                <a:solidFill>
-                  <a:schemeClr val="bg1"/>
-                </a:solidFill>
-              </a:endParaRPr>
-            </a:p>
-          </p:txBody>
-        </p:sp>
-        <p:sp>
-          <p:nvSpPr>
-            <p:cNvPr id="114" name="TextBox 113"/>
-            <p:cNvSpPr txBox="1"/>
-            <p:nvPr/>
-          </p:nvSpPr>
-          <p:spPr>
-            <a:xfrm>
-              <a:off x="7545192" y="1285528"/>
-              <a:ext cx="1238863" cy="461665"/>
-            </a:xfrm>
-            <a:prstGeom prst="rect">
-              <a:avLst/>
-            </a:prstGeom>
-            <a:noFill/>
-          </p:spPr>
-          <p:txBody>
-            <a:bodyPr wrap="square" rtlCol="0">
-              <a:spAutoFit/>
-            </a:bodyPr>
-            <a:lstStyle/>
-            <a:p>
-              <a:pPr algn="ctr"/>
-              <a:r>
-                <a:rPr lang="en-CA" sz="1200" b="1" i="1" dirty="0" smtClean="0">
-                  <a:solidFill>
-                    <a:schemeClr val="bg1"/>
-                  </a:solidFill>
-                </a:rPr>
-                <a:t>Developed by collaborators</a:t>
-              </a:r>
-              <a:endParaRPr lang="en-CA" sz="1200" b="1" i="1" dirty="0">
-                <a:solidFill>
-                  <a:schemeClr val="bg1"/>
-                </a:solidFill>
-              </a:endParaRPr>
+              <a:endParaRPr lang="en-CA" sz="1200" b="1" dirty="0" smtClean="0"/>
             </a:p>
           </p:txBody>
         </p:sp>
@@ -5757,8 +5549,8 @@
           </p:nvSpPr>
           <p:spPr>
             <a:xfrm>
-              <a:off x="3799199" y="4607083"/>
-              <a:ext cx="1384456" cy="341236"/>
+              <a:off x="3731108" y="4607083"/>
+              <a:ext cx="1540858" cy="341236"/>
             </a:xfrm>
             <a:prstGeom prst="rect">
               <a:avLst/>
@@ -5793,7 +5585,15 @@
                     <a:schemeClr val="bg1"/>
                   </a:solidFill>
                 </a:rPr>
-                <a:t>Device interface</a:t>
+                <a:t>Devic</a:t>
+              </a:r>
+              <a:r>
+                <a:rPr lang="en-CA" sz="1200" b="1" dirty="0" smtClean="0">
+                  <a:solidFill>
+                    <a:schemeClr val="bg1"/>
+                  </a:solidFill>
+                </a:rPr>
+                <a:t>e Specific SDK</a:t>
               </a:r>
               <a:endParaRPr lang="en-CA" sz="1200" b="1" dirty="0">
                 <a:solidFill>
@@ -5804,194 +5604,6 @@
           </p:txBody>
         </p:sp>
       </p:grpSp>
-      <p:sp>
-        <p:nvSpPr>
-          <p:cNvPr id="40" name="TextBox 39"/>
-          <p:cNvSpPr txBox="1"/>
-          <p:nvPr/>
-        </p:nvSpPr>
-        <p:spPr>
-          <a:xfrm>
-            <a:off x="1117485" y="1495817"/>
-            <a:ext cx="574195" cy="276999"/>
-          </a:xfrm>
-          <a:prstGeom prst="rect">
-            <a:avLst/>
-          </a:prstGeom>
-          <a:noFill/>
-        </p:spPr>
-        <p:txBody>
-          <a:bodyPr wrap="none" rtlCol="0">
-            <a:spAutoFit/>
-          </a:bodyPr>
-          <a:lstStyle/>
-          <a:p>
-            <a:pPr algn="r"/>
-            <a:r>
-              <a:rPr lang="en-CA" sz="1200" b="1" dirty="0" smtClean="0"/>
-              <a:t>Public</a:t>
-            </a:r>
-          </a:p>
-        </p:txBody>
-      </p:sp>
-      <p:cxnSp>
-        <p:nvCxnSpPr>
-          <p:cNvPr id="9" name="Elbow Connector 8"/>
-          <p:cNvCxnSpPr>
-            <a:stCxn id="41" idx="0"/>
-            <a:endCxn id="129" idx="2"/>
-          </p:cNvCxnSpPr>
-          <p:nvPr/>
-        </p:nvCxnSpPr>
-        <p:spPr>
-          <a:xfrm rot="5400000" flipH="1" flipV="1">
-            <a:off x="3955693" y="1346384"/>
-            <a:ext cx="260506" cy="780857"/>
-          </a:xfrm>
-          <a:prstGeom prst="bentConnector3">
-            <a:avLst/>
-          </a:prstGeom>
-          <a:ln w="12700">
-            <a:solidFill>
-              <a:schemeClr val="tx1"/>
-            </a:solidFill>
-            <a:tailEnd type="arrow"/>
-          </a:ln>
-        </p:spPr>
-        <p:style>
-          <a:lnRef idx="1">
-            <a:schemeClr val="accent1"/>
-          </a:lnRef>
-          <a:fillRef idx="0">
-            <a:schemeClr val="accent1"/>
-          </a:fillRef>
-          <a:effectRef idx="0">
-            <a:schemeClr val="accent1"/>
-          </a:effectRef>
-          <a:fontRef idx="minor">
-            <a:schemeClr val="tx1"/>
-          </a:fontRef>
-        </p:style>
-      </p:cxnSp>
-      <p:cxnSp>
-        <p:nvCxnSpPr>
-          <p:cNvPr id="12" name="Elbow Connector 11"/>
-          <p:cNvCxnSpPr>
-            <a:stCxn id="42" idx="0"/>
-            <a:endCxn id="129" idx="2"/>
-          </p:cNvCxnSpPr>
-          <p:nvPr/>
-        </p:nvCxnSpPr>
-        <p:spPr>
-          <a:xfrm rot="16200000" flipV="1">
-            <a:off x="4760168" y="1322766"/>
-            <a:ext cx="260506" cy="828092"/>
-          </a:xfrm>
-          <a:prstGeom prst="bentConnector3">
-            <a:avLst/>
-          </a:prstGeom>
-          <a:ln w="12700">
-            <a:solidFill>
-              <a:schemeClr val="tx1"/>
-            </a:solidFill>
-            <a:tailEnd type="arrow"/>
-          </a:ln>
-        </p:spPr>
-        <p:style>
-          <a:lnRef idx="1">
-            <a:schemeClr val="accent1"/>
-          </a:lnRef>
-          <a:fillRef idx="0">
-            <a:schemeClr val="accent1"/>
-          </a:fillRef>
-          <a:effectRef idx="0">
-            <a:schemeClr val="accent1"/>
-          </a:effectRef>
-          <a:fontRef idx="minor">
-            <a:schemeClr val="tx1"/>
-          </a:fontRef>
-        </p:style>
-      </p:cxnSp>
-      <p:cxnSp>
-        <p:nvCxnSpPr>
-          <p:cNvPr id="52" name="Elbow Connector 51"/>
-          <p:cNvCxnSpPr>
-            <a:stCxn id="50" idx="0"/>
-            <a:endCxn id="130" idx="2"/>
-          </p:cNvCxnSpPr>
-          <p:nvPr/>
-        </p:nvCxnSpPr>
-        <p:spPr>
-          <a:xfrm rot="5400000" flipH="1" flipV="1">
-            <a:off x="3841488" y="2841127"/>
-            <a:ext cx="260506" cy="959722"/>
-          </a:xfrm>
-          <a:prstGeom prst="bentConnector3">
-            <a:avLst/>
-          </a:prstGeom>
-          <a:ln w="12700">
-            <a:solidFill>
-              <a:schemeClr val="tx1"/>
-            </a:solidFill>
-            <a:tailEnd type="arrow"/>
-          </a:ln>
-        </p:spPr>
-        <p:style>
-          <a:lnRef idx="1">
-            <a:schemeClr val="accent1"/>
-          </a:lnRef>
-          <a:fillRef idx="0">
-            <a:schemeClr val="accent1"/>
-          </a:fillRef>
-          <a:effectRef idx="0">
-            <a:schemeClr val="accent1"/>
-          </a:effectRef>
-          <a:fontRef idx="minor">
-            <a:schemeClr val="tx1"/>
-          </a:fontRef>
-        </p:style>
-      </p:cxnSp>
-      <p:cxnSp>
-        <p:nvCxnSpPr>
-          <p:cNvPr id="55" name="Elbow Connector 54"/>
-          <p:cNvCxnSpPr>
-            <a:stCxn id="51" idx="0"/>
-            <a:endCxn id="130" idx="2"/>
-          </p:cNvCxnSpPr>
-          <p:nvPr/>
-        </p:nvCxnSpPr>
-        <p:spPr>
-          <a:xfrm rot="16200000" flipV="1">
-            <a:off x="4855794" y="2786543"/>
-            <a:ext cx="260506" cy="1068889"/>
-          </a:xfrm>
-          <a:prstGeom prst="bentConnector3">
-            <a:avLst>
-              <a:gd name="adj1" fmla="val 50000"/>
-            </a:avLst>
-          </a:prstGeom>
-          <a:ln w="12700">
-            <a:solidFill>
-              <a:schemeClr val="tx1"/>
-            </a:solidFill>
-            <a:tailEnd type="arrow"/>
-          </a:ln>
-        </p:spPr>
-        <p:style>
-          <a:lnRef idx="1">
-            <a:schemeClr val="accent1"/>
-          </a:lnRef>
-          <a:fillRef idx="0">
-            <a:schemeClr val="accent1"/>
-          </a:fillRef>
-          <a:effectRef idx="0">
-            <a:schemeClr val="accent1"/>
-          </a:effectRef>
-          <a:fontRef idx="minor">
-            <a:schemeClr val="tx1"/>
-          </a:fontRef>
-        </p:style>
-      </p:cxnSp>
       <p:cxnSp>
         <p:nvCxnSpPr>
           <p:cNvPr id="65" name="Straight Connector 64"/>
@@ -6000,7 +5612,7 @@
         </p:nvCxnSpPr>
         <p:spPr>
           <a:xfrm>
-            <a:off x="395536" y="4149080"/>
+            <a:off x="395536" y="4365104"/>
             <a:ext cx="8212075" cy="0"/>
           </a:xfrm>
           <a:prstGeom prst="line">
@@ -6060,13 +5672,114 @@
       </p:cxnSp>
       <p:sp>
         <p:nvSpPr>
-          <p:cNvPr id="129" name="Rectangle 128"/>
+          <p:cNvPr id="30" name="TextBox 29"/>
+          <p:cNvSpPr txBox="1"/>
+          <p:nvPr/>
+        </p:nvSpPr>
+        <p:spPr>
+          <a:xfrm>
+            <a:off x="1138185" y="1340768"/>
+            <a:ext cx="529312" cy="276999"/>
+          </a:xfrm>
+          <a:prstGeom prst="rect">
+            <a:avLst/>
+          </a:prstGeom>
+          <a:noFill/>
+        </p:spPr>
+        <p:txBody>
+          <a:bodyPr wrap="none" rtlCol="0">
+            <a:spAutoFit/>
+          </a:bodyPr>
+          <a:lstStyle/>
+          <a:p>
+            <a:pPr algn="r"/>
+            <a:r>
+              <a:rPr lang="en-CA" sz="1200" b="1" dirty="0" smtClean="0"/>
+              <a:t>Input</a:t>
+            </a:r>
+            <a:endParaRPr lang="en-CA" sz="1200" b="1" dirty="0" smtClean="0"/>
+          </a:p>
+        </p:txBody>
+      </p:sp>
+      <p:sp>
+        <p:nvSpPr>
+          <p:cNvPr id="32" name="TextBox 31"/>
+          <p:cNvSpPr txBox="1"/>
+          <p:nvPr/>
+        </p:nvSpPr>
+        <p:spPr>
+          <a:xfrm>
+            <a:off x="7239640" y="1340768"/>
+            <a:ext cx="644728" cy="276999"/>
+          </a:xfrm>
+          <a:prstGeom prst="rect">
+            <a:avLst/>
+          </a:prstGeom>
+          <a:noFill/>
+        </p:spPr>
+        <p:txBody>
+          <a:bodyPr wrap="none" rtlCol="0">
+            <a:spAutoFit/>
+          </a:bodyPr>
+          <a:lstStyle/>
+          <a:p>
+            <a:pPr algn="r"/>
+            <a:r>
+              <a:rPr lang="en-CA" sz="1200" b="1" dirty="0" smtClean="0"/>
+              <a:t>Output</a:t>
+            </a:r>
+            <a:endParaRPr lang="en-CA" sz="1200" b="1" dirty="0" smtClean="0"/>
+          </a:p>
+        </p:txBody>
+      </p:sp>
+      <p:cxnSp>
+        <p:nvCxnSpPr>
+          <p:cNvPr id="7" name="Straight Arrow Connector 6"/>
+          <p:cNvCxnSpPr>
+            <a:stCxn id="31" idx="3"/>
+            <a:endCxn id="46" idx="1"/>
+          </p:cNvCxnSpPr>
+          <p:nvPr/>
+        </p:nvCxnSpPr>
+        <p:spPr>
+          <a:xfrm>
+            <a:off x="1930514" y="1833704"/>
+            <a:ext cx="769278" cy="982886"/>
+          </a:xfrm>
+          <a:prstGeom prst="straightConnector1">
+            <a:avLst/>
+          </a:prstGeom>
+          <a:ln w="19050">
+            <a:solidFill>
+              <a:schemeClr val="tx1"/>
+            </a:solidFill>
+            <a:tailEnd type="arrow"/>
+          </a:ln>
+        </p:spPr>
+        <p:style>
+          <a:lnRef idx="1">
+            <a:schemeClr val="accent1"/>
+          </a:lnRef>
+          <a:fillRef idx="0">
+            <a:schemeClr val="accent1"/>
+          </a:fillRef>
+          <a:effectRef idx="0">
+            <a:schemeClr val="accent1"/>
+          </a:effectRef>
+          <a:fontRef idx="minor">
+            <a:schemeClr val="tx1"/>
+          </a:fontRef>
+        </p:style>
+      </p:cxnSp>
+      <p:sp>
+        <p:nvSpPr>
+          <p:cNvPr id="31" name="Rectangle 30"/>
           <p:cNvSpPr/>
           <p:nvPr/>
         </p:nvSpPr>
         <p:spPr>
           <a:xfrm>
-            <a:off x="3948701" y="1340768"/>
+            <a:off x="875167" y="1700808"/>
             <a:ext cx="1055347" cy="265791"/>
           </a:xfrm>
           <a:prstGeom prst="rect">
@@ -6102,20 +5815,210 @@
                   <a:schemeClr val="bg1"/>
                 </a:solidFill>
               </a:rPr>
-              <a:t>Channels</a:t>
-            </a:r>
-          </a:p>
-        </p:txBody>
-      </p:sp>
-      <p:sp>
-        <p:nvSpPr>
-          <p:cNvPr id="130" name="Rectangle 129"/>
+              <a:t>A Channel</a:t>
+            </a:r>
+            <a:endParaRPr lang="en-CA" sz="1200" b="1" dirty="0" smtClean="0">
+              <a:solidFill>
+                <a:schemeClr val="bg1"/>
+              </a:solidFill>
+            </a:endParaRPr>
+          </a:p>
+        </p:txBody>
+      </p:sp>
+      <p:sp>
+        <p:nvSpPr>
+          <p:cNvPr id="36" name="TextBox 35"/>
+          <p:cNvSpPr txBox="1"/>
+          <p:nvPr/>
+        </p:nvSpPr>
+        <p:spPr>
+          <a:xfrm>
+            <a:off x="5528902" y="1639832"/>
+            <a:ext cx="293670" cy="276999"/>
+          </a:xfrm>
+          <a:prstGeom prst="rect">
+            <a:avLst/>
+          </a:prstGeom>
+          <a:noFill/>
+        </p:spPr>
+        <p:txBody>
+          <a:bodyPr wrap="none" rtlCol="0">
+            <a:spAutoFit/>
+          </a:bodyPr>
+          <a:lstStyle/>
+          <a:p>
+            <a:pPr algn="r"/>
+            <a:r>
+              <a:rPr lang="en-CA" sz="1200" b="1" dirty="0" smtClean="0"/>
+              <a:t>…</a:t>
+            </a:r>
+            <a:endParaRPr lang="en-CA" sz="1200" b="1" dirty="0" smtClean="0"/>
+          </a:p>
+        </p:txBody>
+      </p:sp>
+      <p:cxnSp>
+        <p:nvCxnSpPr>
+          <p:cNvPr id="39" name="Straight Arrow Connector 38"/>
+          <p:cNvCxnSpPr>
+            <a:stCxn id="129" idx="3"/>
+          </p:cNvCxnSpPr>
+          <p:nvPr/>
+        </p:nvCxnSpPr>
+        <p:spPr>
+          <a:xfrm flipV="1">
+            <a:off x="6203410" y="1423896"/>
+            <a:ext cx="816862" cy="1"/>
+          </a:xfrm>
+          <a:prstGeom prst="straightConnector1">
+            <a:avLst/>
+          </a:prstGeom>
+          <a:ln w="19050">
+            <a:solidFill>
+              <a:schemeClr val="tx1"/>
+            </a:solidFill>
+            <a:tailEnd type="arrow"/>
+          </a:ln>
+        </p:spPr>
+        <p:style>
+          <a:lnRef idx="1">
+            <a:schemeClr val="accent1"/>
+          </a:lnRef>
+          <a:fillRef idx="0">
+            <a:schemeClr val="accent1"/>
+          </a:fillRef>
+          <a:effectRef idx="0">
+            <a:schemeClr val="accent1"/>
+          </a:effectRef>
+          <a:fontRef idx="minor">
+            <a:schemeClr val="tx1"/>
+          </a:fontRef>
+        </p:style>
+      </p:cxnSp>
+      <p:cxnSp>
+        <p:nvCxnSpPr>
+          <p:cNvPr id="43" name="Straight Arrow Connector 42"/>
+          <p:cNvCxnSpPr>
+            <a:stCxn id="35" idx="3"/>
+          </p:cNvCxnSpPr>
+          <p:nvPr/>
+        </p:nvCxnSpPr>
+        <p:spPr>
+          <a:xfrm flipV="1">
+            <a:off x="6203411" y="2143976"/>
+            <a:ext cx="816861" cy="1"/>
+          </a:xfrm>
+          <a:prstGeom prst="straightConnector1">
+            <a:avLst/>
+          </a:prstGeom>
+          <a:ln w="19050">
+            <a:solidFill>
+              <a:schemeClr val="tx1"/>
+            </a:solidFill>
+            <a:tailEnd type="arrow"/>
+          </a:ln>
+        </p:spPr>
+        <p:style>
+          <a:lnRef idx="1">
+            <a:schemeClr val="accent1"/>
+          </a:lnRef>
+          <a:fillRef idx="0">
+            <a:schemeClr val="accent1"/>
+          </a:fillRef>
+          <a:effectRef idx="0">
+            <a:schemeClr val="accent1"/>
+          </a:effectRef>
+          <a:fontRef idx="minor">
+            <a:schemeClr val="tx1"/>
+          </a:fontRef>
+        </p:style>
+      </p:cxnSp>
+      <p:cxnSp>
+        <p:nvCxnSpPr>
+          <p:cNvPr id="48" name="Straight Arrow Connector 47"/>
+          <p:cNvCxnSpPr>
+            <a:stCxn id="46" idx="3"/>
+            <a:endCxn id="129" idx="1"/>
+          </p:cNvCxnSpPr>
+          <p:nvPr/>
+        </p:nvCxnSpPr>
+        <p:spPr>
+          <a:xfrm flipV="1">
+            <a:off x="4240650" y="1423897"/>
+            <a:ext cx="907413" cy="1392693"/>
+          </a:xfrm>
+          <a:prstGeom prst="straightConnector1">
+            <a:avLst/>
+          </a:prstGeom>
+          <a:ln w="19050">
+            <a:solidFill>
+              <a:schemeClr val="tx1"/>
+            </a:solidFill>
+            <a:tailEnd type="arrow"/>
+          </a:ln>
+        </p:spPr>
+        <p:style>
+          <a:lnRef idx="1">
+            <a:schemeClr val="accent1"/>
+          </a:lnRef>
+          <a:fillRef idx="0">
+            <a:schemeClr val="accent1"/>
+          </a:fillRef>
+          <a:effectRef idx="0">
+            <a:schemeClr val="accent1"/>
+          </a:effectRef>
+          <a:fontRef idx="minor">
+            <a:schemeClr val="tx1"/>
+          </a:fontRef>
+        </p:style>
+      </p:cxnSp>
+      <p:cxnSp>
+        <p:nvCxnSpPr>
+          <p:cNvPr id="53" name="Straight Arrow Connector 52"/>
+          <p:cNvCxnSpPr>
+            <a:stCxn id="46" idx="3"/>
+            <a:endCxn id="35" idx="1"/>
+          </p:cNvCxnSpPr>
+          <p:nvPr/>
+        </p:nvCxnSpPr>
+        <p:spPr>
+          <a:xfrm flipV="1">
+            <a:off x="4240650" y="2143977"/>
+            <a:ext cx="907414" cy="672613"/>
+          </a:xfrm>
+          <a:prstGeom prst="straightConnector1">
+            <a:avLst/>
+          </a:prstGeom>
+          <a:ln w="19050">
+            <a:solidFill>
+              <a:schemeClr val="tx1"/>
+            </a:solidFill>
+            <a:tailEnd type="arrow"/>
+          </a:ln>
+        </p:spPr>
+        <p:style>
+          <a:lnRef idx="1">
+            <a:schemeClr val="accent1"/>
+          </a:lnRef>
+          <a:fillRef idx="0">
+            <a:schemeClr val="accent1"/>
+          </a:fillRef>
+          <a:effectRef idx="0">
+            <a:schemeClr val="accent1"/>
+          </a:effectRef>
+          <a:fontRef idx="minor">
+            <a:schemeClr val="tx1"/>
+          </a:fontRef>
+        </p:style>
+      </p:cxnSp>
+      <p:sp>
+        <p:nvSpPr>
+          <p:cNvPr id="129" name="Rectangle 128"/>
           <p:cNvSpPr/>
           <p:nvPr/>
         </p:nvSpPr>
         <p:spPr>
           <a:xfrm>
-            <a:off x="3923928" y="2924944"/>
+            <a:off x="5148063" y="1291001"/>
             <a:ext cx="1055347" cy="265791"/>
           </a:xfrm>
           <a:prstGeom prst="rect">
@@ -6151,21 +6054,26 @@
                   <a:schemeClr val="bg1"/>
                 </a:solidFill>
               </a:rPr>
-              <a:t>Data sources</a:t>
-            </a:r>
-          </a:p>
-        </p:txBody>
-      </p:sp>
-      <p:sp>
-        <p:nvSpPr>
-          <p:cNvPr id="51" name="Rectangle 50"/>
+              <a:t>A Channel</a:t>
+            </a:r>
+            <a:endParaRPr lang="en-CA" sz="1200" b="1" dirty="0" smtClean="0">
+              <a:solidFill>
+                <a:schemeClr val="bg1"/>
+              </a:solidFill>
+            </a:endParaRPr>
+          </a:p>
+        </p:txBody>
+      </p:sp>
+      <p:sp>
+        <p:nvSpPr>
+          <p:cNvPr id="35" name="Rectangle 34"/>
           <p:cNvSpPr/>
           <p:nvPr/>
         </p:nvSpPr>
         <p:spPr>
           <a:xfrm>
-            <a:off x="4668781" y="3451241"/>
-            <a:ext cx="1703419" cy="265791"/>
+            <a:off x="5148064" y="2011081"/>
+            <a:ext cx="1055347" cy="265791"/>
           </a:xfrm>
           <a:prstGeom prst="rect">
             <a:avLst/>
@@ -6200,21 +6108,65 @@
                   <a:schemeClr val="bg1"/>
                 </a:solidFill>
               </a:rPr>
-              <a:t>Transform data sources</a:t>
-            </a:r>
-          </a:p>
-        </p:txBody>
-      </p:sp>
-      <p:sp>
-        <p:nvSpPr>
-          <p:cNvPr id="50" name="Rectangle 49"/>
+              <a:t>A Channel</a:t>
+            </a:r>
+            <a:endParaRPr lang="en-CA" sz="1200" b="1" dirty="0" smtClean="0">
+              <a:solidFill>
+                <a:schemeClr val="bg1"/>
+              </a:solidFill>
+            </a:endParaRPr>
+          </a:p>
+        </p:txBody>
+      </p:sp>
+      <p:cxnSp>
+        <p:nvCxnSpPr>
+          <p:cNvPr id="54" name="Straight Arrow Connector 53"/>
+          <p:cNvCxnSpPr>
+            <a:stCxn id="130" idx="0"/>
+            <a:endCxn id="46" idx="2"/>
+          </p:cNvCxnSpPr>
+          <p:nvPr/>
+        </p:nvCxnSpPr>
+        <p:spPr>
+          <a:xfrm flipV="1">
+            <a:off x="3463890" y="2996267"/>
+            <a:ext cx="6331" cy="288717"/>
+          </a:xfrm>
+          <a:prstGeom prst="straightConnector1">
+            <a:avLst/>
+          </a:prstGeom>
+          <a:ln w="19050">
+            <a:solidFill>
+              <a:schemeClr val="tx1"/>
+            </a:solidFill>
+            <a:tailEnd type="arrow"/>
+          </a:ln>
+        </p:spPr>
+        <p:style>
+          <a:lnRef idx="1">
+            <a:schemeClr val="accent1"/>
+          </a:lnRef>
+          <a:fillRef idx="0">
+            <a:schemeClr val="accent1"/>
+          </a:fillRef>
+          <a:effectRef idx="0">
+            <a:schemeClr val="accent1"/>
+          </a:effectRef>
+          <a:fontRef idx="minor">
+            <a:schemeClr val="tx1"/>
+          </a:fontRef>
+        </p:style>
+      </p:cxnSp>
+      <p:sp>
+        <p:nvSpPr>
+          <p:cNvPr id="46" name="Rectangle 45"/>
           <p:cNvSpPr/>
           <p:nvPr/>
         </p:nvSpPr>
         <p:spPr>
           <a:xfrm>
-            <a:off x="2771800" y="3451241"/>
-            <a:ext cx="1440160" cy="265791"/>
+            <a:off x="2699792" y="2636912"/>
+            <a:ext cx="1540858" cy="359355"/>
           </a:xfrm>
           <a:prstGeom prst="rect">
             <a:avLst/>
@@ -6249,21 +6201,26 @@
                   <a:schemeClr val="bg1"/>
                 </a:solidFill>
               </a:rPr>
-              <a:t>Video data sources</a:t>
-            </a:r>
-          </a:p>
-        </p:txBody>
-      </p:sp>
-      <p:sp>
-        <p:nvSpPr>
-          <p:cNvPr id="41" name="Rectangle 40"/>
+              <a:t>Data Processing</a:t>
+            </a:r>
+            <a:endParaRPr lang="en-CA" sz="1200" b="1" dirty="0">
+              <a:solidFill>
+                <a:schemeClr val="bg1"/>
+              </a:solidFill>
+            </a:endParaRPr>
+          </a:p>
+        </p:txBody>
+      </p:sp>
+      <p:sp>
+        <p:nvSpPr>
+          <p:cNvPr id="130" name="Rectangle 129"/>
           <p:cNvSpPr/>
           <p:nvPr/>
         </p:nvSpPr>
         <p:spPr>
           <a:xfrm>
-            <a:off x="3059832" y="1867065"/>
-            <a:ext cx="1271371" cy="265791"/>
+            <a:off x="2859836" y="3284984"/>
+            <a:ext cx="1208108" cy="359356"/>
           </a:xfrm>
           <a:prstGeom prst="rect">
             <a:avLst/>
@@ -6298,21 +6255,21 @@
                   <a:schemeClr val="bg1"/>
                 </a:solidFill>
               </a:rPr>
-              <a:t>Input Channels</a:t>
-            </a:r>
-          </a:p>
-        </p:txBody>
-      </p:sp>
-      <p:sp>
-        <p:nvSpPr>
-          <p:cNvPr id="42" name="Rectangle 41"/>
+              <a:t>Data sources</a:t>
+            </a:r>
+          </a:p>
+        </p:txBody>
+      </p:sp>
+      <p:sp>
+        <p:nvSpPr>
+          <p:cNvPr id="50" name="Rectangle 49"/>
           <p:cNvSpPr/>
           <p:nvPr/>
         </p:nvSpPr>
         <p:spPr>
           <a:xfrm>
-            <a:off x="4668781" y="1867065"/>
-            <a:ext cx="1271371" cy="265791"/>
+            <a:off x="3974276" y="3511444"/>
+            <a:ext cx="1440160" cy="265791"/>
           </a:xfrm>
           <a:prstGeom prst="rect">
             <a:avLst/>
@@ -6347,7 +6304,56 @@
                   <a:schemeClr val="bg1"/>
                 </a:solidFill>
               </a:rPr>
-              <a:t>Output Channels</a:t>
+              <a:t>Video data sources</a:t>
+            </a:r>
+          </a:p>
+        </p:txBody>
+      </p:sp>
+      <p:sp>
+        <p:nvSpPr>
+          <p:cNvPr id="51" name="Rectangle 50"/>
+          <p:cNvSpPr/>
+          <p:nvPr/>
+        </p:nvSpPr>
+        <p:spPr>
+          <a:xfrm>
+            <a:off x="3974277" y="3777235"/>
+            <a:ext cx="1440159" cy="432048"/>
+          </a:xfrm>
+          <a:prstGeom prst="rect">
+            <a:avLst/>
+          </a:prstGeom>
+          <a:solidFill>
+            <a:srgbClr val="33889F"/>
+          </a:solidFill>
+          <a:ln/>
+        </p:spPr>
+        <p:style>
+          <a:lnRef idx="3">
+            <a:schemeClr val="lt1"/>
+          </a:lnRef>
+          <a:fillRef idx="1">
+            <a:schemeClr val="accent5"/>
+          </a:fillRef>
+          <a:effectRef idx="1">
+            <a:schemeClr val="accent5"/>
+          </a:effectRef>
+          <a:fontRef idx="minor">
+            <a:schemeClr val="lt1"/>
+          </a:fontRef>
+        </p:style>
+        <p:txBody>
+          <a:bodyPr rtlCol="0" anchor="ctr"/>
+          <a:lstStyle/>
+          <a:p>
+            <a:pPr algn="ctr"/>
+            <a:r>
+              <a:rPr lang="en-CA" sz="1200" b="1" dirty="0" smtClean="0">
+                <a:solidFill>
+                  <a:schemeClr val="bg1"/>
+                </a:solidFill>
+              </a:rPr>
+              <a:t>Transform data sources</a:t>
             </a:r>
           </a:p>
         </p:txBody>

</xml_diff>

<commit_message>
re #712 changes to arch doc
git-svn-id: https://subversion.assembla.com/svn/plus/trunk/doc@2742 c04e96f8-ac36-4ff2-8b34-4a5e34ef045f
</commit_message>
<xml_diff>
--- a/overview/PlusArchitectureOverview.pptx
+++ b/overview/PlusArchitectureOverview.pptx
@@ -201,7 +201,7 @@
             <a:fld id="{A6E16264-6225-448A-8F6B-37C607BF693C}" type="datetimeFigureOut">
               <a:rPr lang="en-CA" smtClean="0"/>
               <a:pPr/>
-              <a:t>02/05/2013</a:t>
+              <a:t>03/05/2013</a:t>
             </a:fld>
             <a:endParaRPr lang="en-CA"/>
           </a:p>
@@ -707,6 +707,14 @@
           <a:bodyPr/>
           <a:lstStyle/>
           <a:p>
+            <a:r>
+              <a:rPr lang="en-US" dirty="0" smtClean="0"/>
+              <a:t>Demonstrate the logical</a:t>
+            </a:r>
+            <a:r>
+              <a:rPr lang="en-US" baseline="0" dirty="0" smtClean="0"/>
+              <a:t> structure of a device</a:t>
+            </a:r>
             <a:endParaRPr lang="en-US" dirty="0"/>
           </a:p>
         </p:txBody>
@@ -1427,7 +1435,7 @@
             <a:fld id="{E843F943-FC4A-4610-812B-19459293E20B}" type="datetime1">
               <a:rPr lang="en-CA" smtClean="0"/>
               <a:pPr/>
-              <a:t>02/05/2013</a:t>
+              <a:t>03/05/2013</a:t>
             </a:fld>
             <a:endParaRPr lang="en-CA" dirty="0"/>
           </a:p>
@@ -1726,7 +1734,7 @@
             <a:fld id="{7EC20259-AFA4-42BB-B1F2-1723D3175E09}" type="datetime1">
               <a:rPr lang="en-CA" smtClean="0"/>
               <a:pPr/>
-              <a:t>02/05/2013</a:t>
+              <a:t>03/05/2013</a:t>
             </a:fld>
             <a:endParaRPr lang="en-CA"/>
           </a:p>
@@ -1930,7 +1938,7 @@
             <a:fld id="{7EC20259-AFA4-42BB-B1F2-1723D3175E09}" type="datetime1">
               <a:rPr lang="en-CA" smtClean="0"/>
               <a:pPr/>
-              <a:t>02/05/2013</a:t>
+              <a:t>03/05/2013</a:t>
             </a:fld>
             <a:endParaRPr lang="en-CA"/>
           </a:p>
@@ -2212,7 +2220,7 @@
             <a:fld id="{0B273A97-7724-4AE7-A6F1-5A1F5D1DB72A}" type="datetime1">
               <a:rPr lang="en-CA" smtClean="0"/>
               <a:pPr/>
-              <a:t>02/05/2013</a:t>
+              <a:t>03/05/2013</a:t>
             </a:fld>
             <a:endParaRPr lang="en-CA"/>
           </a:p>
@@ -4810,11 +4818,6 @@
               </a:rPr>
               <a:t>Device Specific SDK</a:t>
             </a:r>
-            <a:endParaRPr lang="en-CA" sz="1200" b="1" dirty="0" smtClean="0">
-              <a:solidFill>
-                <a:schemeClr val="bg1"/>
-              </a:solidFill>
-            </a:endParaRPr>
           </a:p>
         </p:txBody>
       </p:sp>
@@ -4878,7 +4881,6 @@
               <a:rPr lang="en-CA" sz="1200" b="1" dirty="0" smtClean="0"/>
               <a:t>Applications</a:t>
             </a:r>
-            <a:endParaRPr lang="en-CA" sz="1200" b="1" dirty="0" smtClean="0"/>
           </a:p>
         </p:txBody>
       </p:sp>
@@ -5286,15 +5288,7 @@
                   <a:srgbClr val="800000"/>
                 </a:solidFill>
               </a:rPr>
-              <a:t>Inside A </a:t>
-            </a:r>
-            <a:r>
-              <a:rPr lang="en-CA" b="1" dirty="0" smtClean="0">
-                <a:solidFill>
-                  <a:srgbClr val="800000"/>
-                </a:solidFill>
-              </a:rPr>
-              <a:t>Device</a:t>
+              <a:t>Inside A Device</a:t>
             </a:r>
             <a:endParaRPr lang="en-CA" b="1" dirty="0">
               <a:solidFill>
@@ -5428,7 +5422,7 @@
           </p:nvSpPr>
           <p:spPr>
             <a:xfrm>
-              <a:off x="3806758" y="5631474"/>
+              <a:off x="4041498" y="5631474"/>
               <a:ext cx="1376897" cy="317806"/>
             </a:xfrm>
             <a:prstGeom prst="rect">
@@ -5481,9 +5475,9 @@
             <p:nvPr/>
           </p:nvCxnSpPr>
           <p:spPr>
-            <a:xfrm flipH="1">
-              <a:off x="4495207" y="4948319"/>
-              <a:ext cx="6330" cy="683155"/>
+            <a:xfrm>
+              <a:off x="4729947" y="4948319"/>
+              <a:ext cx="0" cy="683155"/>
             </a:xfrm>
             <a:prstGeom prst="line">
               <a:avLst/>
@@ -5518,7 +5512,7 @@
           </p:nvSpPr>
           <p:spPr>
             <a:xfrm>
-              <a:off x="1033546" y="3086354"/>
+              <a:off x="1033546" y="3812555"/>
               <a:ext cx="748859" cy="310393"/>
             </a:xfrm>
             <a:prstGeom prst="rect">
@@ -5537,7 +5531,6 @@
                 <a:rPr lang="en-CA" sz="1200" b="1" dirty="0" smtClean="0"/>
                 <a:t>Internals</a:t>
               </a:r>
-              <a:endParaRPr lang="en-CA" sz="1200" b="1" dirty="0" smtClean="0"/>
             </a:p>
           </p:txBody>
         </p:sp>
@@ -5549,8 +5542,8 @@
           </p:nvSpPr>
           <p:spPr>
             <a:xfrm>
-              <a:off x="3731108" y="4607083"/>
-              <a:ext cx="1540858" cy="341236"/>
+              <a:off x="4009867" y="4607083"/>
+              <a:ext cx="1440160" cy="341236"/>
             </a:xfrm>
             <a:prstGeom prst="rect">
               <a:avLst/>
@@ -5585,15 +5578,7 @@
                     <a:schemeClr val="bg1"/>
                   </a:solidFill>
                 </a:rPr>
-                <a:t>Devic</a:t>
-              </a:r>
-              <a:r>
-                <a:rPr lang="en-CA" sz="1200" b="1" dirty="0" smtClean="0">
-                  <a:solidFill>
-                    <a:schemeClr val="bg1"/>
-                  </a:solidFill>
-                </a:rPr>
-                <a:t>e Specific SDK</a:t>
+                <a:t>Device Specific SDK</a:t>
               </a:r>
               <a:endParaRPr lang="en-CA" sz="1200" b="1" dirty="0">
                 <a:solidFill>
@@ -5606,13 +5591,13 @@
       </p:grpSp>
       <p:cxnSp>
         <p:nvCxnSpPr>
-          <p:cNvPr id="65" name="Straight Connector 64"/>
+          <p:cNvPr id="66" name="Straight Connector 65"/>
           <p:cNvCxnSpPr/>
           <p:nvPr/>
         </p:nvCxnSpPr>
         <p:spPr>
           <a:xfrm>
-            <a:off x="395536" y="4365104"/>
+            <a:off x="392373" y="2492896"/>
             <a:ext cx="8212075" cy="0"/>
           </a:xfrm>
           <a:prstGeom prst="line">
@@ -5637,39 +5622,6 @@
           </a:fontRef>
         </p:style>
       </p:cxnSp>
-      <p:cxnSp>
-        <p:nvCxnSpPr>
-          <p:cNvPr id="66" name="Straight Connector 65"/>
-          <p:cNvCxnSpPr/>
-          <p:nvPr/>
-        </p:nvCxnSpPr>
-        <p:spPr>
-          <a:xfrm>
-            <a:off x="392373" y="2492896"/>
-            <a:ext cx="8212075" cy="0"/>
-          </a:xfrm>
-          <a:prstGeom prst="line">
-            <a:avLst/>
-          </a:prstGeom>
-          <a:ln w="28575">
-            <a:prstDash val="lgDash"/>
-          </a:ln>
-        </p:spPr>
-        <p:style>
-          <a:lnRef idx="1">
-            <a:schemeClr val="accent1"/>
-          </a:lnRef>
-          <a:fillRef idx="0">
-            <a:schemeClr val="accent1"/>
-          </a:fillRef>
-          <a:effectRef idx="0">
-            <a:schemeClr val="accent1"/>
-          </a:effectRef>
-          <a:fontRef idx="minor">
-            <a:schemeClr val="tx1"/>
-          </a:fontRef>
-        </p:style>
-      </p:cxnSp>
       <p:sp>
         <p:nvSpPr>
           <p:cNvPr id="30" name="TextBox 29"/>
@@ -5697,7 +5649,6 @@
               <a:rPr lang="en-CA" sz="1200" b="1" dirty="0" smtClean="0"/>
               <a:t>Input</a:t>
             </a:r>
-            <a:endParaRPr lang="en-CA" sz="1200" b="1" dirty="0" smtClean="0"/>
           </a:p>
         </p:txBody>
       </p:sp>
@@ -5728,49 +5679,9 @@
               <a:rPr lang="en-CA" sz="1200" b="1" dirty="0" smtClean="0"/>
               <a:t>Output</a:t>
             </a:r>
-            <a:endParaRPr lang="en-CA" sz="1200" b="1" dirty="0" smtClean="0"/>
-          </a:p>
-        </p:txBody>
-      </p:sp>
-      <p:cxnSp>
-        <p:nvCxnSpPr>
-          <p:cNvPr id="7" name="Straight Arrow Connector 6"/>
-          <p:cNvCxnSpPr>
-            <a:stCxn id="31" idx="3"/>
-            <a:endCxn id="46" idx="1"/>
-          </p:cNvCxnSpPr>
-          <p:nvPr/>
-        </p:nvCxnSpPr>
-        <p:spPr>
-          <a:xfrm>
-            <a:off x="1930514" y="1833704"/>
-            <a:ext cx="769278" cy="982886"/>
-          </a:xfrm>
-          <a:prstGeom prst="straightConnector1">
-            <a:avLst/>
-          </a:prstGeom>
-          <a:ln w="19050">
-            <a:solidFill>
-              <a:schemeClr val="tx1"/>
-            </a:solidFill>
-            <a:tailEnd type="arrow"/>
-          </a:ln>
-        </p:spPr>
-        <p:style>
-          <a:lnRef idx="1">
-            <a:schemeClr val="accent1"/>
-          </a:lnRef>
-          <a:fillRef idx="0">
-            <a:schemeClr val="accent1"/>
-          </a:fillRef>
-          <a:effectRef idx="0">
-            <a:schemeClr val="accent1"/>
-          </a:effectRef>
-          <a:fontRef idx="minor">
-            <a:schemeClr val="tx1"/>
-          </a:fontRef>
-        </p:style>
-      </p:cxnSp>
+          </a:p>
+        </p:txBody>
+      </p:sp>
       <p:sp>
         <p:nvSpPr>
           <p:cNvPr id="31" name="Rectangle 30"/>
@@ -5817,11 +5728,6 @@
               </a:rPr>
               <a:t>A Channel</a:t>
             </a:r>
-            <a:endParaRPr lang="en-CA" sz="1200" b="1" dirty="0" smtClean="0">
-              <a:solidFill>
-                <a:schemeClr val="bg1"/>
-              </a:solidFill>
-            </a:endParaRPr>
           </a:p>
         </p:txBody>
       </p:sp>
@@ -5852,7 +5758,6 @@
               <a:rPr lang="en-CA" sz="1200" b="1" dirty="0" smtClean="0"/>
               <a:t>…</a:t>
             </a:r>
-            <a:endParaRPr lang="en-CA" sz="1200" b="1" dirty="0" smtClean="0"/>
           </a:p>
         </p:txBody>
       </p:sp>
@@ -5934,20 +5839,208 @@
       </p:cxnSp>
       <p:cxnSp>
         <p:nvCxnSpPr>
-          <p:cNvPr id="48" name="Straight Arrow Connector 47"/>
+          <p:cNvPr id="54" name="Straight Arrow Connector 53"/>
           <p:cNvCxnSpPr>
-            <a:stCxn id="46" idx="3"/>
-            <a:endCxn id="129" idx="1"/>
+            <a:stCxn id="130" idx="0"/>
+            <a:endCxn id="46" idx="2"/>
           </p:cNvCxnSpPr>
           <p:nvPr/>
         </p:nvCxnSpPr>
         <p:spPr>
           <a:xfrm flipV="1">
-            <a:off x="4240650" y="1423897"/>
-            <a:ext cx="907413" cy="1392693"/>
+            <a:off x="3463890" y="2996267"/>
+            <a:ext cx="6331" cy="288717"/>
           </a:xfrm>
           <a:prstGeom prst="straightConnector1">
             <a:avLst/>
+          </a:prstGeom>
+          <a:ln w="19050">
+            <a:solidFill>
+              <a:schemeClr val="tx1"/>
+            </a:solidFill>
+            <a:tailEnd type="arrow"/>
+          </a:ln>
+        </p:spPr>
+        <p:style>
+          <a:lnRef idx="1">
+            <a:schemeClr val="accent1"/>
+          </a:lnRef>
+          <a:fillRef idx="0">
+            <a:schemeClr val="accent1"/>
+          </a:fillRef>
+          <a:effectRef idx="0">
+            <a:schemeClr val="accent1"/>
+          </a:effectRef>
+          <a:fontRef idx="minor">
+            <a:schemeClr val="tx1"/>
+          </a:fontRef>
+        </p:style>
+      </p:cxnSp>
+      <p:sp>
+        <p:nvSpPr>
+          <p:cNvPr id="130" name="Rectangle 129"/>
+          <p:cNvSpPr/>
+          <p:nvPr/>
+        </p:nvSpPr>
+        <p:spPr>
+          <a:xfrm>
+            <a:off x="2859836" y="3284984"/>
+            <a:ext cx="1208108" cy="359356"/>
+          </a:xfrm>
+          <a:prstGeom prst="rect">
+            <a:avLst/>
+          </a:prstGeom>
+          <a:solidFill>
+            <a:srgbClr val="33889F"/>
+          </a:solidFill>
+          <a:ln/>
+        </p:spPr>
+        <p:style>
+          <a:lnRef idx="3">
+            <a:schemeClr val="lt1"/>
+          </a:lnRef>
+          <a:fillRef idx="1">
+            <a:schemeClr val="accent5"/>
+          </a:fillRef>
+          <a:effectRef idx="1">
+            <a:schemeClr val="accent5"/>
+          </a:effectRef>
+          <a:fontRef idx="minor">
+            <a:schemeClr val="lt1"/>
+          </a:fontRef>
+        </p:style>
+        <p:txBody>
+          <a:bodyPr rtlCol="0" anchor="ctr"/>
+          <a:lstStyle/>
+          <a:p>
+            <a:pPr algn="ctr"/>
+            <a:r>
+              <a:rPr lang="en-CA" sz="1200" b="1" dirty="0" smtClean="0">
+                <a:solidFill>
+                  <a:schemeClr val="bg1"/>
+                </a:solidFill>
+              </a:rPr>
+              <a:t>Data sources</a:t>
+            </a:r>
+          </a:p>
+        </p:txBody>
+      </p:sp>
+      <p:sp>
+        <p:nvSpPr>
+          <p:cNvPr id="50" name="Rectangle 49"/>
+          <p:cNvSpPr/>
+          <p:nvPr/>
+        </p:nvSpPr>
+        <p:spPr>
+          <a:xfrm>
+            <a:off x="3974276" y="3511444"/>
+            <a:ext cx="1440160" cy="265791"/>
+          </a:xfrm>
+          <a:prstGeom prst="rect">
+            <a:avLst/>
+          </a:prstGeom>
+          <a:solidFill>
+            <a:srgbClr val="33889F"/>
+          </a:solidFill>
+          <a:ln/>
+        </p:spPr>
+        <p:style>
+          <a:lnRef idx="3">
+            <a:schemeClr val="lt1"/>
+          </a:lnRef>
+          <a:fillRef idx="1">
+            <a:schemeClr val="accent5"/>
+          </a:fillRef>
+          <a:effectRef idx="1">
+            <a:schemeClr val="accent5"/>
+          </a:effectRef>
+          <a:fontRef idx="minor">
+            <a:schemeClr val="lt1"/>
+          </a:fontRef>
+        </p:style>
+        <p:txBody>
+          <a:bodyPr rtlCol="0" anchor="ctr"/>
+          <a:lstStyle/>
+          <a:p>
+            <a:pPr algn="ctr"/>
+            <a:r>
+              <a:rPr lang="en-CA" sz="1200" b="1" dirty="0" smtClean="0">
+                <a:solidFill>
+                  <a:schemeClr val="bg1"/>
+                </a:solidFill>
+              </a:rPr>
+              <a:t>Video data sources</a:t>
+            </a:r>
+          </a:p>
+        </p:txBody>
+      </p:sp>
+      <p:sp>
+        <p:nvSpPr>
+          <p:cNvPr id="51" name="Rectangle 50"/>
+          <p:cNvSpPr/>
+          <p:nvPr/>
+        </p:nvSpPr>
+        <p:spPr>
+          <a:xfrm>
+            <a:off x="3974277" y="3777235"/>
+            <a:ext cx="1440159" cy="432048"/>
+          </a:xfrm>
+          <a:prstGeom prst="rect">
+            <a:avLst/>
+          </a:prstGeom>
+          <a:solidFill>
+            <a:srgbClr val="33889F"/>
+          </a:solidFill>
+          <a:ln/>
+        </p:spPr>
+        <p:style>
+          <a:lnRef idx="3">
+            <a:schemeClr val="lt1"/>
+          </a:lnRef>
+          <a:fillRef idx="1">
+            <a:schemeClr val="accent5"/>
+          </a:fillRef>
+          <a:effectRef idx="1">
+            <a:schemeClr val="accent5"/>
+          </a:effectRef>
+          <a:fontRef idx="minor">
+            <a:schemeClr val="lt1"/>
+          </a:fontRef>
+        </p:style>
+        <p:txBody>
+          <a:bodyPr rtlCol="0" anchor="ctr"/>
+          <a:lstStyle/>
+          <a:p>
+            <a:pPr algn="ctr"/>
+            <a:r>
+              <a:rPr lang="en-CA" sz="1200" b="1" dirty="0" smtClean="0">
+                <a:solidFill>
+                  <a:schemeClr val="bg1"/>
+                </a:solidFill>
+              </a:rPr>
+              <a:t>Transform data sources</a:t>
+            </a:r>
+          </a:p>
+        </p:txBody>
+      </p:sp>
+      <p:cxnSp>
+        <p:nvCxnSpPr>
+          <p:cNvPr id="3" name="Elbow Connector 2"/>
+          <p:cNvCxnSpPr>
+            <a:stCxn id="31" idx="3"/>
+            <a:endCxn id="46" idx="1"/>
+          </p:cNvCxnSpPr>
+          <p:nvPr/>
+        </p:nvCxnSpPr>
+        <p:spPr>
+          <a:xfrm>
+            <a:off x="1930514" y="1833704"/>
+            <a:ext cx="769278" cy="982886"/>
+          </a:xfrm>
+          <a:prstGeom prst="bentConnector3">
+            <a:avLst>
+              <a:gd name="adj1" fmla="val 72217"/>
+            </a:avLst>
           </a:prstGeom>
           <a:ln w="19050">
             <a:solidFill>
@@ -5973,7 +6066,7 @@
       </p:cxnSp>
       <p:cxnSp>
         <p:nvCxnSpPr>
-          <p:cNvPr id="53" name="Straight Arrow Connector 52"/>
+          <p:cNvPr id="33" name="Elbow Connector 32"/>
           <p:cNvCxnSpPr>
             <a:stCxn id="46" idx="3"/>
             <a:endCxn id="35" idx="1"/>
@@ -5985,8 +6078,10 @@
             <a:off x="4240650" y="2143977"/>
             <a:ext cx="907414" cy="672613"/>
           </a:xfrm>
-          <a:prstGeom prst="straightConnector1">
-            <a:avLst/>
+          <a:prstGeom prst="bentConnector3">
+            <a:avLst>
+              <a:gd name="adj1" fmla="val 50000"/>
+            </a:avLst>
           </a:prstGeom>
           <a:ln w="19050">
             <a:solidFill>
@@ -6010,130 +6105,24 @@
           </a:fontRef>
         </p:style>
       </p:cxnSp>
-      <p:sp>
-        <p:nvSpPr>
-          <p:cNvPr id="129" name="Rectangle 128"/>
-          <p:cNvSpPr/>
-          <p:nvPr/>
-        </p:nvSpPr>
-        <p:spPr>
-          <a:xfrm>
-            <a:off x="5148063" y="1291001"/>
-            <a:ext cx="1055347" cy="265791"/>
-          </a:xfrm>
-          <a:prstGeom prst="rect">
-            <a:avLst/>
-          </a:prstGeom>
-          <a:solidFill>
-            <a:srgbClr val="33889F"/>
-          </a:solidFill>
-          <a:ln/>
-        </p:spPr>
-        <p:style>
-          <a:lnRef idx="3">
-            <a:schemeClr val="lt1"/>
-          </a:lnRef>
-          <a:fillRef idx="1">
-            <a:schemeClr val="accent5"/>
-          </a:fillRef>
-          <a:effectRef idx="1">
-            <a:schemeClr val="accent5"/>
-          </a:effectRef>
-          <a:fontRef idx="minor">
-            <a:schemeClr val="lt1"/>
-          </a:fontRef>
-        </p:style>
-        <p:txBody>
-          <a:bodyPr rtlCol="0" anchor="ctr"/>
-          <a:lstStyle/>
-          <a:p>
-            <a:pPr algn="ctr"/>
-            <a:r>
-              <a:rPr lang="en-CA" sz="1200" b="1" dirty="0" smtClean="0">
-                <a:solidFill>
-                  <a:schemeClr val="bg1"/>
-                </a:solidFill>
-              </a:rPr>
-              <a:t>A Channel</a:t>
-            </a:r>
-            <a:endParaRPr lang="en-CA" sz="1200" b="1" dirty="0" smtClean="0">
-              <a:solidFill>
-                <a:schemeClr val="bg1"/>
-              </a:solidFill>
-            </a:endParaRPr>
-          </a:p>
-        </p:txBody>
-      </p:sp>
-      <p:sp>
-        <p:nvSpPr>
-          <p:cNvPr id="35" name="Rectangle 34"/>
-          <p:cNvSpPr/>
-          <p:nvPr/>
-        </p:nvSpPr>
-        <p:spPr>
-          <a:xfrm>
-            <a:off x="5148064" y="2011081"/>
-            <a:ext cx="1055347" cy="265791"/>
-          </a:xfrm>
-          <a:prstGeom prst="rect">
-            <a:avLst/>
-          </a:prstGeom>
-          <a:solidFill>
-            <a:srgbClr val="33889F"/>
-          </a:solidFill>
-          <a:ln/>
-        </p:spPr>
-        <p:style>
-          <a:lnRef idx="3">
-            <a:schemeClr val="lt1"/>
-          </a:lnRef>
-          <a:fillRef idx="1">
-            <a:schemeClr val="accent5"/>
-          </a:fillRef>
-          <a:effectRef idx="1">
-            <a:schemeClr val="accent5"/>
-          </a:effectRef>
-          <a:fontRef idx="minor">
-            <a:schemeClr val="lt1"/>
-          </a:fontRef>
-        </p:style>
-        <p:txBody>
-          <a:bodyPr rtlCol="0" anchor="ctr"/>
-          <a:lstStyle/>
-          <a:p>
-            <a:pPr algn="ctr"/>
-            <a:r>
-              <a:rPr lang="en-CA" sz="1200" b="1" dirty="0" smtClean="0">
-                <a:solidFill>
-                  <a:schemeClr val="bg1"/>
-                </a:solidFill>
-              </a:rPr>
-              <a:t>A Channel</a:t>
-            </a:r>
-            <a:endParaRPr lang="en-CA" sz="1200" b="1" dirty="0" smtClean="0">
-              <a:solidFill>
-                <a:schemeClr val="bg1"/>
-              </a:solidFill>
-            </a:endParaRPr>
-          </a:p>
-        </p:txBody>
-      </p:sp>
       <p:cxnSp>
         <p:nvCxnSpPr>
-          <p:cNvPr id="54" name="Straight Arrow Connector 53"/>
+          <p:cNvPr id="37" name="Elbow Connector 36"/>
           <p:cNvCxnSpPr>
-            <a:stCxn id="130" idx="0"/>
-            <a:endCxn id="46" idx="2"/>
+            <a:stCxn id="46" idx="3"/>
+            <a:endCxn id="129" idx="1"/>
           </p:cNvCxnSpPr>
           <p:nvPr/>
         </p:nvCxnSpPr>
         <p:spPr>
           <a:xfrm flipV="1">
-            <a:off x="3463890" y="2996267"/>
-            <a:ext cx="6331" cy="288717"/>
-          </a:xfrm>
-          <a:prstGeom prst="straightConnector1">
-            <a:avLst/>
+            <a:off x="4240650" y="1423897"/>
+            <a:ext cx="907413" cy="1392693"/>
+          </a:xfrm>
+          <a:prstGeom prst="bentConnector3">
+            <a:avLst>
+              <a:gd name="adj1" fmla="val 50000"/>
+            </a:avLst>
           </a:prstGeom>
           <a:ln w="19050">
             <a:solidFill>
@@ -6213,14 +6202,14 @@
       </p:sp>
       <p:sp>
         <p:nvSpPr>
-          <p:cNvPr id="130" name="Rectangle 129"/>
+          <p:cNvPr id="35" name="Rectangle 34"/>
           <p:cNvSpPr/>
           <p:nvPr/>
         </p:nvSpPr>
         <p:spPr>
           <a:xfrm>
-            <a:off x="2859836" y="3284984"/>
-            <a:ext cx="1208108" cy="359356"/>
+            <a:off x="5148064" y="2011081"/>
+            <a:ext cx="1055347" cy="265791"/>
           </a:xfrm>
           <a:prstGeom prst="rect">
             <a:avLst/>
@@ -6255,21 +6244,21 @@
                   <a:schemeClr val="bg1"/>
                 </a:solidFill>
               </a:rPr>
-              <a:t>Data sources</a:t>
-            </a:r>
-          </a:p>
-        </p:txBody>
-      </p:sp>
-      <p:sp>
-        <p:nvSpPr>
-          <p:cNvPr id="50" name="Rectangle 49"/>
+              <a:t>A Channel</a:t>
+            </a:r>
+          </a:p>
+        </p:txBody>
+      </p:sp>
+      <p:sp>
+        <p:nvSpPr>
+          <p:cNvPr id="129" name="Rectangle 128"/>
           <p:cNvSpPr/>
           <p:nvPr/>
         </p:nvSpPr>
         <p:spPr>
           <a:xfrm>
-            <a:off x="3974276" y="3511444"/>
-            <a:ext cx="1440160" cy="265791"/>
+            <a:off x="5148063" y="1291001"/>
+            <a:ext cx="1055347" cy="265791"/>
           </a:xfrm>
           <a:prstGeom prst="rect">
             <a:avLst/>
@@ -6304,56 +6293,7 @@
                   <a:schemeClr val="bg1"/>
                 </a:solidFill>
               </a:rPr>
-              <a:t>Video data sources</a:t>
-            </a:r>
-          </a:p>
-        </p:txBody>
-      </p:sp>
-      <p:sp>
-        <p:nvSpPr>
-          <p:cNvPr id="51" name="Rectangle 50"/>
-          <p:cNvSpPr/>
-          <p:nvPr/>
-        </p:nvSpPr>
-        <p:spPr>
-          <a:xfrm>
-            <a:off x="3974277" y="3777235"/>
-            <a:ext cx="1440159" cy="432048"/>
-          </a:xfrm>
-          <a:prstGeom prst="rect">
-            <a:avLst/>
-          </a:prstGeom>
-          <a:solidFill>
-            <a:srgbClr val="33889F"/>
-          </a:solidFill>
-          <a:ln/>
-        </p:spPr>
-        <p:style>
-          <a:lnRef idx="3">
-            <a:schemeClr val="lt1"/>
-          </a:lnRef>
-          <a:fillRef idx="1">
-            <a:schemeClr val="accent5"/>
-          </a:fillRef>
-          <a:effectRef idx="1">
-            <a:schemeClr val="accent5"/>
-          </a:effectRef>
-          <a:fontRef idx="minor">
-            <a:schemeClr val="lt1"/>
-          </a:fontRef>
-        </p:style>
-        <p:txBody>
-          <a:bodyPr rtlCol="0" anchor="ctr"/>
-          <a:lstStyle/>
-          <a:p>
-            <a:pPr algn="ctr"/>
-            <a:r>
-              <a:rPr lang="en-CA" sz="1200" b="1" dirty="0" smtClean="0">
-                <a:solidFill>
-                  <a:schemeClr val="bg1"/>
-                </a:solidFill>
-              </a:rPr>
-              <a:t>Transform data sources</a:t>
+              <a:t>A Channel</a:t>
             </a:r>
           </a:p>
         </p:txBody>

</xml_diff>

<commit_message>
re #712 spacing of text
git-svn-id: https://subversion.assembla.com/svn/plus/trunk/doc@2744 c04e96f8-ac36-4ff2-8b34-4a5e34ef045f
</commit_message>
<xml_diff>
--- a/overview/PlusArchitectureOverview.pptx
+++ b/overview/PlusArchitectureOverview.pptx
@@ -3533,7 +3533,7 @@
         </p:nvSpPr>
         <p:spPr>
           <a:xfrm>
-            <a:off x="539552" y="4953043"/>
+            <a:off x="539552" y="5025051"/>
             <a:ext cx="1656184" cy="348165"/>
           </a:xfrm>
           <a:prstGeom prst="rect">
@@ -3714,7 +3714,7 @@
         </p:nvSpPr>
         <p:spPr>
           <a:xfrm>
-            <a:off x="2267744" y="4941168"/>
+            <a:off x="2267744" y="5014917"/>
             <a:ext cx="6552728" cy="646331"/>
           </a:xfrm>
           <a:prstGeom prst="rect">

</xml_diff>

<commit_message>
re #712 Cleaning up architecture diagram, removing example single device slide
git-svn-id: https://subversion.assembla.com/svn/plus/trunk/doc@2745 c04e96f8-ac36-4ff2-8b34-4a5e34ef045f
</commit_message>
<xml_diff>
--- a/overview/PlusArchitectureOverview.pptx
+++ b/overview/PlusArchitectureOverview.pptx
@@ -5,7 +5,7 @@
     <p:sldMasterId id="2147483648" r:id="rId1"/>
   </p:sldMasterIdLst>
   <p:notesMasterIdLst>
-    <p:notesMasterId r:id="rId11"/>
+    <p:notesMasterId r:id="rId10"/>
   </p:notesMasterIdLst>
   <p:sldIdLst>
     <p:sldId id="256" r:id="rId2"/>
@@ -14,9 +14,8 @@
     <p:sldId id="419" r:id="rId5"/>
     <p:sldId id="420" r:id="rId6"/>
     <p:sldId id="421" r:id="rId7"/>
-    <p:sldId id="424" r:id="rId8"/>
-    <p:sldId id="425" r:id="rId9"/>
-    <p:sldId id="426" r:id="rId10"/>
+    <p:sldId id="425" r:id="rId8"/>
+    <p:sldId id="426" r:id="rId9"/>
   </p:sldIdLst>
   <p:sldSz cx="9144000" cy="6858000" type="screen4x3"/>
   <p:notesSz cx="6858000" cy="9144000"/>
@@ -1015,18 +1014,6 @@
           <a:bodyPr/>
           <a:lstStyle/>
           <a:p>
-            <a:r>
-              <a:rPr lang="en-US" dirty="0" smtClean="0"/>
-              <a:t>Use this slide to illustrate the importance</a:t>
-            </a:r>
-            <a:r>
-              <a:rPr lang="en-US" baseline="0" dirty="0" smtClean="0"/>
-              <a:t> of only one video data source </a:t>
-            </a:r>
-            <a:r>
-              <a:rPr lang="en-US" baseline="0" smtClean="0"/>
-              <a:t>per channel</a:t>
-            </a:r>
             <a:endParaRPr lang="en-US" dirty="0"/>
           </a:p>
         </p:txBody>
@@ -1145,96 +1132,6 @@
                 <a:defRPr/>
               </a:pPr>
               <a:t>8</a:t>
-            </a:fld>
-            <a:endParaRPr lang="en-US"/>
-          </a:p>
-        </p:txBody>
-      </p:sp>
-    </p:spTree>
-    <p:extLst>
-      <p:ext uri="{BB962C8B-B14F-4D97-AF65-F5344CB8AC3E}">
-        <p14:creationId xmlns:p14="http://schemas.microsoft.com/office/powerpoint/2010/main" val="3077919326"/>
-      </p:ext>
-    </p:extLst>
-  </p:cSld>
-  <p:clrMapOvr>
-    <a:masterClrMapping/>
-  </p:clrMapOvr>
-</p:notes>
-</file>
-
-<file path=ppt/notesSlides/notesSlide8.xml><?xml version="1.0" encoding="utf-8"?>
-<p:notes xmlns:a="http://schemas.openxmlformats.org/drawingml/2006/main" xmlns:r="http://schemas.openxmlformats.org/officeDocument/2006/relationships" xmlns:p="http://schemas.openxmlformats.org/presentationml/2006/main">
-  <p:cSld>
-    <p:spTree>
-      <p:nvGrpSpPr>
-        <p:cNvPr id="1" name=""/>
-        <p:cNvGrpSpPr/>
-        <p:nvPr/>
-      </p:nvGrpSpPr>
-      <p:grpSpPr>
-        <a:xfrm>
-          <a:off x="0" y="0"/>
-          <a:ext cx="0" cy="0"/>
-          <a:chOff x="0" y="0"/>
-          <a:chExt cx="0" cy="0"/>
-        </a:xfrm>
-      </p:grpSpPr>
-      <p:sp>
-        <p:nvSpPr>
-          <p:cNvPr id="2" name="Slide Image Placeholder 1"/>
-          <p:cNvSpPr>
-            <a:spLocks noGrp="1" noRot="1" noChangeAspect="1"/>
-          </p:cNvSpPr>
-          <p:nvPr>
-            <p:ph type="sldImg"/>
-          </p:nvPr>
-        </p:nvSpPr>
-        <p:spPr/>
-      </p:sp>
-      <p:sp>
-        <p:nvSpPr>
-          <p:cNvPr id="3" name="Notes Placeholder 2"/>
-          <p:cNvSpPr>
-            <a:spLocks noGrp="1"/>
-          </p:cNvSpPr>
-          <p:nvPr>
-            <p:ph type="body" idx="1"/>
-          </p:nvPr>
-        </p:nvSpPr>
-        <p:spPr/>
-        <p:txBody>
-          <a:bodyPr/>
-          <a:lstStyle/>
-          <a:p>
-            <a:endParaRPr lang="en-US" dirty="0"/>
-          </a:p>
-        </p:txBody>
-      </p:sp>
-      <p:sp>
-        <p:nvSpPr>
-          <p:cNvPr id="4" name="Slide Number Placeholder 3"/>
-          <p:cNvSpPr>
-            <a:spLocks noGrp="1"/>
-          </p:cNvSpPr>
-          <p:nvPr>
-            <p:ph type="sldNum" sz="quarter" idx="10"/>
-          </p:nvPr>
-        </p:nvSpPr>
-        <p:spPr/>
-        <p:txBody>
-          <a:bodyPr/>
-          <a:lstStyle/>
-          <a:p>
-            <a:pPr>
-              <a:defRPr/>
-            </a:pPr>
-            <a:fld id="{7D5EC535-FC31-4244-9C64-EE05A8ED5E60}" type="slidenum">
-              <a:rPr lang="en-US" smtClean="0"/>
-              <a:pPr>
-                <a:defRPr/>
-              </a:pPr>
-              <a:t>9</a:t>
             </a:fld>
             <a:endParaRPr lang="en-US"/>
           </a:p>
@@ -3583,7 +3480,7 @@
         <p:spPr>
           <a:xfrm>
             <a:off x="2267744" y="2996952"/>
-            <a:ext cx="6552728" cy="369332"/>
+            <a:ext cx="6696744" cy="369332"/>
           </a:xfrm>
           <a:prstGeom prst="rect">
             <a:avLst/>
@@ -3602,8 +3499,17 @@
             </a:pPr>
             <a:r>
               <a:rPr lang="en-US" dirty="0"/>
-              <a:t>Device (software) is our interface to a physical device</a:t>
-            </a:r>
+              <a:t>Device (software) is our interface to a </a:t>
+            </a:r>
+            <a:r>
+              <a:rPr lang="en-US" dirty="0" smtClean="0"/>
+              <a:t>device, u</a:t>
+            </a:r>
+            <a:r>
+              <a:rPr lang="en-US" dirty="0" smtClean="0"/>
+              <a:t>sing an SDK</a:t>
+            </a:r>
+            <a:endParaRPr lang="en-US" dirty="0"/>
           </a:p>
         </p:txBody>
       </p:sp>
@@ -4032,10 +3938,10 @@
         </p:nvGrpSpPr>
         <p:grpSpPr>
           <a:xfrm>
-            <a:off x="1115616" y="1035969"/>
-            <a:ext cx="5437017" cy="4913311"/>
-            <a:chOff x="1151207" y="443641"/>
-            <a:chExt cx="5437017" cy="5505639"/>
+            <a:off x="1109906" y="1035969"/>
+            <a:ext cx="5442727" cy="4913311"/>
+            <a:chOff x="1145497" y="443641"/>
+            <a:chExt cx="5442727" cy="5505639"/>
           </a:xfrm>
         </p:grpSpPr>
         <p:sp>
@@ -4185,7 +4091,7 @@
           </p:nvSpPr>
           <p:spPr>
             <a:xfrm>
-              <a:off x="1151207" y="4122949"/>
+              <a:off x="1145497" y="4120262"/>
               <a:ext cx="610295" cy="310393"/>
             </a:xfrm>
             <a:prstGeom prst="rect">
@@ -4535,7 +4441,7 @@
         </p:nvSpPr>
         <p:spPr>
           <a:xfrm>
-            <a:off x="1187624" y="3091201"/>
+            <a:off x="1173481" y="3104963"/>
             <a:ext cx="483146" cy="276999"/>
           </a:xfrm>
           <a:prstGeom prst="rect">
@@ -4565,8 +4471,8 @@
         </p:nvSpPr>
         <p:spPr>
           <a:xfrm>
-            <a:off x="3635894" y="3019193"/>
-            <a:ext cx="1584177" cy="376532"/>
+            <a:off x="3635894" y="3091201"/>
+            <a:ext cx="1584177" cy="304524"/>
           </a:xfrm>
           <a:prstGeom prst="rect">
             <a:avLst/>
@@ -4829,7 +4735,7 @@
         </p:nvCxnSpPr>
         <p:spPr>
           <a:xfrm>
-            <a:off x="539552" y="1772816"/>
+            <a:off x="539552" y="1700808"/>
             <a:ext cx="8212075" cy="0"/>
           </a:xfrm>
           <a:prstGeom prst="line">
@@ -5974,55 +5880,6 @@
           </a:p>
         </p:txBody>
       </p:sp>
-      <p:sp>
-        <p:nvSpPr>
-          <p:cNvPr id="51" name="Rectangle 50"/>
-          <p:cNvSpPr/>
-          <p:nvPr/>
-        </p:nvSpPr>
-        <p:spPr>
-          <a:xfrm>
-            <a:off x="3974277" y="3777235"/>
-            <a:ext cx="1440159" cy="432048"/>
-          </a:xfrm>
-          <a:prstGeom prst="rect">
-            <a:avLst/>
-          </a:prstGeom>
-          <a:solidFill>
-            <a:srgbClr val="33889F"/>
-          </a:solidFill>
-          <a:ln/>
-        </p:spPr>
-        <p:style>
-          <a:lnRef idx="3">
-            <a:schemeClr val="lt1"/>
-          </a:lnRef>
-          <a:fillRef idx="1">
-            <a:schemeClr val="accent5"/>
-          </a:fillRef>
-          <a:effectRef idx="1">
-            <a:schemeClr val="accent5"/>
-          </a:effectRef>
-          <a:fontRef idx="minor">
-            <a:schemeClr val="lt1"/>
-          </a:fontRef>
-        </p:style>
-        <p:txBody>
-          <a:bodyPr rtlCol="0" anchor="ctr"/>
-          <a:lstStyle/>
-          <a:p>
-            <a:pPr algn="ctr"/>
-            <a:r>
-              <a:rPr lang="en-CA" sz="1200" b="1" dirty="0" smtClean="0">
-                <a:solidFill>
-                  <a:schemeClr val="bg1"/>
-                </a:solidFill>
-              </a:rPr>
-              <a:t>Transform data sources</a:t>
-            </a:r>
-          </a:p>
-        </p:txBody>
-      </p:sp>
       <p:cxnSp>
         <p:nvCxnSpPr>
           <p:cNvPr id="3" name="Elbow Connector 2"/>
@@ -6294,6 +6151,94 @@
                 </a:solidFill>
               </a:rPr>
               <a:t>A Channel</a:t>
+            </a:r>
+          </a:p>
+        </p:txBody>
+      </p:sp>
+      <p:cxnSp>
+        <p:nvCxnSpPr>
+          <p:cNvPr id="28" name="Straight Arrow Connector 27"/>
+          <p:cNvCxnSpPr>
+            <a:stCxn id="72" idx="0"/>
+            <a:endCxn id="51" idx="2"/>
+          </p:cNvCxnSpPr>
+          <p:nvPr/>
+        </p:nvCxnSpPr>
+        <p:spPr>
+          <a:xfrm flipV="1">
+            <a:off x="4694356" y="4209283"/>
+            <a:ext cx="1" cy="299838"/>
+          </a:xfrm>
+          <a:prstGeom prst="straightConnector1">
+            <a:avLst/>
+          </a:prstGeom>
+          <a:ln w="19050">
+            <a:solidFill>
+              <a:schemeClr val="tx1"/>
+            </a:solidFill>
+            <a:tailEnd type="arrow"/>
+          </a:ln>
+        </p:spPr>
+        <p:style>
+          <a:lnRef idx="1">
+            <a:schemeClr val="accent1"/>
+          </a:lnRef>
+          <a:fillRef idx="0">
+            <a:schemeClr val="accent1"/>
+          </a:fillRef>
+          <a:effectRef idx="0">
+            <a:schemeClr val="accent1"/>
+          </a:effectRef>
+          <a:fontRef idx="minor">
+            <a:schemeClr val="tx1"/>
+          </a:fontRef>
+        </p:style>
+      </p:cxnSp>
+      <p:sp>
+        <p:nvSpPr>
+          <p:cNvPr id="51" name="Rectangle 50"/>
+          <p:cNvSpPr/>
+          <p:nvPr/>
+        </p:nvSpPr>
+        <p:spPr>
+          <a:xfrm>
+            <a:off x="3974277" y="3777235"/>
+            <a:ext cx="1440159" cy="432048"/>
+          </a:xfrm>
+          <a:prstGeom prst="rect">
+            <a:avLst/>
+          </a:prstGeom>
+          <a:solidFill>
+            <a:srgbClr val="33889F"/>
+          </a:solidFill>
+          <a:ln/>
+        </p:spPr>
+        <p:style>
+          <a:lnRef idx="3">
+            <a:schemeClr val="lt1"/>
+          </a:lnRef>
+          <a:fillRef idx="1">
+            <a:schemeClr val="accent5"/>
+          </a:fillRef>
+          <a:effectRef idx="1">
+            <a:schemeClr val="accent5"/>
+          </a:effectRef>
+          <a:fontRef idx="minor">
+            <a:schemeClr val="lt1"/>
+          </a:fontRef>
+        </p:style>
+        <p:txBody>
+          <a:bodyPr rtlCol="0" anchor="ctr"/>
+          <a:lstStyle/>
+          <a:p>
+            <a:pPr algn="ctr"/>
+            <a:r>
+              <a:rPr lang="en-CA" sz="1200" b="1" dirty="0" smtClean="0">
+                <a:solidFill>
+                  <a:schemeClr val="bg1"/>
+                </a:solidFill>
+              </a:rPr>
+              <a:t>Transform data sources</a:t>
             </a:r>
           </a:p>
         </p:txBody>
@@ -6787,6 +6732,7 @@
               <a:schemeClr val="tx1"/>
             </a:solidFill>
             <a:prstDash val="solid"/>
+            <a:headEnd type="triangle"/>
           </a:ln>
         </p:spPr>
         <p:style>
@@ -6826,6 +6772,7 @@
               <a:schemeClr val="tx1"/>
             </a:solidFill>
             <a:prstDash val="solid"/>
+            <a:headEnd type="triangle"/>
           </a:ln>
         </p:spPr>
         <p:style>
@@ -6865,6 +6812,7 @@
               <a:schemeClr val="tx1"/>
             </a:solidFill>
             <a:prstDash val="solid"/>
+            <a:headEnd type="triangle"/>
           </a:ln>
         </p:spPr>
         <p:style>
@@ -6904,6 +6852,7 @@
               <a:schemeClr val="tx1"/>
             </a:solidFill>
             <a:prstDash val="solid"/>
+            <a:headEnd type="triangle"/>
           </a:ln>
         </p:spPr>
         <p:style>
@@ -7098,6 +7047,8 @@
               <a:schemeClr val="tx1"/>
             </a:solidFill>
             <a:prstDash val="solid"/>
+            <a:headEnd type="none"/>
+            <a:tailEnd type="triangle"/>
           </a:ln>
         </p:spPr>
         <p:style>
@@ -7201,6 +7152,7 @@
               <a:schemeClr val="tx1"/>
             </a:solidFill>
             <a:prstDash val="solid"/>
+            <a:headEnd type="triangle"/>
           </a:ln>
         </p:spPr>
         <p:style>
@@ -7312,6 +7264,7 @@
               <a:schemeClr val="tx1"/>
             </a:solidFill>
             <a:prstDash val="solid"/>
+            <a:headEnd type="triangle"/>
           </a:ln>
         </p:spPr>
         <p:style>
@@ -7553,6 +7506,8 @@
               <a:schemeClr val="tx1"/>
             </a:solidFill>
             <a:prstDash val="solid"/>
+            <a:headEnd type="triangle"/>
+            <a:tailEnd type="none"/>
           </a:ln>
         </p:spPr>
         <p:style>
@@ -10035,2055 +9990,6 @@
 </file>
 
 <file path=ppt/slides/slide7.xml><?xml version="1.0" encoding="utf-8"?>
-<p:sld xmlns:a="http://schemas.openxmlformats.org/drawingml/2006/main" xmlns:r="http://schemas.openxmlformats.org/officeDocument/2006/relationships" xmlns:p="http://schemas.openxmlformats.org/presentationml/2006/main">
-  <p:cSld>
-    <p:spTree>
-      <p:nvGrpSpPr>
-        <p:cNvPr id="1" name=""/>
-        <p:cNvGrpSpPr/>
-        <p:nvPr/>
-      </p:nvGrpSpPr>
-      <p:grpSpPr>
-        <a:xfrm>
-          <a:off x="0" y="0"/>
-          <a:ext cx="0" cy="0"/>
-          <a:chOff x="0" y="0"/>
-          <a:chExt cx="0" cy="0"/>
-        </a:xfrm>
-      </p:grpSpPr>
-      <p:grpSp>
-        <p:nvGrpSpPr>
-          <p:cNvPr id="98" name="Group 97"/>
-          <p:cNvGrpSpPr/>
-          <p:nvPr/>
-        </p:nvGrpSpPr>
-        <p:grpSpPr>
-          <a:xfrm>
-            <a:off x="1688035" y="1088490"/>
-            <a:ext cx="6628382" cy="5292838"/>
-            <a:chOff x="1655263" y="774076"/>
-            <a:chExt cx="4932961" cy="5930921"/>
-          </a:xfrm>
-        </p:grpSpPr>
-        <p:sp>
-          <p:nvSpPr>
-            <p:cNvPr id="99" name="Rectangle 98"/>
-            <p:cNvSpPr/>
-            <p:nvPr/>
-          </p:nvSpPr>
-          <p:spPr>
-            <a:xfrm>
-              <a:off x="1655263" y="774076"/>
-              <a:ext cx="4932961" cy="5930920"/>
-            </a:xfrm>
-            <a:prstGeom prst="rect">
-              <a:avLst/>
-            </a:prstGeom>
-            <a:ln/>
-          </p:spPr>
-          <p:style>
-            <a:lnRef idx="3">
-              <a:schemeClr val="lt1"/>
-            </a:lnRef>
-            <a:fillRef idx="1">
-              <a:schemeClr val="accent5"/>
-            </a:fillRef>
-            <a:effectRef idx="1">
-              <a:schemeClr val="accent5"/>
-            </a:effectRef>
-            <a:fontRef idx="minor">
-              <a:schemeClr val="lt1"/>
-            </a:fontRef>
-          </p:style>
-          <p:txBody>
-            <a:bodyPr rtlCol="0" anchor="ctr"/>
-            <a:lstStyle/>
-            <a:p>
-              <a:pPr algn="ctr"/>
-              <a:endParaRPr lang="en-CA" sz="1200" dirty="0"/>
-            </a:p>
-          </p:txBody>
-        </p:sp>
-        <p:sp>
-          <p:nvSpPr>
-            <p:cNvPr id="106" name="TextBox 105"/>
-            <p:cNvSpPr txBox="1"/>
-            <p:nvPr/>
-          </p:nvSpPr>
-          <p:spPr>
-            <a:xfrm>
-              <a:off x="1680963" y="6394604"/>
-              <a:ext cx="454193" cy="310393"/>
-            </a:xfrm>
-            <a:prstGeom prst="rect">
-              <a:avLst/>
-            </a:prstGeom>
-            <a:noFill/>
-          </p:spPr>
-          <p:txBody>
-            <a:bodyPr wrap="none" rtlCol="0">
-              <a:spAutoFit/>
-            </a:bodyPr>
-            <a:lstStyle/>
-            <a:p>
-              <a:r>
-                <a:rPr lang="en-CA" sz="1200" b="1" dirty="0" smtClean="0"/>
-                <a:t>Device</a:t>
-              </a:r>
-              <a:endParaRPr lang="en-CA" sz="1200" b="1" dirty="0"/>
-            </a:p>
-          </p:txBody>
-        </p:sp>
-      </p:grpSp>
-      <p:sp>
-        <p:nvSpPr>
-          <p:cNvPr id="120" name="Title 1"/>
-          <p:cNvSpPr txBox="1">
-            <a:spLocks/>
-          </p:cNvSpPr>
-          <p:nvPr/>
-        </p:nvSpPr>
-        <p:spPr bwMode="auto">
-          <a:xfrm>
-            <a:off x="0" y="0"/>
-            <a:ext cx="9144000" cy="1035968"/>
-          </a:xfrm>
-          <a:prstGeom prst="rect">
-            <a:avLst/>
-          </a:prstGeom>
-          <a:noFill/>
-          <a:ln w="9525">
-            <a:noFill/>
-            <a:miter lim="800000"/>
-            <a:headEnd/>
-            <a:tailEnd/>
-          </a:ln>
-        </p:spPr>
-        <p:txBody>
-          <a:bodyPr vert="horz" wrap="square" lIns="91440" tIns="45720" rIns="91440" bIns="45720" numCol="1" anchor="ctr" anchorCtr="0" compatLnSpc="1">
-            <a:prstTxWarp prst="textNoShape">
-              <a:avLst/>
-            </a:prstTxWarp>
-          </a:bodyPr>
-          <a:lstStyle>
-            <a:lvl1pPr algn="ctr" rtl="0" eaLnBrk="0" fontAlgn="base" hangingPunct="0">
-              <a:spcBef>
-                <a:spcPct val="0"/>
-              </a:spcBef>
-              <a:spcAft>
-                <a:spcPct val="0"/>
-              </a:spcAft>
-              <a:defRPr sz="4400" kern="1200">
-                <a:solidFill>
-                  <a:schemeClr val="tx1"/>
-                </a:solidFill>
-                <a:latin typeface="+mj-lt"/>
-                <a:ea typeface="+mj-ea"/>
-                <a:cs typeface="+mj-cs"/>
-              </a:defRPr>
-            </a:lvl1pPr>
-            <a:lvl2pPr algn="ctr" rtl="0" eaLnBrk="0" fontAlgn="base" hangingPunct="0">
-              <a:spcBef>
-                <a:spcPct val="0"/>
-              </a:spcBef>
-              <a:spcAft>
-                <a:spcPct val="0"/>
-              </a:spcAft>
-              <a:defRPr sz="4400">
-                <a:solidFill>
-                  <a:schemeClr val="tx1"/>
-                </a:solidFill>
-                <a:latin typeface="Calibri" pitchFamily="34" charset="0"/>
-              </a:defRPr>
-            </a:lvl2pPr>
-            <a:lvl3pPr algn="ctr" rtl="0" eaLnBrk="0" fontAlgn="base" hangingPunct="0">
-              <a:spcBef>
-                <a:spcPct val="0"/>
-              </a:spcBef>
-              <a:spcAft>
-                <a:spcPct val="0"/>
-              </a:spcAft>
-              <a:defRPr sz="4400">
-                <a:solidFill>
-                  <a:schemeClr val="tx1"/>
-                </a:solidFill>
-                <a:latin typeface="Calibri" pitchFamily="34" charset="0"/>
-              </a:defRPr>
-            </a:lvl3pPr>
-            <a:lvl4pPr algn="ctr" rtl="0" eaLnBrk="0" fontAlgn="base" hangingPunct="0">
-              <a:spcBef>
-                <a:spcPct val="0"/>
-              </a:spcBef>
-              <a:spcAft>
-                <a:spcPct val="0"/>
-              </a:spcAft>
-              <a:defRPr sz="4400">
-                <a:solidFill>
-                  <a:schemeClr val="tx1"/>
-                </a:solidFill>
-                <a:latin typeface="Calibri" pitchFamily="34" charset="0"/>
-              </a:defRPr>
-            </a:lvl4pPr>
-            <a:lvl5pPr algn="ctr" rtl="0" eaLnBrk="0" fontAlgn="base" hangingPunct="0">
-              <a:spcBef>
-                <a:spcPct val="0"/>
-              </a:spcBef>
-              <a:spcAft>
-                <a:spcPct val="0"/>
-              </a:spcAft>
-              <a:defRPr sz="4400">
-                <a:solidFill>
-                  <a:schemeClr val="tx1"/>
-                </a:solidFill>
-                <a:latin typeface="Calibri" pitchFamily="34" charset="0"/>
-              </a:defRPr>
-            </a:lvl5pPr>
-            <a:lvl6pPr marL="457200" algn="ctr" rtl="0" fontAlgn="base">
-              <a:spcBef>
-                <a:spcPct val="0"/>
-              </a:spcBef>
-              <a:spcAft>
-                <a:spcPct val="0"/>
-              </a:spcAft>
-              <a:defRPr sz="4400">
-                <a:solidFill>
-                  <a:schemeClr val="tx1"/>
-                </a:solidFill>
-                <a:latin typeface="Calibri" pitchFamily="34" charset="0"/>
-              </a:defRPr>
-            </a:lvl6pPr>
-            <a:lvl7pPr marL="914400" algn="ctr" rtl="0" fontAlgn="base">
-              <a:spcBef>
-                <a:spcPct val="0"/>
-              </a:spcBef>
-              <a:spcAft>
-                <a:spcPct val="0"/>
-              </a:spcAft>
-              <a:defRPr sz="4400">
-                <a:solidFill>
-                  <a:schemeClr val="tx1"/>
-                </a:solidFill>
-                <a:latin typeface="Calibri" pitchFamily="34" charset="0"/>
-              </a:defRPr>
-            </a:lvl7pPr>
-            <a:lvl8pPr marL="1371600" algn="ctr" rtl="0" fontAlgn="base">
-              <a:spcBef>
-                <a:spcPct val="0"/>
-              </a:spcBef>
-              <a:spcAft>
-                <a:spcPct val="0"/>
-              </a:spcAft>
-              <a:defRPr sz="4400">
-                <a:solidFill>
-                  <a:schemeClr val="tx1"/>
-                </a:solidFill>
-                <a:latin typeface="Calibri" pitchFamily="34" charset="0"/>
-              </a:defRPr>
-            </a:lvl8pPr>
-            <a:lvl9pPr marL="1828800" algn="ctr" rtl="0" fontAlgn="base">
-              <a:spcBef>
-                <a:spcPct val="0"/>
-              </a:spcBef>
-              <a:spcAft>
-                <a:spcPct val="0"/>
-              </a:spcAft>
-              <a:defRPr sz="4400">
-                <a:solidFill>
-                  <a:schemeClr val="tx1"/>
-                </a:solidFill>
-                <a:latin typeface="Calibri" pitchFamily="34" charset="0"/>
-              </a:defRPr>
-            </a:lvl9pPr>
-          </a:lstStyle>
-          <a:p>
-            <a:r>
-              <a:rPr lang="en-CA" b="1" dirty="0" smtClean="0">
-                <a:solidFill>
-                  <a:srgbClr val="800000"/>
-                </a:solidFill>
-              </a:rPr>
-              <a:t>Examples: Single Device</a:t>
-            </a:r>
-            <a:endParaRPr lang="en-CA" b="1" dirty="0">
-              <a:solidFill>
-                <a:srgbClr val="800000"/>
-              </a:solidFill>
-            </a:endParaRPr>
-          </a:p>
-        </p:txBody>
-      </p:sp>
-      <p:sp>
-        <p:nvSpPr>
-          <p:cNvPr id="4" name="Slide Number Placeholder 3"/>
-          <p:cNvSpPr>
-            <a:spLocks noGrp="1"/>
-          </p:cNvSpPr>
-          <p:nvPr>
-            <p:ph type="sldNum" sz="quarter" idx="10"/>
-          </p:nvPr>
-        </p:nvSpPr>
-        <p:spPr/>
-        <p:txBody>
-          <a:bodyPr/>
-          <a:lstStyle/>
-          <a:p>
-            <a:pPr algn="ctr">
-              <a:defRPr/>
-            </a:pPr>
-            <a:r>
-              <a:rPr lang="en-US" smtClean="0"/>
-              <a:t>- </a:t>
-            </a:r>
-            <a:fld id="{CF70E430-998E-4908-836F-E9BC2B613AC2}" type="slidenum">
-              <a:rPr lang="en-US" smtClean="0"/>
-              <a:pPr algn="ctr">
-                <a:defRPr/>
-              </a:pPr>
-              <a:t>7</a:t>
-            </a:fld>
-            <a:r>
-              <a:rPr lang="en-US" smtClean="0"/>
-              <a:t> -</a:t>
-            </a:r>
-            <a:endParaRPr lang="en-US" dirty="0"/>
-          </a:p>
-        </p:txBody>
-      </p:sp>
-      <p:sp>
-        <p:nvSpPr>
-          <p:cNvPr id="5" name="Footer Placeholder 4"/>
-          <p:cNvSpPr>
-            <a:spLocks noGrp="1"/>
-          </p:cNvSpPr>
-          <p:nvPr>
-            <p:ph type="ftr" sz="quarter" idx="11"/>
-          </p:nvPr>
-        </p:nvSpPr>
-        <p:spPr/>
-        <p:txBody>
-          <a:bodyPr/>
-          <a:lstStyle/>
-          <a:p>
-            <a:pPr>
-              <a:defRPr/>
-            </a:pPr>
-            <a:r>
-              <a:rPr lang="en-US" smtClean="0"/>
-              <a:t>Laboratory for Percutaneous Surgery – Copyright © Queen’s University, 2013</a:t>
-            </a:r>
-            <a:endParaRPr lang="en-US" dirty="0"/>
-          </a:p>
-        </p:txBody>
-      </p:sp>
-      <p:sp>
-        <p:nvSpPr>
-          <p:cNvPr id="40" name="TextBox 39"/>
-          <p:cNvSpPr txBox="1"/>
-          <p:nvPr/>
-        </p:nvSpPr>
-        <p:spPr>
-          <a:xfrm>
-            <a:off x="3911640" y="4260589"/>
-            <a:ext cx="1524456" cy="276999"/>
-          </a:xfrm>
-          <a:prstGeom prst="rect">
-            <a:avLst/>
-          </a:prstGeom>
-          <a:noFill/>
-        </p:spPr>
-        <p:txBody>
-          <a:bodyPr wrap="none" rtlCol="0">
-            <a:spAutoFit/>
-          </a:bodyPr>
-          <a:lstStyle/>
-          <a:p>
-            <a:pPr algn="r"/>
-            <a:r>
-              <a:rPr lang="en-CA" sz="1200" b="1" dirty="0" smtClean="0"/>
-              <a:t>Internal data sources</a:t>
-            </a:r>
-          </a:p>
-        </p:txBody>
-      </p:sp>
-      <p:sp>
-        <p:nvSpPr>
-          <p:cNvPr id="41" name="Rectangle 40"/>
-          <p:cNvSpPr/>
-          <p:nvPr/>
-        </p:nvSpPr>
-        <p:spPr>
-          <a:xfrm>
-            <a:off x="1346408" y="1287882"/>
-            <a:ext cx="1846606" cy="1902852"/>
-          </a:xfrm>
-          <a:prstGeom prst="rect">
-            <a:avLst/>
-          </a:prstGeom>
-          <a:solidFill>
-            <a:srgbClr val="33889F"/>
-          </a:solidFill>
-          <a:ln/>
-        </p:spPr>
-        <p:style>
-          <a:lnRef idx="3">
-            <a:schemeClr val="lt1"/>
-          </a:lnRef>
-          <a:fillRef idx="1">
-            <a:schemeClr val="accent5"/>
-          </a:fillRef>
-          <a:effectRef idx="1">
-            <a:schemeClr val="accent5"/>
-          </a:effectRef>
-          <a:fontRef idx="minor">
-            <a:schemeClr val="lt1"/>
-          </a:fontRef>
-        </p:style>
-        <p:txBody>
-          <a:bodyPr rtlCol="0" anchor="ctr"/>
-          <a:lstStyle/>
-          <a:p>
-            <a:pPr algn="ctr"/>
-            <a:r>
-              <a:rPr lang="en-CA" sz="1200" b="1" dirty="0" smtClean="0">
-                <a:solidFill>
-                  <a:schemeClr val="bg1"/>
-                </a:solidFill>
-              </a:rPr>
-              <a:t>Input Channel 1</a:t>
-            </a:r>
-          </a:p>
-          <a:p>
-            <a:pPr algn="ctr"/>
-            <a:endParaRPr lang="en-CA" sz="1200" b="1" dirty="0">
-              <a:solidFill>
-                <a:schemeClr val="bg1"/>
-              </a:solidFill>
-            </a:endParaRPr>
-          </a:p>
-          <a:p>
-            <a:pPr algn="ctr"/>
-            <a:endParaRPr lang="en-CA" sz="1200" b="1" dirty="0" smtClean="0">
-              <a:solidFill>
-                <a:schemeClr val="bg1"/>
-              </a:solidFill>
-            </a:endParaRPr>
-          </a:p>
-          <a:p>
-            <a:pPr algn="ctr"/>
-            <a:endParaRPr lang="en-CA" sz="1200" b="1" dirty="0">
-              <a:solidFill>
-                <a:schemeClr val="bg1"/>
-              </a:solidFill>
-            </a:endParaRPr>
-          </a:p>
-          <a:p>
-            <a:pPr algn="ctr"/>
-            <a:endParaRPr lang="en-CA" sz="1200" b="1" dirty="0" smtClean="0">
-              <a:solidFill>
-                <a:schemeClr val="bg1"/>
-              </a:solidFill>
-            </a:endParaRPr>
-          </a:p>
-          <a:p>
-            <a:pPr algn="ctr"/>
-            <a:endParaRPr lang="en-CA" sz="1200" b="1" dirty="0" smtClean="0">
-              <a:solidFill>
-                <a:schemeClr val="bg1"/>
-              </a:solidFill>
-            </a:endParaRPr>
-          </a:p>
-          <a:p>
-            <a:pPr algn="ctr"/>
-            <a:endParaRPr lang="en-CA" sz="1200" b="1" dirty="0">
-              <a:solidFill>
-                <a:schemeClr val="bg1"/>
-              </a:solidFill>
-            </a:endParaRPr>
-          </a:p>
-          <a:p>
-            <a:pPr algn="ctr"/>
-            <a:endParaRPr lang="en-CA" sz="1200" b="1" dirty="0" smtClean="0">
-              <a:solidFill>
-                <a:schemeClr val="bg1"/>
-              </a:solidFill>
-            </a:endParaRPr>
-          </a:p>
-          <a:p>
-            <a:pPr algn="ctr"/>
-            <a:endParaRPr lang="en-CA" sz="1200" b="1" dirty="0" smtClean="0">
-              <a:solidFill>
-                <a:schemeClr val="bg1"/>
-              </a:solidFill>
-            </a:endParaRPr>
-          </a:p>
-        </p:txBody>
-      </p:sp>
-      <p:sp>
-        <p:nvSpPr>
-          <p:cNvPr id="34" name="Rectangle 33"/>
-          <p:cNvSpPr/>
-          <p:nvPr/>
-        </p:nvSpPr>
-        <p:spPr>
-          <a:xfrm>
-            <a:off x="1536088" y="1700808"/>
-            <a:ext cx="1522995" cy="265791"/>
-          </a:xfrm>
-          <a:prstGeom prst="rect">
-            <a:avLst/>
-          </a:prstGeom>
-          <a:solidFill>
-            <a:srgbClr val="3DA2BD"/>
-          </a:solidFill>
-          <a:ln>
-            <a:prstDash val="sysDot"/>
-          </a:ln>
-        </p:spPr>
-        <p:style>
-          <a:lnRef idx="3">
-            <a:schemeClr val="lt1"/>
-          </a:lnRef>
-          <a:fillRef idx="1">
-            <a:schemeClr val="accent5"/>
-          </a:fillRef>
-          <a:effectRef idx="1">
-            <a:schemeClr val="accent5"/>
-          </a:effectRef>
-          <a:fontRef idx="minor">
-            <a:schemeClr val="lt1"/>
-          </a:fontRef>
-        </p:style>
-        <p:txBody>
-          <a:bodyPr rtlCol="0" anchor="ctr"/>
-          <a:lstStyle/>
-          <a:p>
-            <a:pPr algn="ctr"/>
-            <a:r>
-              <a:rPr lang="en-CA" sz="1200" b="1" dirty="0" smtClean="0">
-                <a:solidFill>
-                  <a:schemeClr val="bg1"/>
-                </a:solidFill>
-              </a:rPr>
-              <a:t>Video data source</a:t>
-            </a:r>
-          </a:p>
-        </p:txBody>
-      </p:sp>
-      <p:sp>
-        <p:nvSpPr>
-          <p:cNvPr id="36" name="Rectangle 35"/>
-          <p:cNvSpPr/>
-          <p:nvPr/>
-        </p:nvSpPr>
-        <p:spPr>
-          <a:xfrm>
-            <a:off x="1536087" y="2068880"/>
-            <a:ext cx="1522996" cy="265791"/>
-          </a:xfrm>
-          <a:prstGeom prst="rect">
-            <a:avLst/>
-          </a:prstGeom>
-          <a:solidFill>
-            <a:srgbClr val="33889F"/>
-          </a:solidFill>
-          <a:ln>
-            <a:prstDash val="sysDot"/>
-          </a:ln>
-        </p:spPr>
-        <p:style>
-          <a:lnRef idx="3">
-            <a:schemeClr val="lt1"/>
-          </a:lnRef>
-          <a:fillRef idx="1">
-            <a:schemeClr val="accent5"/>
-          </a:fillRef>
-          <a:effectRef idx="1">
-            <a:schemeClr val="accent5"/>
-          </a:effectRef>
-          <a:fontRef idx="minor">
-            <a:schemeClr val="lt1"/>
-          </a:fontRef>
-        </p:style>
-        <p:txBody>
-          <a:bodyPr rtlCol="0" anchor="ctr"/>
-          <a:lstStyle/>
-          <a:p>
-            <a:pPr algn="ctr"/>
-            <a:r>
-              <a:rPr lang="en-CA" sz="1200" b="1" dirty="0" smtClean="0">
-                <a:solidFill>
-                  <a:schemeClr val="bg1"/>
-                </a:solidFill>
-              </a:rPr>
-              <a:t>Tracker data source 1</a:t>
-            </a:r>
-          </a:p>
-        </p:txBody>
-      </p:sp>
-      <p:sp>
-        <p:nvSpPr>
-          <p:cNvPr id="37" name="Rectangle 36"/>
-          <p:cNvSpPr/>
-          <p:nvPr/>
-        </p:nvSpPr>
-        <p:spPr>
-          <a:xfrm>
-            <a:off x="1536088" y="2454249"/>
-            <a:ext cx="1522996" cy="265791"/>
-          </a:xfrm>
-          <a:prstGeom prst="rect">
-            <a:avLst/>
-          </a:prstGeom>
-          <a:solidFill>
-            <a:srgbClr val="33889F"/>
-          </a:solidFill>
-          <a:ln>
-            <a:prstDash val="sysDot"/>
-          </a:ln>
-        </p:spPr>
-        <p:style>
-          <a:lnRef idx="3">
-            <a:schemeClr val="lt1"/>
-          </a:lnRef>
-          <a:fillRef idx="1">
-            <a:schemeClr val="accent5"/>
-          </a:fillRef>
-          <a:effectRef idx="1">
-            <a:schemeClr val="accent5"/>
-          </a:effectRef>
-          <a:fontRef idx="minor">
-            <a:schemeClr val="lt1"/>
-          </a:fontRef>
-        </p:style>
-        <p:txBody>
-          <a:bodyPr rtlCol="0" anchor="ctr"/>
-          <a:lstStyle/>
-          <a:p>
-            <a:pPr algn="ctr"/>
-            <a:r>
-              <a:rPr lang="en-CA" sz="1200" b="1" dirty="0" smtClean="0">
-                <a:solidFill>
-                  <a:schemeClr val="bg1"/>
-                </a:solidFill>
-              </a:rPr>
-              <a:t>Tracker data source 2</a:t>
-            </a:r>
-          </a:p>
-        </p:txBody>
-      </p:sp>
-      <p:sp>
-        <p:nvSpPr>
-          <p:cNvPr id="39" name="Rectangle 38"/>
-          <p:cNvSpPr/>
-          <p:nvPr/>
-        </p:nvSpPr>
-        <p:spPr>
-          <a:xfrm>
-            <a:off x="1536836" y="2819795"/>
-            <a:ext cx="1522996" cy="265791"/>
-          </a:xfrm>
-          <a:prstGeom prst="rect">
-            <a:avLst/>
-          </a:prstGeom>
-          <a:solidFill>
-            <a:srgbClr val="33889F"/>
-          </a:solidFill>
-          <a:ln>
-            <a:prstDash val="sysDot"/>
-          </a:ln>
-        </p:spPr>
-        <p:style>
-          <a:lnRef idx="3">
-            <a:schemeClr val="lt1"/>
-          </a:lnRef>
-          <a:fillRef idx="1">
-            <a:schemeClr val="accent5"/>
-          </a:fillRef>
-          <a:effectRef idx="1">
-            <a:schemeClr val="accent5"/>
-          </a:effectRef>
-          <a:fontRef idx="minor">
-            <a:schemeClr val="lt1"/>
-          </a:fontRef>
-        </p:style>
-        <p:txBody>
-          <a:bodyPr rtlCol="0" anchor="ctr"/>
-          <a:lstStyle/>
-          <a:p>
-            <a:pPr algn="ctr"/>
-            <a:r>
-              <a:rPr lang="en-CA" sz="1200" b="1" dirty="0" smtClean="0">
-                <a:solidFill>
-                  <a:schemeClr val="bg1"/>
-                </a:solidFill>
-              </a:rPr>
-              <a:t>Tracker data source 3</a:t>
-            </a:r>
-          </a:p>
-        </p:txBody>
-      </p:sp>
-      <p:sp>
-        <p:nvSpPr>
-          <p:cNvPr id="43" name="Rectangle 42"/>
-          <p:cNvSpPr/>
-          <p:nvPr/>
-        </p:nvSpPr>
-        <p:spPr>
-          <a:xfrm>
-            <a:off x="6804248" y="1593134"/>
-            <a:ext cx="1788404" cy="1902852"/>
-          </a:xfrm>
-          <a:prstGeom prst="rect">
-            <a:avLst/>
-          </a:prstGeom>
-          <a:solidFill>
-            <a:srgbClr val="33889F"/>
-          </a:solidFill>
-          <a:ln/>
-        </p:spPr>
-        <p:style>
-          <a:lnRef idx="3">
-            <a:schemeClr val="lt1"/>
-          </a:lnRef>
-          <a:fillRef idx="1">
-            <a:schemeClr val="accent5"/>
-          </a:fillRef>
-          <a:effectRef idx="1">
-            <a:schemeClr val="accent5"/>
-          </a:effectRef>
-          <a:fontRef idx="minor">
-            <a:schemeClr val="lt1"/>
-          </a:fontRef>
-        </p:style>
-        <p:txBody>
-          <a:bodyPr rtlCol="0" anchor="ctr"/>
-          <a:lstStyle/>
-          <a:p>
-            <a:pPr algn="ctr"/>
-            <a:r>
-              <a:rPr lang="en-CA" sz="1200" b="1" dirty="0" smtClean="0">
-                <a:solidFill>
-                  <a:schemeClr val="bg1"/>
-                </a:solidFill>
-              </a:rPr>
-              <a:t>Output Channel 1</a:t>
-            </a:r>
-          </a:p>
-          <a:p>
-            <a:pPr algn="ctr"/>
-            <a:endParaRPr lang="en-CA" sz="1200" b="1" dirty="0">
-              <a:solidFill>
-                <a:schemeClr val="bg1"/>
-              </a:solidFill>
-            </a:endParaRPr>
-          </a:p>
-          <a:p>
-            <a:pPr algn="ctr"/>
-            <a:endParaRPr lang="en-CA" sz="1200" b="1" dirty="0" smtClean="0">
-              <a:solidFill>
-                <a:schemeClr val="bg1"/>
-              </a:solidFill>
-            </a:endParaRPr>
-          </a:p>
-          <a:p>
-            <a:pPr algn="ctr"/>
-            <a:endParaRPr lang="en-CA" sz="1200" b="1" dirty="0">
-              <a:solidFill>
-                <a:schemeClr val="bg1"/>
-              </a:solidFill>
-            </a:endParaRPr>
-          </a:p>
-          <a:p>
-            <a:pPr algn="ctr"/>
-            <a:endParaRPr lang="en-CA" sz="1200" b="1" dirty="0" smtClean="0">
-              <a:solidFill>
-                <a:schemeClr val="bg1"/>
-              </a:solidFill>
-            </a:endParaRPr>
-          </a:p>
-          <a:p>
-            <a:pPr algn="ctr"/>
-            <a:endParaRPr lang="en-CA" sz="1200" b="1" dirty="0" smtClean="0">
-              <a:solidFill>
-                <a:schemeClr val="bg1"/>
-              </a:solidFill>
-            </a:endParaRPr>
-          </a:p>
-          <a:p>
-            <a:pPr algn="ctr"/>
-            <a:endParaRPr lang="en-CA" sz="1200" b="1" dirty="0">
-              <a:solidFill>
-                <a:schemeClr val="bg1"/>
-              </a:solidFill>
-            </a:endParaRPr>
-          </a:p>
-          <a:p>
-            <a:pPr algn="ctr"/>
-            <a:endParaRPr lang="en-CA" sz="1200" b="1" dirty="0" smtClean="0">
-              <a:solidFill>
-                <a:schemeClr val="bg1"/>
-              </a:solidFill>
-            </a:endParaRPr>
-          </a:p>
-          <a:p>
-            <a:pPr algn="ctr"/>
-            <a:endParaRPr lang="en-CA" sz="1200" b="1" dirty="0" smtClean="0">
-              <a:solidFill>
-                <a:schemeClr val="bg1"/>
-              </a:solidFill>
-            </a:endParaRPr>
-          </a:p>
-        </p:txBody>
-      </p:sp>
-      <p:sp>
-        <p:nvSpPr>
-          <p:cNvPr id="44" name="Rectangle 43"/>
-          <p:cNvSpPr/>
-          <p:nvPr/>
-        </p:nvSpPr>
-        <p:spPr>
-          <a:xfrm>
-            <a:off x="6948262" y="2006060"/>
-            <a:ext cx="1522995" cy="265791"/>
-          </a:xfrm>
-          <a:prstGeom prst="rect">
-            <a:avLst/>
-          </a:prstGeom>
-          <a:solidFill>
-            <a:srgbClr val="3DA2BD"/>
-          </a:solidFill>
-          <a:ln>
-            <a:prstDash val="sysDot"/>
-          </a:ln>
-        </p:spPr>
-        <p:style>
-          <a:lnRef idx="3">
-            <a:schemeClr val="lt1"/>
-          </a:lnRef>
-          <a:fillRef idx="1">
-            <a:schemeClr val="accent5"/>
-          </a:fillRef>
-          <a:effectRef idx="1">
-            <a:schemeClr val="accent5"/>
-          </a:effectRef>
-          <a:fontRef idx="minor">
-            <a:schemeClr val="lt1"/>
-          </a:fontRef>
-        </p:style>
-        <p:txBody>
-          <a:bodyPr rtlCol="0" anchor="ctr"/>
-          <a:lstStyle/>
-          <a:p>
-            <a:pPr algn="ctr"/>
-            <a:r>
-              <a:rPr lang="en-CA" sz="1200" b="1" dirty="0" smtClean="0">
-                <a:solidFill>
-                  <a:schemeClr val="bg1"/>
-                </a:solidFill>
-              </a:rPr>
-              <a:t>Video data source</a:t>
-            </a:r>
-          </a:p>
-        </p:txBody>
-      </p:sp>
-      <p:sp>
-        <p:nvSpPr>
-          <p:cNvPr id="45" name="Rectangle 44"/>
-          <p:cNvSpPr/>
-          <p:nvPr/>
-        </p:nvSpPr>
-        <p:spPr>
-          <a:xfrm>
-            <a:off x="6948261" y="2374132"/>
-            <a:ext cx="1522996" cy="265791"/>
-          </a:xfrm>
-          <a:prstGeom prst="rect">
-            <a:avLst/>
-          </a:prstGeom>
-          <a:solidFill>
-            <a:srgbClr val="33889F"/>
-          </a:solidFill>
-          <a:ln>
-            <a:prstDash val="sysDot"/>
-          </a:ln>
-        </p:spPr>
-        <p:style>
-          <a:lnRef idx="3">
-            <a:schemeClr val="lt1"/>
-          </a:lnRef>
-          <a:fillRef idx="1">
-            <a:schemeClr val="accent5"/>
-          </a:fillRef>
-          <a:effectRef idx="1">
-            <a:schemeClr val="accent5"/>
-          </a:effectRef>
-          <a:fontRef idx="minor">
-            <a:schemeClr val="lt1"/>
-          </a:fontRef>
-        </p:style>
-        <p:txBody>
-          <a:bodyPr rtlCol="0" anchor="ctr"/>
-          <a:lstStyle/>
-          <a:p>
-            <a:pPr algn="ctr"/>
-            <a:r>
-              <a:rPr lang="en-CA" sz="1200" b="1" dirty="0" smtClean="0">
-                <a:solidFill>
-                  <a:schemeClr val="bg1"/>
-                </a:solidFill>
-              </a:rPr>
-              <a:t>Tracker data source 1</a:t>
-            </a:r>
-          </a:p>
-        </p:txBody>
-      </p:sp>
-      <p:sp>
-        <p:nvSpPr>
-          <p:cNvPr id="46" name="Rectangle 45"/>
-          <p:cNvSpPr/>
-          <p:nvPr/>
-        </p:nvSpPr>
-        <p:spPr>
-          <a:xfrm>
-            <a:off x="6948262" y="2759501"/>
-            <a:ext cx="1522996" cy="265791"/>
-          </a:xfrm>
-          <a:prstGeom prst="rect">
-            <a:avLst/>
-          </a:prstGeom>
-          <a:solidFill>
-            <a:srgbClr val="33889F"/>
-          </a:solidFill>
-          <a:ln>
-            <a:prstDash val="sysDot"/>
-          </a:ln>
-        </p:spPr>
-        <p:style>
-          <a:lnRef idx="3">
-            <a:schemeClr val="lt1"/>
-          </a:lnRef>
-          <a:fillRef idx="1">
-            <a:schemeClr val="accent5"/>
-          </a:fillRef>
-          <a:effectRef idx="1">
-            <a:schemeClr val="accent5"/>
-          </a:effectRef>
-          <a:fontRef idx="minor">
-            <a:schemeClr val="lt1"/>
-          </a:fontRef>
-        </p:style>
-        <p:txBody>
-          <a:bodyPr rtlCol="0" anchor="ctr"/>
-          <a:lstStyle/>
-          <a:p>
-            <a:pPr algn="ctr"/>
-            <a:r>
-              <a:rPr lang="en-CA" sz="1200" b="1" dirty="0" smtClean="0">
-                <a:solidFill>
-                  <a:schemeClr val="bg1"/>
-                </a:solidFill>
-              </a:rPr>
-              <a:t>Tracker data source 5</a:t>
-            </a:r>
-          </a:p>
-        </p:txBody>
-      </p:sp>
-      <p:sp>
-        <p:nvSpPr>
-          <p:cNvPr id="47" name="Rectangle 46"/>
-          <p:cNvSpPr/>
-          <p:nvPr/>
-        </p:nvSpPr>
-        <p:spPr>
-          <a:xfrm>
-            <a:off x="6949010" y="3125047"/>
-            <a:ext cx="1522996" cy="265791"/>
-          </a:xfrm>
-          <a:prstGeom prst="rect">
-            <a:avLst/>
-          </a:prstGeom>
-          <a:solidFill>
-            <a:srgbClr val="33889F"/>
-          </a:solidFill>
-          <a:ln>
-            <a:prstDash val="sysDot"/>
-          </a:ln>
-        </p:spPr>
-        <p:style>
-          <a:lnRef idx="3">
-            <a:schemeClr val="lt1"/>
-          </a:lnRef>
-          <a:fillRef idx="1">
-            <a:schemeClr val="accent5"/>
-          </a:fillRef>
-          <a:effectRef idx="1">
-            <a:schemeClr val="accent5"/>
-          </a:effectRef>
-          <a:fontRef idx="minor">
-            <a:schemeClr val="lt1"/>
-          </a:fontRef>
-        </p:style>
-        <p:txBody>
-          <a:bodyPr rtlCol="0" anchor="ctr"/>
-          <a:lstStyle/>
-          <a:p>
-            <a:pPr algn="ctr"/>
-            <a:r>
-              <a:rPr lang="en-CA" sz="1200" b="1" dirty="0" smtClean="0">
-                <a:solidFill>
-                  <a:schemeClr val="bg1"/>
-                </a:solidFill>
-              </a:rPr>
-              <a:t>Tracker data source 6</a:t>
-            </a:r>
-          </a:p>
-        </p:txBody>
-      </p:sp>
-      <p:sp>
-        <p:nvSpPr>
-          <p:cNvPr id="48" name="Rectangle 47"/>
-          <p:cNvSpPr/>
-          <p:nvPr/>
-        </p:nvSpPr>
-        <p:spPr>
-          <a:xfrm>
-            <a:off x="6749084" y="3753374"/>
-            <a:ext cx="1843568" cy="1902852"/>
-          </a:xfrm>
-          <a:prstGeom prst="rect">
-            <a:avLst/>
-          </a:prstGeom>
-          <a:solidFill>
-            <a:srgbClr val="33889F"/>
-          </a:solidFill>
-          <a:ln/>
-        </p:spPr>
-        <p:style>
-          <a:lnRef idx="3">
-            <a:schemeClr val="lt1"/>
-          </a:lnRef>
-          <a:fillRef idx="1">
-            <a:schemeClr val="accent5"/>
-          </a:fillRef>
-          <a:effectRef idx="1">
-            <a:schemeClr val="accent5"/>
-          </a:effectRef>
-          <a:fontRef idx="minor">
-            <a:schemeClr val="lt1"/>
-          </a:fontRef>
-        </p:style>
-        <p:txBody>
-          <a:bodyPr rtlCol="0" anchor="ctr"/>
-          <a:lstStyle/>
-          <a:p>
-            <a:pPr algn="ctr"/>
-            <a:r>
-              <a:rPr lang="en-CA" sz="1200" b="1" dirty="0" smtClean="0">
-                <a:solidFill>
-                  <a:schemeClr val="bg1"/>
-                </a:solidFill>
-              </a:rPr>
-              <a:t>Output Channel 2</a:t>
-            </a:r>
-          </a:p>
-          <a:p>
-            <a:pPr algn="ctr"/>
-            <a:endParaRPr lang="en-CA" sz="1200" b="1" dirty="0">
-              <a:solidFill>
-                <a:schemeClr val="bg1"/>
-              </a:solidFill>
-            </a:endParaRPr>
-          </a:p>
-          <a:p>
-            <a:pPr algn="ctr"/>
-            <a:endParaRPr lang="en-CA" sz="1200" b="1" dirty="0" smtClean="0">
-              <a:solidFill>
-                <a:schemeClr val="bg1"/>
-              </a:solidFill>
-            </a:endParaRPr>
-          </a:p>
-          <a:p>
-            <a:pPr algn="ctr"/>
-            <a:endParaRPr lang="en-CA" sz="1200" b="1" dirty="0">
-              <a:solidFill>
-                <a:schemeClr val="bg1"/>
-              </a:solidFill>
-            </a:endParaRPr>
-          </a:p>
-          <a:p>
-            <a:pPr algn="ctr"/>
-            <a:endParaRPr lang="en-CA" sz="1200" b="1" dirty="0" smtClean="0">
-              <a:solidFill>
-                <a:schemeClr val="bg1"/>
-              </a:solidFill>
-            </a:endParaRPr>
-          </a:p>
-          <a:p>
-            <a:pPr algn="ctr"/>
-            <a:endParaRPr lang="en-CA" sz="1200" b="1" dirty="0" smtClean="0">
-              <a:solidFill>
-                <a:schemeClr val="bg1"/>
-              </a:solidFill>
-            </a:endParaRPr>
-          </a:p>
-          <a:p>
-            <a:pPr algn="ctr"/>
-            <a:endParaRPr lang="en-CA" sz="1200" b="1" dirty="0">
-              <a:solidFill>
-                <a:schemeClr val="bg1"/>
-              </a:solidFill>
-            </a:endParaRPr>
-          </a:p>
-          <a:p>
-            <a:pPr algn="ctr"/>
-            <a:endParaRPr lang="en-CA" sz="1200" b="1" dirty="0" smtClean="0">
-              <a:solidFill>
-                <a:schemeClr val="bg1"/>
-              </a:solidFill>
-            </a:endParaRPr>
-          </a:p>
-          <a:p>
-            <a:pPr algn="ctr"/>
-            <a:endParaRPr lang="en-CA" sz="1200" b="1" dirty="0" smtClean="0">
-              <a:solidFill>
-                <a:schemeClr val="bg1"/>
-              </a:solidFill>
-            </a:endParaRPr>
-          </a:p>
-        </p:txBody>
-      </p:sp>
-      <p:sp>
-        <p:nvSpPr>
-          <p:cNvPr id="49" name="Rectangle 48"/>
-          <p:cNvSpPr/>
-          <p:nvPr/>
-        </p:nvSpPr>
-        <p:spPr>
-          <a:xfrm>
-            <a:off x="6965106" y="4166300"/>
-            <a:ext cx="1522995" cy="265791"/>
-          </a:xfrm>
-          <a:prstGeom prst="rect">
-            <a:avLst/>
-          </a:prstGeom>
-          <a:solidFill>
-            <a:srgbClr val="3DA2BD"/>
-          </a:solidFill>
-          <a:ln>
-            <a:prstDash val="sysDot"/>
-          </a:ln>
-        </p:spPr>
-        <p:style>
-          <a:lnRef idx="3">
-            <a:schemeClr val="lt1"/>
-          </a:lnRef>
-          <a:fillRef idx="1">
-            <a:schemeClr val="accent5"/>
-          </a:fillRef>
-          <a:effectRef idx="1">
-            <a:schemeClr val="accent5"/>
-          </a:effectRef>
-          <a:fontRef idx="minor">
-            <a:schemeClr val="lt1"/>
-          </a:fontRef>
-        </p:style>
-        <p:txBody>
-          <a:bodyPr rtlCol="0" anchor="ctr"/>
-          <a:lstStyle/>
-          <a:p>
-            <a:pPr algn="ctr"/>
-            <a:r>
-              <a:rPr lang="en-CA" sz="1200" b="1" dirty="0" smtClean="0">
-                <a:solidFill>
-                  <a:schemeClr val="bg1"/>
-                </a:solidFill>
-              </a:rPr>
-              <a:t>Video data source 3</a:t>
-            </a:r>
-          </a:p>
-        </p:txBody>
-      </p:sp>
-      <p:sp>
-        <p:nvSpPr>
-          <p:cNvPr id="53" name="Rectangle 52"/>
-          <p:cNvSpPr/>
-          <p:nvPr/>
-        </p:nvSpPr>
-        <p:spPr>
-          <a:xfrm>
-            <a:off x="6965105" y="4534372"/>
-            <a:ext cx="1522996" cy="265791"/>
-          </a:xfrm>
-          <a:prstGeom prst="rect">
-            <a:avLst/>
-          </a:prstGeom>
-          <a:solidFill>
-            <a:srgbClr val="33889F"/>
-          </a:solidFill>
-          <a:ln>
-            <a:prstDash val="sysDot"/>
-          </a:ln>
-        </p:spPr>
-        <p:style>
-          <a:lnRef idx="3">
-            <a:schemeClr val="lt1"/>
-          </a:lnRef>
-          <a:fillRef idx="1">
-            <a:schemeClr val="accent5"/>
-          </a:fillRef>
-          <a:effectRef idx="1">
-            <a:schemeClr val="accent5"/>
-          </a:effectRef>
-          <a:fontRef idx="minor">
-            <a:schemeClr val="lt1"/>
-          </a:fontRef>
-        </p:style>
-        <p:txBody>
-          <a:bodyPr rtlCol="0" anchor="ctr"/>
-          <a:lstStyle/>
-          <a:p>
-            <a:pPr algn="ctr"/>
-            <a:r>
-              <a:rPr lang="en-CA" sz="1200" b="1" dirty="0" smtClean="0">
-                <a:solidFill>
-                  <a:schemeClr val="bg1"/>
-                </a:solidFill>
-              </a:rPr>
-              <a:t>Tracker data source 3</a:t>
-            </a:r>
-          </a:p>
-        </p:txBody>
-      </p:sp>
-      <p:sp>
-        <p:nvSpPr>
-          <p:cNvPr id="54" name="Rectangle 53"/>
-          <p:cNvSpPr/>
-          <p:nvPr/>
-        </p:nvSpPr>
-        <p:spPr>
-          <a:xfrm>
-            <a:off x="6965106" y="4919741"/>
-            <a:ext cx="1522996" cy="265791"/>
-          </a:xfrm>
-          <a:prstGeom prst="rect">
-            <a:avLst/>
-          </a:prstGeom>
-          <a:solidFill>
-            <a:srgbClr val="33889F"/>
-          </a:solidFill>
-          <a:ln>
-            <a:prstDash val="sysDot"/>
-          </a:ln>
-        </p:spPr>
-        <p:style>
-          <a:lnRef idx="3">
-            <a:schemeClr val="lt1"/>
-          </a:lnRef>
-          <a:fillRef idx="1">
-            <a:schemeClr val="accent5"/>
-          </a:fillRef>
-          <a:effectRef idx="1">
-            <a:schemeClr val="accent5"/>
-          </a:effectRef>
-          <a:fontRef idx="minor">
-            <a:schemeClr val="lt1"/>
-          </a:fontRef>
-        </p:style>
-        <p:txBody>
-          <a:bodyPr rtlCol="0" anchor="ctr"/>
-          <a:lstStyle/>
-          <a:p>
-            <a:pPr algn="ctr"/>
-            <a:r>
-              <a:rPr lang="en-CA" sz="1200" b="1" dirty="0" smtClean="0">
-                <a:solidFill>
-                  <a:schemeClr val="bg1"/>
-                </a:solidFill>
-              </a:rPr>
-              <a:t>Tracker data source 7</a:t>
-            </a:r>
-          </a:p>
-        </p:txBody>
-      </p:sp>
-      <p:sp>
-        <p:nvSpPr>
-          <p:cNvPr id="56" name="Rectangle 55"/>
-          <p:cNvSpPr/>
-          <p:nvPr/>
-        </p:nvSpPr>
-        <p:spPr>
-          <a:xfrm>
-            <a:off x="6965854" y="5285287"/>
-            <a:ext cx="1522996" cy="265791"/>
-          </a:xfrm>
-          <a:prstGeom prst="rect">
-            <a:avLst/>
-          </a:prstGeom>
-          <a:solidFill>
-            <a:srgbClr val="33889F"/>
-          </a:solidFill>
-          <a:ln>
-            <a:prstDash val="sysDot"/>
-          </a:ln>
-        </p:spPr>
-        <p:style>
-          <a:lnRef idx="3">
-            <a:schemeClr val="lt1"/>
-          </a:lnRef>
-          <a:fillRef idx="1">
-            <a:schemeClr val="accent5"/>
-          </a:fillRef>
-          <a:effectRef idx="1">
-            <a:schemeClr val="accent5"/>
-          </a:effectRef>
-          <a:fontRef idx="minor">
-            <a:schemeClr val="lt1"/>
-          </a:fontRef>
-        </p:style>
-        <p:txBody>
-          <a:bodyPr rtlCol="0" anchor="ctr"/>
-          <a:lstStyle/>
-          <a:p>
-            <a:pPr algn="ctr"/>
-            <a:r>
-              <a:rPr lang="en-CA" sz="1200" b="1" dirty="0" smtClean="0">
-                <a:solidFill>
-                  <a:schemeClr val="bg1"/>
-                </a:solidFill>
-              </a:rPr>
-              <a:t>Tracker data source 8</a:t>
-            </a:r>
-          </a:p>
-        </p:txBody>
-      </p:sp>
-      <p:sp>
-        <p:nvSpPr>
-          <p:cNvPr id="57" name="Rectangle 56"/>
-          <p:cNvSpPr/>
-          <p:nvPr/>
-        </p:nvSpPr>
-        <p:spPr>
-          <a:xfrm>
-            <a:off x="1346403" y="3328610"/>
-            <a:ext cx="1846612" cy="1203899"/>
-          </a:xfrm>
-          <a:prstGeom prst="rect">
-            <a:avLst/>
-          </a:prstGeom>
-          <a:solidFill>
-            <a:srgbClr val="33889F"/>
-          </a:solidFill>
-          <a:ln/>
-        </p:spPr>
-        <p:style>
-          <a:lnRef idx="3">
-            <a:schemeClr val="lt1"/>
-          </a:lnRef>
-          <a:fillRef idx="1">
-            <a:schemeClr val="accent5"/>
-          </a:fillRef>
-          <a:effectRef idx="1">
-            <a:schemeClr val="accent5"/>
-          </a:effectRef>
-          <a:fontRef idx="minor">
-            <a:schemeClr val="lt1"/>
-          </a:fontRef>
-        </p:style>
-        <p:txBody>
-          <a:bodyPr rtlCol="0" anchor="ctr"/>
-          <a:lstStyle/>
-          <a:p>
-            <a:pPr algn="ctr"/>
-            <a:r>
-              <a:rPr lang="en-CA" sz="1200" b="1" dirty="0" smtClean="0">
-                <a:solidFill>
-                  <a:schemeClr val="bg1"/>
-                </a:solidFill>
-              </a:rPr>
-              <a:t>Input Channel 2</a:t>
-            </a:r>
-          </a:p>
-          <a:p>
-            <a:pPr algn="ctr"/>
-            <a:endParaRPr lang="en-CA" sz="1200" b="1" dirty="0">
-              <a:solidFill>
-                <a:schemeClr val="bg1"/>
-              </a:solidFill>
-            </a:endParaRPr>
-          </a:p>
-          <a:p>
-            <a:pPr algn="ctr"/>
-            <a:endParaRPr lang="en-CA" sz="1200" b="1" dirty="0" smtClean="0">
-              <a:solidFill>
-                <a:schemeClr val="bg1"/>
-              </a:solidFill>
-            </a:endParaRPr>
-          </a:p>
-          <a:p>
-            <a:pPr algn="ctr"/>
-            <a:endParaRPr lang="en-CA" sz="1200" b="1" dirty="0">
-              <a:solidFill>
-                <a:schemeClr val="bg1"/>
-              </a:solidFill>
-            </a:endParaRPr>
-          </a:p>
-          <a:p>
-            <a:pPr algn="ctr"/>
-            <a:endParaRPr lang="en-CA" sz="1200" b="1" dirty="0" smtClean="0">
-              <a:solidFill>
-                <a:schemeClr val="bg1"/>
-              </a:solidFill>
-            </a:endParaRPr>
-          </a:p>
-          <a:p>
-            <a:pPr algn="ctr"/>
-            <a:endParaRPr lang="en-CA" sz="1200" b="1" dirty="0" smtClean="0">
-              <a:solidFill>
-                <a:schemeClr val="bg1"/>
-              </a:solidFill>
-            </a:endParaRPr>
-          </a:p>
-        </p:txBody>
-      </p:sp>
-      <p:sp>
-        <p:nvSpPr>
-          <p:cNvPr id="59" name="Rectangle 58"/>
-          <p:cNvSpPr/>
-          <p:nvPr/>
-        </p:nvSpPr>
-        <p:spPr>
-          <a:xfrm>
-            <a:off x="1536085" y="3734215"/>
-            <a:ext cx="1522996" cy="265791"/>
-          </a:xfrm>
-          <a:prstGeom prst="rect">
-            <a:avLst/>
-          </a:prstGeom>
-          <a:solidFill>
-            <a:srgbClr val="33889F"/>
-          </a:solidFill>
-          <a:ln>
-            <a:prstDash val="sysDot"/>
-          </a:ln>
-        </p:spPr>
-        <p:style>
-          <a:lnRef idx="3">
-            <a:schemeClr val="lt1"/>
-          </a:lnRef>
-          <a:fillRef idx="1">
-            <a:schemeClr val="accent5"/>
-          </a:fillRef>
-          <a:effectRef idx="1">
-            <a:schemeClr val="accent5"/>
-          </a:effectRef>
-          <a:fontRef idx="minor">
-            <a:schemeClr val="lt1"/>
-          </a:fontRef>
-        </p:style>
-        <p:txBody>
-          <a:bodyPr rtlCol="0" anchor="ctr"/>
-          <a:lstStyle/>
-          <a:p>
-            <a:pPr algn="ctr"/>
-            <a:r>
-              <a:rPr lang="en-CA" sz="1200" b="1" dirty="0" smtClean="0">
-                <a:solidFill>
-                  <a:schemeClr val="bg1"/>
-                </a:solidFill>
-              </a:rPr>
-              <a:t>Tracker data source 5</a:t>
-            </a:r>
-          </a:p>
-        </p:txBody>
-      </p:sp>
-      <p:sp>
-        <p:nvSpPr>
-          <p:cNvPr id="60" name="Rectangle 59"/>
-          <p:cNvSpPr/>
-          <p:nvPr/>
-        </p:nvSpPr>
-        <p:spPr>
-          <a:xfrm>
-            <a:off x="1536086" y="4119584"/>
-            <a:ext cx="1522996" cy="265791"/>
-          </a:xfrm>
-          <a:prstGeom prst="rect">
-            <a:avLst/>
-          </a:prstGeom>
-          <a:solidFill>
-            <a:srgbClr val="33889F"/>
-          </a:solidFill>
-          <a:ln>
-            <a:prstDash val="sysDot"/>
-          </a:ln>
-        </p:spPr>
-        <p:style>
-          <a:lnRef idx="3">
-            <a:schemeClr val="lt1"/>
-          </a:lnRef>
-          <a:fillRef idx="1">
-            <a:schemeClr val="accent5"/>
-          </a:fillRef>
-          <a:effectRef idx="1">
-            <a:schemeClr val="accent5"/>
-          </a:effectRef>
-          <a:fontRef idx="minor">
-            <a:schemeClr val="lt1"/>
-          </a:fontRef>
-        </p:style>
-        <p:txBody>
-          <a:bodyPr rtlCol="0" anchor="ctr"/>
-          <a:lstStyle/>
-          <a:p>
-            <a:pPr algn="ctr"/>
-            <a:r>
-              <a:rPr lang="en-CA" sz="1200" b="1" dirty="0" smtClean="0">
-                <a:solidFill>
-                  <a:schemeClr val="bg1"/>
-                </a:solidFill>
-              </a:rPr>
-              <a:t>Tracker data source 6</a:t>
-            </a:r>
-          </a:p>
-        </p:txBody>
-      </p:sp>
-      <p:sp>
-        <p:nvSpPr>
-          <p:cNvPr id="63" name="Rectangle 62"/>
-          <p:cNvSpPr/>
-          <p:nvPr/>
-        </p:nvSpPr>
-        <p:spPr>
-          <a:xfrm>
-            <a:off x="3913100" y="5373216"/>
-            <a:ext cx="1522996" cy="265791"/>
-          </a:xfrm>
-          <a:prstGeom prst="rect">
-            <a:avLst/>
-          </a:prstGeom>
-          <a:solidFill>
-            <a:srgbClr val="33889F"/>
-          </a:solidFill>
-          <a:ln/>
-        </p:spPr>
-        <p:style>
-          <a:lnRef idx="3">
-            <a:schemeClr val="lt1"/>
-          </a:lnRef>
-          <a:fillRef idx="1">
-            <a:schemeClr val="accent5"/>
-          </a:fillRef>
-          <a:effectRef idx="1">
-            <a:schemeClr val="accent5"/>
-          </a:effectRef>
-          <a:fontRef idx="minor">
-            <a:schemeClr val="lt1"/>
-          </a:fontRef>
-        </p:style>
-        <p:txBody>
-          <a:bodyPr rtlCol="0" anchor="ctr"/>
-          <a:lstStyle/>
-          <a:p>
-            <a:pPr algn="ctr"/>
-            <a:r>
-              <a:rPr lang="en-CA" sz="1200" b="1" dirty="0" smtClean="0">
-                <a:solidFill>
-                  <a:schemeClr val="bg1"/>
-                </a:solidFill>
-              </a:rPr>
-              <a:t>Tracker data source 7</a:t>
-            </a:r>
-          </a:p>
-        </p:txBody>
-      </p:sp>
-      <p:sp>
-        <p:nvSpPr>
-          <p:cNvPr id="67" name="Rectangle 66"/>
-          <p:cNvSpPr/>
-          <p:nvPr/>
-        </p:nvSpPr>
-        <p:spPr>
-          <a:xfrm>
-            <a:off x="3913100" y="5733256"/>
-            <a:ext cx="1522996" cy="265791"/>
-          </a:xfrm>
-          <a:prstGeom prst="rect">
-            <a:avLst/>
-          </a:prstGeom>
-          <a:solidFill>
-            <a:srgbClr val="33889F"/>
-          </a:solidFill>
-          <a:ln/>
-        </p:spPr>
-        <p:style>
-          <a:lnRef idx="3">
-            <a:schemeClr val="lt1"/>
-          </a:lnRef>
-          <a:fillRef idx="1">
-            <a:schemeClr val="accent5"/>
-          </a:fillRef>
-          <a:effectRef idx="1">
-            <a:schemeClr val="accent5"/>
-          </a:effectRef>
-          <a:fontRef idx="minor">
-            <a:schemeClr val="lt1"/>
-          </a:fontRef>
-        </p:style>
-        <p:txBody>
-          <a:bodyPr rtlCol="0" anchor="ctr"/>
-          <a:lstStyle/>
-          <a:p>
-            <a:pPr algn="ctr"/>
-            <a:r>
-              <a:rPr lang="en-CA" sz="1200" b="1" dirty="0" smtClean="0">
-                <a:solidFill>
-                  <a:schemeClr val="bg1"/>
-                </a:solidFill>
-              </a:rPr>
-              <a:t>Tracker data source 8</a:t>
-            </a:r>
-          </a:p>
-        </p:txBody>
-      </p:sp>
-      <p:sp>
-        <p:nvSpPr>
-          <p:cNvPr id="68" name="Rectangle 67"/>
-          <p:cNvSpPr/>
-          <p:nvPr/>
-        </p:nvSpPr>
-        <p:spPr>
-          <a:xfrm>
-            <a:off x="3923928" y="4653136"/>
-            <a:ext cx="1522995" cy="265791"/>
-          </a:xfrm>
-          <a:prstGeom prst="rect">
-            <a:avLst/>
-          </a:prstGeom>
-          <a:solidFill>
-            <a:srgbClr val="3DA2BD"/>
-          </a:solidFill>
-          <a:ln/>
-        </p:spPr>
-        <p:style>
-          <a:lnRef idx="3">
-            <a:schemeClr val="lt1"/>
-          </a:lnRef>
-          <a:fillRef idx="1">
-            <a:schemeClr val="accent5"/>
-          </a:fillRef>
-          <a:effectRef idx="1">
-            <a:schemeClr val="accent5"/>
-          </a:effectRef>
-          <a:fontRef idx="minor">
-            <a:schemeClr val="lt1"/>
-          </a:fontRef>
-        </p:style>
-        <p:txBody>
-          <a:bodyPr rtlCol="0" anchor="ctr"/>
-          <a:lstStyle/>
-          <a:p>
-            <a:pPr algn="ctr"/>
-            <a:r>
-              <a:rPr lang="en-CA" sz="1200" b="1" dirty="0" smtClean="0">
-                <a:solidFill>
-                  <a:schemeClr val="bg1"/>
-                </a:solidFill>
-              </a:rPr>
-              <a:t>Video data source 2</a:t>
-            </a:r>
-          </a:p>
-        </p:txBody>
-      </p:sp>
-      <p:sp>
-        <p:nvSpPr>
-          <p:cNvPr id="69" name="Rectangle 68"/>
-          <p:cNvSpPr/>
-          <p:nvPr/>
-        </p:nvSpPr>
-        <p:spPr>
-          <a:xfrm>
-            <a:off x="3919170" y="5013176"/>
-            <a:ext cx="1522995" cy="265791"/>
-          </a:xfrm>
-          <a:prstGeom prst="rect">
-            <a:avLst/>
-          </a:prstGeom>
-          <a:solidFill>
-            <a:srgbClr val="3DA2BD"/>
-          </a:solidFill>
-          <a:ln/>
-        </p:spPr>
-        <p:style>
-          <a:lnRef idx="3">
-            <a:schemeClr val="lt1"/>
-          </a:lnRef>
-          <a:fillRef idx="1">
-            <a:schemeClr val="accent5"/>
-          </a:fillRef>
-          <a:effectRef idx="1">
-            <a:schemeClr val="accent5"/>
-          </a:effectRef>
-          <a:fontRef idx="minor">
-            <a:schemeClr val="lt1"/>
-          </a:fontRef>
-        </p:style>
-        <p:txBody>
-          <a:bodyPr rtlCol="0" anchor="ctr"/>
-          <a:lstStyle/>
-          <a:p>
-            <a:pPr algn="ctr"/>
-            <a:r>
-              <a:rPr lang="en-CA" sz="1200" b="1" dirty="0" smtClean="0">
-                <a:solidFill>
-                  <a:schemeClr val="bg1"/>
-                </a:solidFill>
-              </a:rPr>
-              <a:t>Video data source 3</a:t>
-            </a:r>
-          </a:p>
-        </p:txBody>
-      </p:sp>
-      <p:cxnSp>
-        <p:nvCxnSpPr>
-          <p:cNvPr id="9" name="Elbow Connector 8"/>
-          <p:cNvCxnSpPr>
-            <a:stCxn id="34" idx="3"/>
-            <a:endCxn id="44" idx="1"/>
-          </p:cNvCxnSpPr>
-          <p:nvPr/>
-        </p:nvCxnSpPr>
-        <p:spPr>
-          <a:xfrm>
-            <a:off x="3059083" y="1833704"/>
-            <a:ext cx="3889179" cy="305252"/>
-          </a:xfrm>
-          <a:prstGeom prst="straightConnector1">
-            <a:avLst/>
-          </a:prstGeom>
-          <a:ln w="12700">
-            <a:solidFill>
-              <a:schemeClr val="tx1"/>
-            </a:solidFill>
-            <a:tailEnd type="arrow"/>
-          </a:ln>
-        </p:spPr>
-        <p:style>
-          <a:lnRef idx="1">
-            <a:schemeClr val="accent1"/>
-          </a:lnRef>
-          <a:fillRef idx="0">
-            <a:schemeClr val="accent1"/>
-          </a:fillRef>
-          <a:effectRef idx="0">
-            <a:schemeClr val="accent1"/>
-          </a:effectRef>
-          <a:fontRef idx="minor">
-            <a:schemeClr val="tx1"/>
-          </a:fontRef>
-        </p:style>
-      </p:cxnSp>
-      <p:cxnSp>
-        <p:nvCxnSpPr>
-          <p:cNvPr id="73" name="Elbow Connector 72"/>
-          <p:cNvCxnSpPr>
-            <a:stCxn id="69" idx="3"/>
-            <a:endCxn id="49" idx="1"/>
-          </p:cNvCxnSpPr>
-          <p:nvPr/>
-        </p:nvCxnSpPr>
-        <p:spPr>
-          <a:xfrm flipV="1">
-            <a:off x="5442165" y="4299196"/>
-            <a:ext cx="1522941" cy="846876"/>
-          </a:xfrm>
-          <a:prstGeom prst="straightConnector1">
-            <a:avLst/>
-          </a:prstGeom>
-          <a:ln w="12700">
-            <a:solidFill>
-              <a:schemeClr val="tx1"/>
-            </a:solidFill>
-            <a:tailEnd type="arrow"/>
-          </a:ln>
-        </p:spPr>
-        <p:style>
-          <a:lnRef idx="1">
-            <a:schemeClr val="accent1"/>
-          </a:lnRef>
-          <a:fillRef idx="0">
-            <a:schemeClr val="accent1"/>
-          </a:fillRef>
-          <a:effectRef idx="0">
-            <a:schemeClr val="accent1"/>
-          </a:effectRef>
-          <a:fontRef idx="minor">
-            <a:schemeClr val="tx1"/>
-          </a:fontRef>
-        </p:style>
-      </p:cxnSp>
-      <p:cxnSp>
-        <p:nvCxnSpPr>
-          <p:cNvPr id="75" name="Elbow Connector 74"/>
-          <p:cNvCxnSpPr>
-            <a:stCxn id="59" idx="3"/>
-            <a:endCxn id="46" idx="1"/>
-          </p:cNvCxnSpPr>
-          <p:nvPr/>
-        </p:nvCxnSpPr>
-        <p:spPr>
-          <a:xfrm flipV="1">
-            <a:off x="3059081" y="2892397"/>
-            <a:ext cx="3889181" cy="974714"/>
-          </a:xfrm>
-          <a:prstGeom prst="straightConnector1">
-            <a:avLst/>
-          </a:prstGeom>
-          <a:ln w="12700">
-            <a:solidFill>
-              <a:schemeClr val="tx1"/>
-            </a:solidFill>
-            <a:tailEnd type="arrow"/>
-          </a:ln>
-        </p:spPr>
-        <p:style>
-          <a:lnRef idx="1">
-            <a:schemeClr val="accent1"/>
-          </a:lnRef>
-          <a:fillRef idx="0">
-            <a:schemeClr val="accent1"/>
-          </a:fillRef>
-          <a:effectRef idx="0">
-            <a:schemeClr val="accent1"/>
-          </a:effectRef>
-          <a:fontRef idx="minor">
-            <a:schemeClr val="tx1"/>
-          </a:fontRef>
-        </p:style>
-      </p:cxnSp>
-      <p:cxnSp>
-        <p:nvCxnSpPr>
-          <p:cNvPr id="76" name="Elbow Connector 75"/>
-          <p:cNvCxnSpPr>
-            <a:stCxn id="36" idx="3"/>
-            <a:endCxn id="45" idx="1"/>
-          </p:cNvCxnSpPr>
-          <p:nvPr/>
-        </p:nvCxnSpPr>
-        <p:spPr>
-          <a:xfrm>
-            <a:off x="3059083" y="2201776"/>
-            <a:ext cx="3889178" cy="305252"/>
-          </a:xfrm>
-          <a:prstGeom prst="straightConnector1">
-            <a:avLst/>
-          </a:prstGeom>
-          <a:ln w="12700">
-            <a:solidFill>
-              <a:schemeClr val="tx1"/>
-            </a:solidFill>
-            <a:tailEnd type="arrow"/>
-          </a:ln>
-        </p:spPr>
-        <p:style>
-          <a:lnRef idx="1">
-            <a:schemeClr val="accent1"/>
-          </a:lnRef>
-          <a:fillRef idx="0">
-            <a:schemeClr val="accent1"/>
-          </a:fillRef>
-          <a:effectRef idx="0">
-            <a:schemeClr val="accent1"/>
-          </a:effectRef>
-          <a:fontRef idx="minor">
-            <a:schemeClr val="tx1"/>
-          </a:fontRef>
-        </p:style>
-      </p:cxnSp>
-      <p:cxnSp>
-        <p:nvCxnSpPr>
-          <p:cNvPr id="78" name="Elbow Connector 77"/>
-          <p:cNvCxnSpPr>
-            <a:stCxn id="60" idx="3"/>
-            <a:endCxn id="47" idx="1"/>
-          </p:cNvCxnSpPr>
-          <p:nvPr/>
-        </p:nvCxnSpPr>
-        <p:spPr>
-          <a:xfrm flipV="1">
-            <a:off x="3059082" y="3257943"/>
-            <a:ext cx="3889928" cy="994537"/>
-          </a:xfrm>
-          <a:prstGeom prst="straightConnector1">
-            <a:avLst/>
-          </a:prstGeom>
-          <a:ln w="12700">
-            <a:solidFill>
-              <a:schemeClr val="tx1"/>
-            </a:solidFill>
-            <a:tailEnd type="arrow"/>
-          </a:ln>
-        </p:spPr>
-        <p:style>
-          <a:lnRef idx="1">
-            <a:schemeClr val="accent1"/>
-          </a:lnRef>
-          <a:fillRef idx="0">
-            <a:schemeClr val="accent1"/>
-          </a:fillRef>
-          <a:effectRef idx="0">
-            <a:schemeClr val="accent1"/>
-          </a:effectRef>
-          <a:fontRef idx="minor">
-            <a:schemeClr val="tx1"/>
-          </a:fontRef>
-        </p:style>
-      </p:cxnSp>
-      <p:cxnSp>
-        <p:nvCxnSpPr>
-          <p:cNvPr id="79" name="Elbow Connector 72"/>
-          <p:cNvCxnSpPr>
-            <a:stCxn id="39" idx="3"/>
-            <a:endCxn id="53" idx="1"/>
-          </p:cNvCxnSpPr>
-          <p:nvPr/>
-        </p:nvCxnSpPr>
-        <p:spPr>
-          <a:xfrm>
-            <a:off x="3059832" y="2952691"/>
-            <a:ext cx="3905273" cy="1714577"/>
-          </a:xfrm>
-          <a:prstGeom prst="straightConnector1">
-            <a:avLst/>
-          </a:prstGeom>
-          <a:ln w="12700">
-            <a:solidFill>
-              <a:schemeClr val="tx1"/>
-            </a:solidFill>
-            <a:tailEnd type="arrow"/>
-          </a:ln>
-        </p:spPr>
-        <p:style>
-          <a:lnRef idx="1">
-            <a:schemeClr val="accent1"/>
-          </a:lnRef>
-          <a:fillRef idx="0">
-            <a:schemeClr val="accent1"/>
-          </a:fillRef>
-          <a:effectRef idx="0">
-            <a:schemeClr val="accent1"/>
-          </a:effectRef>
-          <a:fontRef idx="minor">
-            <a:schemeClr val="tx1"/>
-          </a:fontRef>
-        </p:style>
-      </p:cxnSp>
-      <p:cxnSp>
-        <p:nvCxnSpPr>
-          <p:cNvPr id="81" name="Elbow Connector 72"/>
-          <p:cNvCxnSpPr>
-            <a:stCxn id="63" idx="3"/>
-            <a:endCxn id="54" idx="1"/>
-          </p:cNvCxnSpPr>
-          <p:nvPr/>
-        </p:nvCxnSpPr>
-        <p:spPr>
-          <a:xfrm flipV="1">
-            <a:off x="5436096" y="5052637"/>
-            <a:ext cx="1529010" cy="453475"/>
-          </a:xfrm>
-          <a:prstGeom prst="straightConnector1">
-            <a:avLst/>
-          </a:prstGeom>
-          <a:ln w="12700">
-            <a:solidFill>
-              <a:schemeClr val="tx1"/>
-            </a:solidFill>
-            <a:tailEnd type="arrow"/>
-          </a:ln>
-        </p:spPr>
-        <p:style>
-          <a:lnRef idx="1">
-            <a:schemeClr val="accent1"/>
-          </a:lnRef>
-          <a:fillRef idx="0">
-            <a:schemeClr val="accent1"/>
-          </a:fillRef>
-          <a:effectRef idx="0">
-            <a:schemeClr val="accent1"/>
-          </a:effectRef>
-          <a:fontRef idx="minor">
-            <a:schemeClr val="tx1"/>
-          </a:fontRef>
-        </p:style>
-      </p:cxnSp>
-      <p:cxnSp>
-        <p:nvCxnSpPr>
-          <p:cNvPr id="84" name="Elbow Connector 72"/>
-          <p:cNvCxnSpPr>
-            <a:stCxn id="67" idx="3"/>
-            <a:endCxn id="56" idx="1"/>
-          </p:cNvCxnSpPr>
-          <p:nvPr/>
-        </p:nvCxnSpPr>
-        <p:spPr>
-          <a:xfrm flipV="1">
-            <a:off x="5436096" y="5418183"/>
-            <a:ext cx="1529758" cy="447969"/>
-          </a:xfrm>
-          <a:prstGeom prst="straightConnector1">
-            <a:avLst/>
-          </a:prstGeom>
-          <a:ln w="12700">
-            <a:solidFill>
-              <a:schemeClr val="tx1"/>
-            </a:solidFill>
-            <a:tailEnd type="arrow"/>
-          </a:ln>
-        </p:spPr>
-        <p:style>
-          <a:lnRef idx="1">
-            <a:schemeClr val="accent1"/>
-          </a:lnRef>
-          <a:fillRef idx="0">
-            <a:schemeClr val="accent1"/>
-          </a:fillRef>
-          <a:effectRef idx="0">
-            <a:schemeClr val="accent1"/>
-          </a:effectRef>
-          <a:fontRef idx="minor">
-            <a:schemeClr val="tx1"/>
-          </a:fontRef>
-        </p:style>
-      </p:cxnSp>
-    </p:spTree>
-    <p:extLst>
-      <p:ext uri="{BB962C8B-B14F-4D97-AF65-F5344CB8AC3E}">
-        <p14:creationId xmlns:p14="http://schemas.microsoft.com/office/powerpoint/2010/main" val="1737894409"/>
-      </p:ext>
-    </p:extLst>
-  </p:cSld>
-  <p:clrMapOvr>
-    <a:masterClrMapping/>
-  </p:clrMapOvr>
-  <mc:AlternateContent xmlns:mc="http://schemas.openxmlformats.org/markup-compatibility/2006" xmlns:p14="http://schemas.microsoft.com/office/powerpoint/2010/main">
-    <mc:Choice Requires="p14">
-      <p:transition spd="slow" p14:dur="2000" advTm="3263"/>
-    </mc:Choice>
-    <mc:Fallback xmlns="">
-      <p:transition spd="slow" advTm="3263"/>
-    </mc:Fallback>
-  </mc:AlternateContent>
-  <p:timing>
-    <p:tnLst>
-      <p:par>
-        <p:cTn id="1" dur="indefinite" restart="never" nodeType="tmRoot"/>
-      </p:par>
-    </p:tnLst>
-  </p:timing>
-</p:sld>
-</file>
-
-<file path=ppt/slides/slide8.xml><?xml version="1.0" encoding="utf-8"?>
 <p:sld xmlns:a="http://schemas.openxmlformats.org/drawingml/2006/main" xmlns:r="http://schemas.openxmlformats.org/officeDocument/2006/relationships" xmlns:p="http://schemas.openxmlformats.org/presentationml/2006/main">
   <p:cSld>
     <p:spTree>
@@ -12388,7 +10294,7 @@
               <a:pPr algn="ctr">
                 <a:defRPr/>
               </a:pPr>
-              <a:t>8</a:t>
+              <a:t>7</a:t>
             </a:fld>
             <a:r>
               <a:rPr lang="en-US" smtClean="0"/>
@@ -14208,7 +12114,7 @@
 </p:sld>
 </file>
 
-<file path=ppt/slides/slide9.xml><?xml version="1.0" encoding="utf-8"?>
+<file path=ppt/slides/slide8.xml><?xml version="1.0" encoding="utf-8"?>
 <p:sld xmlns:a="http://schemas.openxmlformats.org/drawingml/2006/main" xmlns:r="http://schemas.openxmlformats.org/officeDocument/2006/relationships" xmlns:p="http://schemas.openxmlformats.org/presentationml/2006/main">
   <p:cSld>
     <p:spTree>
@@ -14513,7 +12419,7 @@
               <a:pPr algn="ctr">
                 <a:defRPr/>
               </a:pPr>
-              <a:t>9</a:t>
+              <a:t>8</a:t>
             </a:fld>
             <a:r>
               <a:rPr lang="en-US" smtClean="0"/>

</xml_diff>